<commit_message>
added ConstructorInjection by Default example
</commit_message>
<xml_diff>
--- a/ADC Core 2017 - Designing ASP.NET Core Apps with Dependency Injection in Mind.pptx
+++ b/ADC Core 2017 - Designing ASP.NET Core Apps with Dependency Injection in Mind.pptx
@@ -5,10 +5,10 @@
     <p:sldMasterId id="2147483648" r:id="rId1"/>
   </p:sldMasterIdLst>
   <p:notesMasterIdLst>
-    <p:notesMasterId r:id="rId35"/>
+    <p:notesMasterId r:id="rId37"/>
   </p:notesMasterIdLst>
   <p:handoutMasterIdLst>
-    <p:handoutMasterId r:id="rId36"/>
+    <p:handoutMasterId r:id="rId38"/>
   </p:handoutMasterIdLst>
   <p:sldIdLst>
     <p:sldId id="256" r:id="rId2"/>
@@ -31,19 +31,21 @@
     <p:sldId id="312" r:id="rId19"/>
     <p:sldId id="313" r:id="rId20"/>
     <p:sldId id="314" r:id="rId21"/>
-    <p:sldId id="315" r:id="rId22"/>
-    <p:sldId id="316" r:id="rId23"/>
+    <p:sldId id="316" r:id="rId22"/>
+    <p:sldId id="319" r:id="rId23"/>
     <p:sldId id="318" r:id="rId24"/>
-    <p:sldId id="319" r:id="rId25"/>
-    <p:sldId id="320" r:id="rId26"/>
-    <p:sldId id="321" r:id="rId27"/>
-    <p:sldId id="322" r:id="rId28"/>
-    <p:sldId id="323" r:id="rId29"/>
-    <p:sldId id="298" r:id="rId30"/>
-    <p:sldId id="270" r:id="rId31"/>
-    <p:sldId id="299" r:id="rId32"/>
-    <p:sldId id="258" r:id="rId33"/>
-    <p:sldId id="261" r:id="rId34"/>
+    <p:sldId id="324" r:id="rId25"/>
+    <p:sldId id="315" r:id="rId26"/>
+    <p:sldId id="325" r:id="rId27"/>
+    <p:sldId id="320" r:id="rId28"/>
+    <p:sldId id="326" r:id="rId29"/>
+    <p:sldId id="321" r:id="rId30"/>
+    <p:sldId id="322" r:id="rId31"/>
+    <p:sldId id="323" r:id="rId32"/>
+    <p:sldId id="298" r:id="rId33"/>
+    <p:sldId id="299" r:id="rId34"/>
+    <p:sldId id="258" r:id="rId35"/>
+    <p:sldId id="261" r:id="rId36"/>
   </p:sldIdLst>
   <p:sldSz cx="12192000" cy="6858000"/>
   <p:notesSz cx="6858000" cy="9144000"/>
@@ -194,6 +196,10 @@
 </p:presentation>
 </file>
 
+<file path=ppt/revisionInfo.xml><?xml version="1.0" encoding="utf-8"?>
+<p1510:revInfo xmlns:a="http://schemas.openxmlformats.org/drawingml/2006/main" xmlns:r="http://schemas.openxmlformats.org/officeDocument/2006/relationships" xmlns:p1510="http://schemas.microsoft.com/office/powerpoint/2015/10/main"/>
+</file>
+
 <file path=ppt/charts/chart1.xml><?xml version="1.0" encoding="utf-8"?>
 <c:chartSpace xmlns:c="http://schemas.openxmlformats.org/drawingml/2006/chart" xmlns:a="http://schemas.openxmlformats.org/drawingml/2006/main" xmlns:r="http://schemas.openxmlformats.org/officeDocument/2006/relationships" xmlns:c16r2="http://schemas.microsoft.com/office/drawing/2015/06/chart">
   <c:date1904 val="0"/>
@@ -226,7 +232,7 @@
             </a:pPr>
             <a:r>
               <a:rPr lang="en-US" noProof="0" dirty="0"/>
-              <a:t>Elapsed Times for 500.000 Resolves or Registers (in </a:t>
+              <a:t>Elapsed Times for 500.000 Resolve or Register Calls (in </a:t>
             </a:r>
             <a:r>
               <a:rPr lang="en-US" noProof="0" dirty="0" err="1"/>
@@ -234,7 +240,7 @@
             </a:r>
             <a:r>
               <a:rPr lang="en-US" noProof="0" dirty="0"/>
-              <a:t>, logarithmic</a:t>
+              <a:t>, log.</a:t>
             </a:r>
             <a:r>
               <a:rPr lang="en-US" baseline="0" noProof="0" dirty="0"/>
@@ -2923,7 +2929,7 @@
           <a:p>
             <a:fld id="{237CE087-4543-4189-BB65-6B91047A5D23}" type="datetimeFigureOut">
               <a:rPr lang="de-DE" smtClean="0"/>
-              <a:t>16.09.2017</a:t>
+              <a:t>17.09.2017</a:t>
             </a:fld>
             <a:endParaRPr lang="de-DE"/>
           </a:p>
@@ -14480,7 +14486,7 @@
             <a:pPr algn="ctr"/>
             <a:r>
               <a:rPr lang="en-US" sz="1600" dirty="0"/>
-              <a:t>Create HTTP Response</a:t>
+              <a:t>Create HTTP Response, Dispose Controller</a:t>
             </a:r>
           </a:p>
         </p:txBody>
@@ -18378,7 +18384,7 @@
           <a:p>
             <a:r>
               <a:rPr lang="en-US" dirty="0"/>
-              <a:t>Best Practices for DI in your ASP.NET Core Apps</a:t>
+              <a:t>Best Practices for DI in Your ASP.NET Core Apps</a:t>
             </a:r>
             <a:endParaRPr lang="de-DE" dirty="0"/>
           </a:p>
@@ -18649,7 +18655,20 @@
             </a:r>
             <a:r>
               <a:rPr lang="en-US" dirty="0"/>
-              <a:t>, and even when using Pure DI you can easily spot all the necessary dependencies via IntelliSense.</a:t>
+              <a:t>, and even when using Pure DI you can easily spot all the necessary dependencies via IntelliSense on calling </a:t>
+            </a:r>
+            <a:r>
+              <a:rPr lang="en-US" dirty="0">
+                <a:solidFill>
+                  <a:srgbClr val="0000FF"/>
+                </a:solidFill>
+                <a:latin typeface="Consolas" panose="020B0609020204030204" pitchFamily="49" charset="0"/>
+              </a:rPr>
+              <a:t>new</a:t>
+            </a:r>
+            <a:r>
+              <a:rPr lang="en-US" dirty="0"/>
+              <a:t>.</a:t>
             </a:r>
           </a:p>
           <a:p>
@@ -18707,7 +18726,7 @@
           <p:cNvPr id="2" name="Title 1">
             <a:extLst>
               <a:ext uri="{FF2B5EF4-FFF2-40B4-BE49-F238E27FC236}">
-                <a16:creationId xmlns:a16="http://schemas.microsoft.com/office/drawing/2014/main" id="{CE3A0733-CBFA-4B11-88ED-884FDE430253}"/>
+                <a16:creationId xmlns:a16="http://schemas.microsoft.com/office/drawing/2014/main" id="{AB5073C7-A0CE-40D7-9AD3-F1D958844337}"/>
               </a:ext>
             </a:extLst>
           </p:cNvPr>
@@ -18725,7 +18744,7 @@
           <a:p>
             <a:r>
               <a:rPr lang="en-US" dirty="0"/>
-              <a:t>Use a Composition Root</a:t>
+              <a:t>Avoid Service Locator</a:t>
             </a:r>
             <a:endParaRPr lang="de-DE" dirty="0"/>
           </a:p>
@@ -18736,7 +18755,7 @@
           <p:cNvPr id="3" name="Content Placeholder 2">
             <a:extLst>
               <a:ext uri="{FF2B5EF4-FFF2-40B4-BE49-F238E27FC236}">
-                <a16:creationId xmlns:a16="http://schemas.microsoft.com/office/drawing/2014/main" id="{CAE8452E-1AB8-45A7-B61D-86788DD230F8}"/>
+                <a16:creationId xmlns:a16="http://schemas.microsoft.com/office/drawing/2014/main" id="{FC4C0F2C-9909-41A3-931F-1168CBB43324}"/>
               </a:ext>
             </a:extLst>
           </p:cNvPr>
@@ -18756,40 +18775,36 @@
               <a:buNone/>
             </a:pPr>
             <a:r>
-              <a:rPr lang="en-US" dirty="0"/>
-              <a:t>Shortly after the entry point of your App (in Startup), place your Composition Root. It incorporates</a:t>
-            </a:r>
-          </a:p>
-          <a:p>
-            <a:r>
-              <a:rPr lang="en-US" dirty="0"/>
-              <a:t>a Register Phase</a:t>
-            </a:r>
-          </a:p>
-          <a:p>
-            <a:r>
-              <a:rPr lang="en-US" dirty="0"/>
-              <a:t>a Resolve Phase</a:t>
-            </a:r>
-          </a:p>
-          <a:p>
-            <a:r>
-              <a:rPr lang="en-US" dirty="0"/>
-              <a:t>a Release Phase</a:t>
-            </a:r>
-          </a:p>
-          <a:p>
-            <a:endParaRPr lang="en-US" dirty="0"/>
+              <a:rPr lang="en-US" sz="2800" dirty="0"/>
+              <a:t>Do not inject the Container itself into your classes, so that they can call Resolve on the container to obtain their dependencies.</a:t>
+            </a:r>
           </a:p>
           <a:p>
             <a:pPr marL="0" indent="0">
               <a:buNone/>
             </a:pPr>
             <a:r>
-              <a:rPr lang="en-US" dirty="0"/>
-              <a:t>Avoid consecutive Register -&gt; Resolve -&gt; Register -&gt; Resolve calls, as these can lead to hard-to-discover bugs.</a:t>
-            </a:r>
-            <a:endParaRPr lang="de-DE" dirty="0"/>
+              <a:rPr lang="en-US" sz="2800" dirty="0"/>
+              <a:t>If you need to dynamically resolve object graphs, hide this behind an Abstract Factory which internally uses the DI Container.</a:t>
+            </a:r>
+          </a:p>
+          <a:p>
+            <a:pPr marL="0" indent="0">
+              <a:buNone/>
+            </a:pPr>
+            <a:endParaRPr lang="en-US" sz="2800" dirty="0"/>
+          </a:p>
+          <a:p>
+            <a:r>
+              <a:rPr lang="en-US" sz="2800" dirty="0"/>
+              <a:t>Hard to exchange the DI Container</a:t>
+            </a:r>
+          </a:p>
+          <a:p>
+            <a:r>
+              <a:rPr lang="en-US" sz="2800" dirty="0"/>
+              <a:t>Decreased Testability</a:t>
+            </a:r>
           </a:p>
         </p:txBody>
       </p:sp>
@@ -18798,7 +18813,7 @@
           <p:cNvPr id="4" name="Date Placeholder 3">
             <a:extLst>
               <a:ext uri="{FF2B5EF4-FFF2-40B4-BE49-F238E27FC236}">
-                <a16:creationId xmlns:a16="http://schemas.microsoft.com/office/drawing/2014/main" id="{F3129DFC-4B68-4CAF-946F-45FBF74CA2EB}"/>
+                <a16:creationId xmlns:a16="http://schemas.microsoft.com/office/drawing/2014/main" id="{AFB0D695-ED60-4CDB-8F1D-F9A7DD806EF0}"/>
               </a:ext>
             </a:extLst>
           </p:cNvPr>
@@ -18826,7 +18841,7 @@
           <p:cNvPr id="5" name="Slide Number Placeholder 4">
             <a:extLst>
               <a:ext uri="{FF2B5EF4-FFF2-40B4-BE49-F238E27FC236}">
-                <a16:creationId xmlns:a16="http://schemas.microsoft.com/office/drawing/2014/main" id="{C5EEC4A1-BDA8-46F0-AD20-63FDEF87BD1D}"/>
+                <a16:creationId xmlns:a16="http://schemas.microsoft.com/office/drawing/2014/main" id="{0B99E126-001F-4ED5-A507-901FC9C1D66C}"/>
               </a:ext>
             </a:extLst>
           </p:cNvPr>
@@ -18854,7 +18869,7 @@
     </p:spTree>
     <p:extLst>
       <p:ext uri="{BB962C8B-B14F-4D97-AF65-F5344CB8AC3E}">
-        <p14:creationId xmlns:p14="http://schemas.microsoft.com/office/powerpoint/2010/main" val="1549651925"/>
+        <p14:creationId xmlns:p14="http://schemas.microsoft.com/office/powerpoint/2010/main" val="2158028290"/>
       </p:ext>
     </p:extLst>
   </p:cSld>
@@ -18889,7 +18904,7 @@
           <p:cNvPr id="2" name="Title 1">
             <a:extLst>
               <a:ext uri="{FF2B5EF4-FFF2-40B4-BE49-F238E27FC236}">
-                <a16:creationId xmlns:a16="http://schemas.microsoft.com/office/drawing/2014/main" id="{AB5073C7-A0CE-40D7-9AD3-F1D958844337}"/>
+                <a16:creationId xmlns:a16="http://schemas.microsoft.com/office/drawing/2014/main" id="{4B33386D-E2D6-4053-ADF0-0F3DFEB14996}"/>
               </a:ext>
             </a:extLst>
           </p:cNvPr>
@@ -18907,7 +18922,7 @@
           <a:p>
             <a:r>
               <a:rPr lang="en-US" dirty="0"/>
-              <a:t>Avoid Service Locator</a:t>
+              <a:t>Avoid Ambient Context</a:t>
             </a:r>
             <a:endParaRPr lang="de-DE" dirty="0"/>
           </a:p>
@@ -18918,7 +18933,7 @@
           <p:cNvPr id="3" name="Content Placeholder 2">
             <a:extLst>
               <a:ext uri="{FF2B5EF4-FFF2-40B4-BE49-F238E27FC236}">
-                <a16:creationId xmlns:a16="http://schemas.microsoft.com/office/drawing/2014/main" id="{FC4C0F2C-9909-41A3-931F-1168CBB43324}"/>
+                <a16:creationId xmlns:a16="http://schemas.microsoft.com/office/drawing/2014/main" id="{7432DBE7-403F-4D39-BDE5-B2B5C90C1002}"/>
               </a:ext>
             </a:extLst>
           </p:cNvPr>
@@ -18938,36 +18953,28 @@
               <a:buNone/>
             </a:pPr>
             <a:r>
-              <a:rPr lang="en-US" sz="2800" dirty="0"/>
-              <a:t>Do not inject the Container itself into your classes, so that they can call Resolve on the container to obtain their dependencies.</a:t>
+              <a:rPr lang="en-US" dirty="0"/>
+              <a:t>Try to avoid dependencies to static fields or static properties (Singletons).</a:t>
             </a:r>
           </a:p>
           <a:p>
             <a:pPr marL="0" indent="0">
               <a:buNone/>
             </a:pPr>
-            <a:r>
-              <a:rPr lang="en-US" sz="2800" dirty="0"/>
-              <a:t>If you need to dynamically resolve object graphs, hide this behind an Abstract Factory which internally uses the DI Container.</a:t>
-            </a:r>
-          </a:p>
-          <a:p>
-            <a:pPr marL="0" indent="0">
-              <a:buNone/>
-            </a:pPr>
-            <a:endParaRPr lang="en-US" sz="2800" dirty="0"/>
-          </a:p>
-          <a:p>
-            <a:r>
-              <a:rPr lang="en-US" sz="2800" dirty="0"/>
-              <a:t>Hard to exchange the DI Container</a:t>
-            </a:r>
-          </a:p>
-          <a:p>
-            <a:r>
-              <a:rPr lang="en-US" sz="2800" dirty="0"/>
-              <a:t>Decreased Testability</a:t>
-            </a:r>
+            <a:endParaRPr lang="en-US" dirty="0"/>
+          </a:p>
+          <a:p>
+            <a:r>
+              <a:rPr lang="en-US" dirty="0"/>
+              <a:t>You lose flexibility as all clients can reference only this instance.</a:t>
+            </a:r>
+          </a:p>
+          <a:p>
+            <a:r>
+              <a:rPr lang="en-US" dirty="0"/>
+              <a:t>The static instance stays in memory unless you clean it up manually.</a:t>
+            </a:r>
+            <a:endParaRPr lang="de-DE" dirty="0"/>
           </a:p>
         </p:txBody>
       </p:sp>
@@ -18976,7 +18983,7 @@
           <p:cNvPr id="4" name="Date Placeholder 3">
             <a:extLst>
               <a:ext uri="{FF2B5EF4-FFF2-40B4-BE49-F238E27FC236}">
-                <a16:creationId xmlns:a16="http://schemas.microsoft.com/office/drawing/2014/main" id="{AFB0D695-ED60-4CDB-8F1D-F9A7DD806EF0}"/>
+                <a16:creationId xmlns:a16="http://schemas.microsoft.com/office/drawing/2014/main" id="{8E817B07-5F0A-4ADF-83B7-FF83CAE3E523}"/>
               </a:ext>
             </a:extLst>
           </p:cNvPr>
@@ -19004,7 +19011,7 @@
           <p:cNvPr id="5" name="Slide Number Placeholder 4">
             <a:extLst>
               <a:ext uri="{FF2B5EF4-FFF2-40B4-BE49-F238E27FC236}">
-                <a16:creationId xmlns:a16="http://schemas.microsoft.com/office/drawing/2014/main" id="{0B99E126-001F-4ED5-A507-901FC9C1D66C}"/>
+                <a16:creationId xmlns:a16="http://schemas.microsoft.com/office/drawing/2014/main" id="{582F465E-6AE9-4F80-AC36-C5AA1DA064DD}"/>
               </a:ext>
             </a:extLst>
           </p:cNvPr>
@@ -19032,7 +19039,7 @@
     </p:spTree>
     <p:extLst>
       <p:ext uri="{BB962C8B-B14F-4D97-AF65-F5344CB8AC3E}">
-        <p14:creationId xmlns:p14="http://schemas.microsoft.com/office/powerpoint/2010/main" val="2158028290"/>
+        <p14:creationId xmlns:p14="http://schemas.microsoft.com/office/powerpoint/2010/main" val="2037809699"/>
       </p:ext>
     </p:extLst>
   </p:cSld>
@@ -19117,6 +19124,40 @@
           <a:bodyPr/>
           <a:lstStyle/>
           <a:p>
+            <a:pPr marL="0" indent="0">
+              <a:buNone/>
+            </a:pPr>
+            <a:r>
+              <a:rPr lang="en-US" dirty="0"/>
+              <a:t>Do not use public properties that are marked with an attribute to tell the container that an injection is required.</a:t>
+            </a:r>
+          </a:p>
+          <a:p>
+            <a:pPr marL="0" indent="0">
+              <a:buNone/>
+            </a:pPr>
+            <a:r>
+              <a:rPr lang="en-US" dirty="0"/>
+              <a:t>This is another way to couple your logic to the implementation of a concrete Container.</a:t>
+            </a:r>
+          </a:p>
+          <a:p>
+            <a:pPr marL="0" indent="0">
+              <a:buNone/>
+            </a:pPr>
+            <a:endParaRPr lang="en-US" dirty="0"/>
+          </a:p>
+          <a:p>
+            <a:r>
+              <a:rPr lang="en-US" dirty="0"/>
+              <a:t>Hard to exchange the DI Container</a:t>
+            </a:r>
+          </a:p>
+          <a:p>
+            <a:r>
+              <a:rPr lang="en-US" dirty="0"/>
+              <a:t>These objects are not immutable</a:t>
+            </a:r>
             <a:endParaRPr lang="de-DE" dirty="0"/>
           </a:p>
         </p:txBody>
@@ -19217,7 +19258,173 @@
           <p:cNvPr id="2" name="Title 1">
             <a:extLst>
               <a:ext uri="{FF2B5EF4-FFF2-40B4-BE49-F238E27FC236}">
-                <a16:creationId xmlns:a16="http://schemas.microsoft.com/office/drawing/2014/main" id="{4B33386D-E2D6-4053-ADF0-0F3DFEB14996}"/>
+                <a16:creationId xmlns:a16="http://schemas.microsoft.com/office/drawing/2014/main" id="{61D5955B-02E7-46D4-AF37-716FDC0A9368}"/>
+              </a:ext>
+            </a:extLst>
+          </p:cNvPr>
+          <p:cNvSpPr>
+            <a:spLocks noGrp="1"/>
+          </p:cNvSpPr>
+          <p:nvPr>
+            <p:ph type="title"/>
+          </p:nvPr>
+        </p:nvSpPr>
+        <p:spPr>
+          <a:xfrm>
+            <a:off x="3071664" y="365125"/>
+            <a:ext cx="8282136" cy="1047651"/>
+          </a:xfrm>
+        </p:spPr>
+        <p:txBody>
+          <a:bodyPr/>
+          <a:lstStyle/>
+          <a:p>
+            <a:r>
+              <a:rPr lang="en-US" sz="4000" dirty="0"/>
+              <a:t>Avoid Coupling with the DI Container</a:t>
+            </a:r>
+            <a:endParaRPr lang="de-DE" sz="4000" dirty="0"/>
+          </a:p>
+        </p:txBody>
+      </p:sp>
+      <p:sp>
+        <p:nvSpPr>
+          <p:cNvPr id="3" name="Content Placeholder 2">
+            <a:extLst>
+              <a:ext uri="{FF2B5EF4-FFF2-40B4-BE49-F238E27FC236}">
+                <a16:creationId xmlns:a16="http://schemas.microsoft.com/office/drawing/2014/main" id="{E1AF0F39-FEDC-4AF3-B32D-3E7510EB4EC1}"/>
+              </a:ext>
+            </a:extLst>
+          </p:cNvPr>
+          <p:cNvSpPr>
+            <a:spLocks noGrp="1"/>
+          </p:cNvSpPr>
+          <p:nvPr>
+            <p:ph sz="quarter" idx="10"/>
+          </p:nvPr>
+        </p:nvSpPr>
+        <p:spPr/>
+        <p:txBody>
+          <a:bodyPr/>
+          <a:lstStyle/>
+          <a:p>
+            <a:pPr marL="0" indent="0">
+              <a:buNone/>
+            </a:pPr>
+            <a:r>
+              <a:rPr lang="en-US" dirty="0"/>
+              <a:t>In general, keep references to the DI Container out of your logic (every layer). </a:t>
+            </a:r>
+          </a:p>
+          <a:p>
+            <a:pPr marL="0" indent="0">
+              <a:buNone/>
+            </a:pPr>
+            <a:r>
+              <a:rPr lang="en-US" dirty="0"/>
+              <a:t>Ideally, the DI Container is only used in the Composition Root, and maybe in few locations where object graphs need to be resolved dynamically, hidden behind an abstraction.</a:t>
+            </a:r>
+            <a:endParaRPr lang="de-DE" dirty="0"/>
+          </a:p>
+        </p:txBody>
+      </p:sp>
+      <p:sp>
+        <p:nvSpPr>
+          <p:cNvPr id="4" name="Date Placeholder 3">
+            <a:extLst>
+              <a:ext uri="{FF2B5EF4-FFF2-40B4-BE49-F238E27FC236}">
+                <a16:creationId xmlns:a16="http://schemas.microsoft.com/office/drawing/2014/main" id="{325B6DEB-5FBB-465D-B763-17ADF1EF9F8F}"/>
+              </a:ext>
+            </a:extLst>
+          </p:cNvPr>
+          <p:cNvSpPr>
+            <a:spLocks noGrp="1"/>
+          </p:cNvSpPr>
+          <p:nvPr>
+            <p:ph type="dt" sz="half" idx="11"/>
+          </p:nvPr>
+        </p:nvSpPr>
+        <p:spPr/>
+        <p:txBody>
+          <a:bodyPr/>
+          <a:lstStyle/>
+          <a:p>
+            <a:r>
+              <a:rPr lang="de-DE"/>
+              <a:t>19.09.2017</a:t>
+            </a:r>
+          </a:p>
+        </p:txBody>
+      </p:sp>
+      <p:sp>
+        <p:nvSpPr>
+          <p:cNvPr id="5" name="Slide Number Placeholder 4">
+            <a:extLst>
+              <a:ext uri="{FF2B5EF4-FFF2-40B4-BE49-F238E27FC236}">
+                <a16:creationId xmlns:a16="http://schemas.microsoft.com/office/drawing/2014/main" id="{2D2CA5D0-F246-4DBA-A323-CCD81D66C9FF}"/>
+              </a:ext>
+            </a:extLst>
+          </p:cNvPr>
+          <p:cNvSpPr>
+            <a:spLocks noGrp="1"/>
+          </p:cNvSpPr>
+          <p:nvPr>
+            <p:ph type="sldNum" sz="quarter" idx="13"/>
+          </p:nvPr>
+        </p:nvSpPr>
+        <p:spPr/>
+        <p:txBody>
+          <a:bodyPr/>
+          <a:lstStyle/>
+          <a:p>
+            <a:fld id="{3AA5FB2A-BCB4-4E64-AAE1-BAC1A8A5655D}" type="slidenum">
+              <a:rPr lang="de-DE" smtClean="0"/>
+              <a:pPr/>
+              <a:t>24</a:t>
+            </a:fld>
+            <a:endParaRPr lang="de-DE"/>
+          </a:p>
+        </p:txBody>
+      </p:sp>
+    </p:spTree>
+    <p:extLst>
+      <p:ext uri="{BB962C8B-B14F-4D97-AF65-F5344CB8AC3E}">
+        <p14:creationId xmlns:p14="http://schemas.microsoft.com/office/powerpoint/2010/main" val="1079108529"/>
+      </p:ext>
+    </p:extLst>
+  </p:cSld>
+  <p:clrMapOvr>
+    <a:masterClrMapping/>
+  </p:clrMapOvr>
+  <p:transition spd="med">
+    <p:pull/>
+  </p:transition>
+</p:sld>
+</file>
+
+<file path=ppt/slides/slide25.xml><?xml version="1.0" encoding="utf-8"?>
+<p:sld xmlns:a="http://schemas.openxmlformats.org/drawingml/2006/main" xmlns:r="http://schemas.openxmlformats.org/officeDocument/2006/relationships" xmlns:p="http://schemas.openxmlformats.org/presentationml/2006/main">
+  <p:cSld>
+    <p:spTree>
+      <p:nvGrpSpPr>
+        <p:cNvPr id="1" name=""/>
+        <p:cNvGrpSpPr/>
+        <p:nvPr/>
+      </p:nvGrpSpPr>
+      <p:grpSpPr>
+        <a:xfrm>
+          <a:off x="0" y="0"/>
+          <a:ext cx="0" cy="0"/>
+          <a:chOff x="0" y="0"/>
+          <a:chExt cx="0" cy="0"/>
+        </a:xfrm>
+      </p:grpSpPr>
+      <p:sp>
+        <p:nvSpPr>
+          <p:cNvPr id="2" name="Title 1">
+            <a:extLst>
+              <a:ext uri="{FF2B5EF4-FFF2-40B4-BE49-F238E27FC236}">
+                <a16:creationId xmlns:a16="http://schemas.microsoft.com/office/drawing/2014/main" id="{CE3A0733-CBFA-4B11-88ED-884FDE430253}"/>
               </a:ext>
             </a:extLst>
           </p:cNvPr>
@@ -19235,7 +19442,7 @@
           <a:p>
             <a:r>
               <a:rPr lang="en-US" dirty="0"/>
-              <a:t>Avoid Ambient Context</a:t>
+              <a:t>Use a Composition Root</a:t>
             </a:r>
             <a:endParaRPr lang="de-DE" dirty="0"/>
           </a:p>
@@ -19246,7 +19453,7 @@
           <p:cNvPr id="3" name="Content Placeholder 2">
             <a:extLst>
               <a:ext uri="{FF2B5EF4-FFF2-40B4-BE49-F238E27FC236}">
-                <a16:creationId xmlns:a16="http://schemas.microsoft.com/office/drawing/2014/main" id="{7432DBE7-403F-4D39-BDE5-B2B5C90C1002}"/>
+                <a16:creationId xmlns:a16="http://schemas.microsoft.com/office/drawing/2014/main" id="{CAE8452E-1AB8-45A7-B61D-86788DD230F8}"/>
               </a:ext>
             </a:extLst>
           </p:cNvPr>
@@ -19262,6 +19469,43 @@
           <a:bodyPr/>
           <a:lstStyle/>
           <a:p>
+            <a:pPr marL="0" indent="0">
+              <a:buNone/>
+            </a:pPr>
+            <a:r>
+              <a:rPr lang="en-US" dirty="0"/>
+              <a:t>Shortly after the entry point of your App (in Startup), place your Composition Root. It incorporates</a:t>
+            </a:r>
+          </a:p>
+          <a:p>
+            <a:r>
+              <a:rPr lang="en-US" dirty="0"/>
+              <a:t>a Register Phase</a:t>
+            </a:r>
+          </a:p>
+          <a:p>
+            <a:r>
+              <a:rPr lang="en-US" dirty="0"/>
+              <a:t>a Resolve Phase</a:t>
+            </a:r>
+          </a:p>
+          <a:p>
+            <a:r>
+              <a:rPr lang="en-US" dirty="0"/>
+              <a:t>a Release Phase</a:t>
+            </a:r>
+          </a:p>
+          <a:p>
+            <a:endParaRPr lang="en-US" dirty="0"/>
+          </a:p>
+          <a:p>
+            <a:pPr marL="0" indent="0">
+              <a:buNone/>
+            </a:pPr>
+            <a:r>
+              <a:rPr lang="en-US" dirty="0"/>
+              <a:t>Avoid consecutive Register -&gt; Resolve -&gt; Register -&gt; Resolve calls, as these can lead to hard-to-discover bugs.</a:t>
+            </a:r>
             <a:endParaRPr lang="de-DE" dirty="0"/>
           </a:p>
         </p:txBody>
@@ -19271,7 +19515,7 @@
           <p:cNvPr id="4" name="Date Placeholder 3">
             <a:extLst>
               <a:ext uri="{FF2B5EF4-FFF2-40B4-BE49-F238E27FC236}">
-                <a16:creationId xmlns:a16="http://schemas.microsoft.com/office/drawing/2014/main" id="{8E817B07-5F0A-4ADF-83B7-FF83CAE3E523}"/>
+                <a16:creationId xmlns:a16="http://schemas.microsoft.com/office/drawing/2014/main" id="{F3129DFC-4B68-4CAF-946F-45FBF74CA2EB}"/>
               </a:ext>
             </a:extLst>
           </p:cNvPr>
@@ -19299,7 +19543,7 @@
           <p:cNvPr id="5" name="Slide Number Placeholder 4">
             <a:extLst>
               <a:ext uri="{FF2B5EF4-FFF2-40B4-BE49-F238E27FC236}">
-                <a16:creationId xmlns:a16="http://schemas.microsoft.com/office/drawing/2014/main" id="{582F465E-6AE9-4F80-AC36-C5AA1DA064DD}"/>
+                <a16:creationId xmlns:a16="http://schemas.microsoft.com/office/drawing/2014/main" id="{C5EEC4A1-BDA8-46F0-AD20-63FDEF87BD1D}"/>
               </a:ext>
             </a:extLst>
           </p:cNvPr>
@@ -19318,7 +19562,7 @@
             <a:fld id="{3AA5FB2A-BCB4-4E64-AAE1-BAC1A8A5655D}" type="slidenum">
               <a:rPr lang="de-DE" smtClean="0"/>
               <a:pPr/>
-              <a:t>24</a:t>
+              <a:t>25</a:t>
             </a:fld>
             <a:endParaRPr lang="de-DE"/>
           </a:p>
@@ -19327,7 +19571,7 @@
     </p:spTree>
     <p:extLst>
       <p:ext uri="{BB962C8B-B14F-4D97-AF65-F5344CB8AC3E}">
-        <p14:creationId xmlns:p14="http://schemas.microsoft.com/office/powerpoint/2010/main" val="2037809699"/>
+        <p14:creationId xmlns:p14="http://schemas.microsoft.com/office/powerpoint/2010/main" val="1549651925"/>
       </p:ext>
     </p:extLst>
   </p:cSld>
@@ -19340,7 +19584,203 @@
 </p:sld>
 </file>
 
-<file path=ppt/slides/slide25.xml><?xml version="1.0" encoding="utf-8"?>
+<file path=ppt/slides/slide26.xml><?xml version="1.0" encoding="utf-8"?>
+<p:sld xmlns:a="http://schemas.openxmlformats.org/drawingml/2006/main" xmlns:r="http://schemas.openxmlformats.org/officeDocument/2006/relationships" xmlns:p="http://schemas.openxmlformats.org/presentationml/2006/main">
+  <p:cSld>
+    <p:spTree>
+      <p:nvGrpSpPr>
+        <p:cNvPr id="1" name=""/>
+        <p:cNvGrpSpPr/>
+        <p:nvPr/>
+      </p:nvGrpSpPr>
+      <p:grpSpPr>
+        <a:xfrm>
+          <a:off x="0" y="0"/>
+          <a:ext cx="0" cy="0"/>
+          <a:chOff x="0" y="0"/>
+          <a:chExt cx="0" cy="0"/>
+        </a:xfrm>
+      </p:grpSpPr>
+      <p:sp>
+        <p:nvSpPr>
+          <p:cNvPr id="2" name="Title 1">
+            <a:extLst>
+              <a:ext uri="{FF2B5EF4-FFF2-40B4-BE49-F238E27FC236}">
+                <a16:creationId xmlns:a16="http://schemas.microsoft.com/office/drawing/2014/main" id="{5B554FCC-3747-41A7-90C9-C19F0352D942}"/>
+              </a:ext>
+            </a:extLst>
+          </p:cNvPr>
+          <p:cNvSpPr>
+            <a:spLocks noGrp="1"/>
+          </p:cNvSpPr>
+          <p:nvPr>
+            <p:ph type="title"/>
+          </p:nvPr>
+        </p:nvSpPr>
+        <p:spPr>
+          <a:xfrm>
+            <a:off x="3071664" y="365125"/>
+            <a:ext cx="8282136" cy="1047651"/>
+          </a:xfrm>
+        </p:spPr>
+        <p:txBody>
+          <a:bodyPr/>
+          <a:lstStyle/>
+          <a:p>
+            <a:r>
+              <a:rPr lang="en-US" sz="3600" dirty="0"/>
+              <a:t>Let the DI Container Track Disposables</a:t>
+            </a:r>
+            <a:endParaRPr lang="de-DE" sz="3600" dirty="0"/>
+          </a:p>
+        </p:txBody>
+      </p:sp>
+      <p:sp>
+        <p:nvSpPr>
+          <p:cNvPr id="3" name="Content Placeholder 2">
+            <a:extLst>
+              <a:ext uri="{FF2B5EF4-FFF2-40B4-BE49-F238E27FC236}">
+                <a16:creationId xmlns:a16="http://schemas.microsoft.com/office/drawing/2014/main" id="{AC03A36A-042E-4BB7-864D-8C1B319C3D32}"/>
+              </a:ext>
+            </a:extLst>
+          </p:cNvPr>
+          <p:cNvSpPr>
+            <a:spLocks noGrp="1"/>
+          </p:cNvSpPr>
+          <p:nvPr>
+            <p:ph sz="quarter" idx="10"/>
+          </p:nvPr>
+        </p:nvSpPr>
+        <p:spPr/>
+        <p:txBody>
+          <a:bodyPr/>
+          <a:lstStyle/>
+          <a:p>
+            <a:pPr marL="0" indent="0">
+              <a:buNone/>
+            </a:pPr>
+            <a:r>
+              <a:rPr lang="en-US" dirty="0"/>
+              <a:t>DI Containers can check if a resolved object implements </a:t>
+            </a:r>
+            <a:r>
+              <a:rPr lang="en-US" dirty="0" err="1"/>
+              <a:t>IDisposable</a:t>
+            </a:r>
+            <a:r>
+              <a:rPr lang="en-US" dirty="0"/>
+              <a:t> and automatically dispose it when the Container itself is disposed.</a:t>
+            </a:r>
+          </a:p>
+          <a:p>
+            <a:pPr marL="0" indent="0">
+              <a:buNone/>
+            </a:pPr>
+            <a:r>
+              <a:rPr lang="en-US" dirty="0"/>
+              <a:t>Use Scopes / Child Containers to create a context where, at its end, all tracked disposables are disposed.</a:t>
+            </a:r>
+          </a:p>
+          <a:p>
+            <a:pPr marL="0" indent="0">
+              <a:buNone/>
+            </a:pPr>
+            <a:endParaRPr lang="en-US" dirty="0"/>
+          </a:p>
+          <a:p>
+            <a:r>
+              <a:rPr lang="en-US" dirty="0"/>
+              <a:t>No need to dispose manually</a:t>
+            </a:r>
+          </a:p>
+          <a:p>
+            <a:r>
+              <a:rPr lang="en-US" dirty="0"/>
+              <a:t>Especially useful for complex object graphs where its hard to navigate to the deeply nested </a:t>
+            </a:r>
+            <a:r>
+              <a:rPr lang="en-US" dirty="0" err="1"/>
+              <a:t>IDisposable</a:t>
+            </a:r>
+            <a:endParaRPr lang="de-DE" dirty="0"/>
+          </a:p>
+        </p:txBody>
+      </p:sp>
+      <p:sp>
+        <p:nvSpPr>
+          <p:cNvPr id="4" name="Date Placeholder 3">
+            <a:extLst>
+              <a:ext uri="{FF2B5EF4-FFF2-40B4-BE49-F238E27FC236}">
+                <a16:creationId xmlns:a16="http://schemas.microsoft.com/office/drawing/2014/main" id="{9CD82929-E59C-41A8-85E0-BA4422C04E9D}"/>
+              </a:ext>
+            </a:extLst>
+          </p:cNvPr>
+          <p:cNvSpPr>
+            <a:spLocks noGrp="1"/>
+          </p:cNvSpPr>
+          <p:nvPr>
+            <p:ph type="dt" sz="half" idx="11"/>
+          </p:nvPr>
+        </p:nvSpPr>
+        <p:spPr/>
+        <p:txBody>
+          <a:bodyPr/>
+          <a:lstStyle/>
+          <a:p>
+            <a:r>
+              <a:rPr lang="de-DE"/>
+              <a:t>19.09.2017</a:t>
+            </a:r>
+          </a:p>
+        </p:txBody>
+      </p:sp>
+      <p:sp>
+        <p:nvSpPr>
+          <p:cNvPr id="5" name="Slide Number Placeholder 4">
+            <a:extLst>
+              <a:ext uri="{FF2B5EF4-FFF2-40B4-BE49-F238E27FC236}">
+                <a16:creationId xmlns:a16="http://schemas.microsoft.com/office/drawing/2014/main" id="{D7408F14-AAF6-4625-A736-D95FB50ED801}"/>
+              </a:ext>
+            </a:extLst>
+          </p:cNvPr>
+          <p:cNvSpPr>
+            <a:spLocks noGrp="1"/>
+          </p:cNvSpPr>
+          <p:nvPr>
+            <p:ph type="sldNum" sz="quarter" idx="13"/>
+          </p:nvPr>
+        </p:nvSpPr>
+        <p:spPr/>
+        <p:txBody>
+          <a:bodyPr/>
+          <a:lstStyle/>
+          <a:p>
+            <a:fld id="{3AA5FB2A-BCB4-4E64-AAE1-BAC1A8A5655D}" type="slidenum">
+              <a:rPr lang="de-DE" smtClean="0"/>
+              <a:pPr/>
+              <a:t>26</a:t>
+            </a:fld>
+            <a:endParaRPr lang="de-DE"/>
+          </a:p>
+        </p:txBody>
+      </p:sp>
+    </p:spTree>
+    <p:extLst>
+      <p:ext uri="{BB962C8B-B14F-4D97-AF65-F5344CB8AC3E}">
+        <p14:creationId xmlns:p14="http://schemas.microsoft.com/office/powerpoint/2010/main" val="3490570979"/>
+      </p:ext>
+    </p:extLst>
+  </p:cSld>
+  <p:clrMapOvr>
+    <a:masterClrMapping/>
+  </p:clrMapOvr>
+  <p:transition spd="med">
+    <p:pull/>
+  </p:transition>
+</p:sld>
+</file>
+
+<file path=ppt/slides/slide27.xml><?xml version="1.0" encoding="utf-8"?>
 <p:sld xmlns:a="http://schemas.openxmlformats.org/drawingml/2006/main" xmlns:r="http://schemas.openxmlformats.org/officeDocument/2006/relationships" xmlns:p="http://schemas.openxmlformats.org/presentationml/2006/main">
   <p:cSld>
     <p:spTree>
@@ -19443,7 +19883,7 @@
             <a:fld id="{3AA5FB2A-BCB4-4E64-AAE1-BAC1A8A5655D}" type="slidenum">
               <a:rPr lang="de-DE" smtClean="0"/>
               <a:pPr/>
-              <a:t>25</a:t>
+              <a:t>27</a:t>
             </a:fld>
             <a:endParaRPr lang="de-DE"/>
           </a:p>
@@ -19495,7 +19935,164 @@
 </p:sld>
 </file>
 
-<file path=ppt/slides/slide26.xml><?xml version="1.0" encoding="utf-8"?>
+<file path=ppt/slides/slide28.xml><?xml version="1.0" encoding="utf-8"?>
+<p:sld xmlns:a="http://schemas.openxmlformats.org/drawingml/2006/main" xmlns:r="http://schemas.openxmlformats.org/officeDocument/2006/relationships" xmlns:p="http://schemas.openxmlformats.org/presentationml/2006/main">
+  <p:cSld>
+    <p:spTree>
+      <p:nvGrpSpPr>
+        <p:cNvPr id="1" name=""/>
+        <p:cNvGrpSpPr/>
+        <p:nvPr/>
+      </p:nvGrpSpPr>
+      <p:grpSpPr>
+        <a:xfrm>
+          <a:off x="0" y="0"/>
+          <a:ext cx="0" cy="0"/>
+          <a:chOff x="0" y="0"/>
+          <a:chExt cx="0" cy="0"/>
+        </a:xfrm>
+      </p:grpSpPr>
+      <p:sp>
+        <p:nvSpPr>
+          <p:cNvPr id="2" name="Title 1">
+            <a:extLst>
+              <a:ext uri="{FF2B5EF4-FFF2-40B4-BE49-F238E27FC236}">
+                <a16:creationId xmlns:a16="http://schemas.microsoft.com/office/drawing/2014/main" id="{33B2F00A-9C4C-4C77-A3C8-08843C46811E}"/>
+              </a:ext>
+            </a:extLst>
+          </p:cNvPr>
+          <p:cNvSpPr>
+            <a:spLocks noGrp="1"/>
+          </p:cNvSpPr>
+          <p:nvPr>
+            <p:ph type="title"/>
+          </p:nvPr>
+        </p:nvSpPr>
+        <p:spPr>
+          <a:xfrm>
+            <a:off x="2135560" y="365125"/>
+            <a:ext cx="9218240" cy="1047651"/>
+          </a:xfrm>
+        </p:spPr>
+        <p:txBody>
+          <a:bodyPr/>
+          <a:lstStyle/>
+          <a:p>
+            <a:r>
+              <a:rPr lang="en-US" dirty="0"/>
+              <a:t>Use a Proper DI Container</a:t>
+            </a:r>
+            <a:endParaRPr lang="de-DE" dirty="0"/>
+          </a:p>
+        </p:txBody>
+      </p:sp>
+      <p:sp>
+        <p:nvSpPr>
+          <p:cNvPr id="3" name="Content Placeholder 2">
+            <a:extLst>
+              <a:ext uri="{FF2B5EF4-FFF2-40B4-BE49-F238E27FC236}">
+                <a16:creationId xmlns:a16="http://schemas.microsoft.com/office/drawing/2014/main" id="{BEF93659-B3B2-427E-B47F-D1180CDE72B7}"/>
+              </a:ext>
+            </a:extLst>
+          </p:cNvPr>
+          <p:cNvSpPr>
+            <a:spLocks noGrp="1"/>
+          </p:cNvSpPr>
+          <p:nvPr>
+            <p:ph sz="quarter" idx="10"/>
+          </p:nvPr>
+        </p:nvSpPr>
+        <p:spPr/>
+        <p:txBody>
+          <a:bodyPr/>
+          <a:lstStyle/>
+          <a:p>
+            <a:pPr marL="0" indent="0">
+              <a:buNone/>
+            </a:pPr>
+            <a:r>
+              <a:rPr lang="en-US" dirty="0"/>
+              <a:t>The built-in DI Container of ASP.NET Core is a decent, fast implementation, but lacks features that fully-fledged DI Containers provide.</a:t>
+            </a:r>
+            <a:endParaRPr lang="de-DE" dirty="0"/>
+          </a:p>
+        </p:txBody>
+      </p:sp>
+      <p:sp>
+        <p:nvSpPr>
+          <p:cNvPr id="4" name="Date Placeholder 3">
+            <a:extLst>
+              <a:ext uri="{FF2B5EF4-FFF2-40B4-BE49-F238E27FC236}">
+                <a16:creationId xmlns:a16="http://schemas.microsoft.com/office/drawing/2014/main" id="{1A487D65-E058-4471-8562-821A4A31DD75}"/>
+              </a:ext>
+            </a:extLst>
+          </p:cNvPr>
+          <p:cNvSpPr>
+            <a:spLocks noGrp="1"/>
+          </p:cNvSpPr>
+          <p:nvPr>
+            <p:ph type="dt" sz="half" idx="11"/>
+          </p:nvPr>
+        </p:nvSpPr>
+        <p:spPr/>
+        <p:txBody>
+          <a:bodyPr/>
+          <a:lstStyle/>
+          <a:p>
+            <a:r>
+              <a:rPr lang="de-DE"/>
+              <a:t>19.09.2017</a:t>
+            </a:r>
+          </a:p>
+        </p:txBody>
+      </p:sp>
+      <p:sp>
+        <p:nvSpPr>
+          <p:cNvPr id="5" name="Slide Number Placeholder 4">
+            <a:extLst>
+              <a:ext uri="{FF2B5EF4-FFF2-40B4-BE49-F238E27FC236}">
+                <a16:creationId xmlns:a16="http://schemas.microsoft.com/office/drawing/2014/main" id="{E8880336-67D0-4F4C-87C3-CC7F6B260A41}"/>
+              </a:ext>
+            </a:extLst>
+          </p:cNvPr>
+          <p:cNvSpPr>
+            <a:spLocks noGrp="1"/>
+          </p:cNvSpPr>
+          <p:nvPr>
+            <p:ph type="sldNum" sz="quarter" idx="13"/>
+          </p:nvPr>
+        </p:nvSpPr>
+        <p:spPr/>
+        <p:txBody>
+          <a:bodyPr/>
+          <a:lstStyle/>
+          <a:p>
+            <a:fld id="{3AA5FB2A-BCB4-4E64-AAE1-BAC1A8A5655D}" type="slidenum">
+              <a:rPr lang="de-DE" smtClean="0"/>
+              <a:pPr/>
+              <a:t>28</a:t>
+            </a:fld>
+            <a:endParaRPr lang="de-DE"/>
+          </a:p>
+        </p:txBody>
+      </p:sp>
+    </p:spTree>
+    <p:extLst>
+      <p:ext uri="{BB962C8B-B14F-4D97-AF65-F5344CB8AC3E}">
+        <p14:creationId xmlns:p14="http://schemas.microsoft.com/office/powerpoint/2010/main" val="2994051835"/>
+      </p:ext>
+    </p:extLst>
+  </p:cSld>
+  <p:clrMapOvr>
+    <a:masterClrMapping/>
+  </p:clrMapOvr>
+  <p:transition spd="med">
+    <p:pull/>
+  </p:transition>
+</p:sld>
+</file>
+
+<file path=ppt/slides/slide29.xml><?xml version="1.0" encoding="utf-8"?>
 <p:sld xmlns:a="http://schemas.openxmlformats.org/drawingml/2006/main" xmlns:r="http://schemas.openxmlformats.org/officeDocument/2006/relationships" xmlns:p="http://schemas.openxmlformats.org/presentationml/2006/main">
   <p:cSld>
     <p:spTree>
@@ -19570,495 +20167,6 @@
     <p:extLst>
       <p:ext uri="{BB962C8B-B14F-4D97-AF65-F5344CB8AC3E}">
         <p14:creationId xmlns:p14="http://schemas.microsoft.com/office/powerpoint/2010/main" val="288764939"/>
-      </p:ext>
-    </p:extLst>
-  </p:cSld>
-  <p:clrMapOvr>
-    <a:masterClrMapping/>
-  </p:clrMapOvr>
-  <p:transition spd="med">
-    <p:pull/>
-  </p:transition>
-</p:sld>
-</file>
-
-<file path=ppt/slides/slide27.xml><?xml version="1.0" encoding="utf-8"?>
-<p:sld xmlns:a="http://schemas.openxmlformats.org/drawingml/2006/main" xmlns:r="http://schemas.openxmlformats.org/officeDocument/2006/relationships" xmlns:p="http://schemas.openxmlformats.org/presentationml/2006/main">
-  <p:cSld>
-    <p:spTree>
-      <p:nvGrpSpPr>
-        <p:cNvPr id="1" name=""/>
-        <p:cNvGrpSpPr/>
-        <p:nvPr/>
-      </p:nvGrpSpPr>
-      <p:grpSpPr>
-        <a:xfrm>
-          <a:off x="0" y="0"/>
-          <a:ext cx="0" cy="0"/>
-          <a:chOff x="0" y="0"/>
-          <a:chExt cx="0" cy="0"/>
-        </a:xfrm>
-      </p:grpSpPr>
-      <p:sp>
-        <p:nvSpPr>
-          <p:cNvPr id="4" name="Title 3">
-            <a:extLst>
-              <a:ext uri="{FF2B5EF4-FFF2-40B4-BE49-F238E27FC236}">
-                <a16:creationId xmlns:a16="http://schemas.microsoft.com/office/drawing/2014/main" id="{E3811CF3-F0C9-4BE0-97B5-95DEEF0027C1}"/>
-              </a:ext>
-            </a:extLst>
-          </p:cNvPr>
-          <p:cNvSpPr>
-            <a:spLocks noGrp="1"/>
-          </p:cNvSpPr>
-          <p:nvPr>
-            <p:ph type="title"/>
-          </p:nvPr>
-        </p:nvSpPr>
-        <p:spPr/>
-        <p:txBody>
-          <a:bodyPr/>
-          <a:lstStyle/>
-          <a:p>
-            <a:r>
-              <a:rPr lang="en-US" dirty="0"/>
-              <a:t>How Fast Are They?</a:t>
-            </a:r>
-            <a:endParaRPr lang="de-DE" dirty="0"/>
-          </a:p>
-        </p:txBody>
-      </p:sp>
-      <p:graphicFrame>
-        <p:nvGraphicFramePr>
-          <p:cNvPr id="6" name="Content Placeholder 10">
-            <a:extLst>
-              <a:ext uri="{FF2B5EF4-FFF2-40B4-BE49-F238E27FC236}">
-                <a16:creationId xmlns:a16="http://schemas.microsoft.com/office/drawing/2014/main" id="{19CF545E-FB59-4A9D-8F96-5C3271516DA9}"/>
-              </a:ext>
-            </a:extLst>
-          </p:cNvPr>
-          <p:cNvGraphicFramePr>
-            <a:graphicFrameLocks noGrp="1"/>
-          </p:cNvGraphicFramePr>
-          <p:nvPr>
-            <p:ph sz="quarter" idx="10"/>
-            <p:extLst>
-              <p:ext uri="{D42A27DB-BD31-4B8C-83A1-F6EECF244321}">
-                <p14:modId xmlns:p14="http://schemas.microsoft.com/office/powerpoint/2010/main" val="3908202477"/>
-              </p:ext>
-            </p:extLst>
-          </p:nvPr>
-        </p:nvGraphicFramePr>
-        <p:xfrm>
-          <a:off x="838200" y="1557338"/>
-          <a:ext cx="10515600" cy="4824412"/>
-        </p:xfrm>
-        <a:graphic>
-          <a:graphicData uri="http://schemas.openxmlformats.org/drawingml/2006/chart">
-            <c:chart xmlns:c="http://schemas.openxmlformats.org/drawingml/2006/chart" xmlns:r="http://schemas.openxmlformats.org/officeDocument/2006/relationships" r:id="rId2"/>
-          </a:graphicData>
-        </a:graphic>
-      </p:graphicFrame>
-      <p:sp>
-        <p:nvSpPr>
-          <p:cNvPr id="7" name="TextBox 6">
-            <a:extLst>
-              <a:ext uri="{FF2B5EF4-FFF2-40B4-BE49-F238E27FC236}">
-                <a16:creationId xmlns:a16="http://schemas.microsoft.com/office/drawing/2014/main" id="{F2CFFC49-5DAB-465F-B3A6-3A64080FB4D2}"/>
-              </a:ext>
-            </a:extLst>
-          </p:cNvPr>
-          <p:cNvSpPr txBox="1"/>
-          <p:nvPr/>
-        </p:nvSpPr>
-        <p:spPr>
-          <a:xfrm>
-            <a:off x="9449881" y="6023074"/>
-            <a:ext cx="1818703" cy="307777"/>
-          </a:xfrm>
-          <a:prstGeom prst="rect">
-            <a:avLst/>
-          </a:prstGeom>
-          <a:noFill/>
-        </p:spPr>
-        <p:txBody>
-          <a:bodyPr wrap="none" rtlCol="0">
-            <a:spAutoFit/>
-          </a:bodyPr>
-          <a:lstStyle/>
-          <a:p>
-            <a:r>
-              <a:rPr lang="de-DE" sz="1400" dirty="0"/>
-              <a:t>Source: </a:t>
-            </a:r>
-            <a:r>
-              <a:rPr lang="de-DE" sz="1400" dirty="0">
-                <a:hlinkClick r:id="rId3"/>
-              </a:rPr>
-              <a:t>palmmedia.de</a:t>
-            </a:r>
-            <a:endParaRPr lang="de-DE" sz="1400" dirty="0"/>
-          </a:p>
-        </p:txBody>
-      </p:sp>
-    </p:spTree>
-    <p:extLst>
-      <p:ext uri="{BB962C8B-B14F-4D97-AF65-F5344CB8AC3E}">
-        <p14:creationId xmlns:p14="http://schemas.microsoft.com/office/powerpoint/2010/main" val="3005403492"/>
-      </p:ext>
-    </p:extLst>
-  </p:cSld>
-  <p:clrMapOvr>
-    <a:masterClrMapping/>
-  </p:clrMapOvr>
-  <p:transition spd="med">
-    <p:pull/>
-  </p:transition>
-  <p:timing>
-    <p:tnLst>
-      <p:par>
-        <p:cTn id="1" dur="indefinite" restart="never" nodeType="tmRoot">
-          <p:childTnLst>
-            <p:seq concurrent="1" nextAc="seek">
-              <p:cTn id="2" dur="indefinite" nodeType="mainSeq">
-                <p:childTnLst>
-                  <p:par>
-                    <p:cTn id="3" fill="hold">
-                      <p:stCondLst>
-                        <p:cond delay="indefinite"/>
-                        <p:cond evt="onBegin" delay="0">
-                          <p:tn val="2"/>
-                        </p:cond>
-                      </p:stCondLst>
-                      <p:childTnLst>
-                        <p:par>
-                          <p:cTn id="4" fill="hold">
-                            <p:stCondLst>
-                              <p:cond delay="0"/>
-                            </p:stCondLst>
-                            <p:childTnLst>
-                              <p:par>
-                                <p:cTn id="5" presetID="10" presetClass="entr" presetSubtype="0" fill="hold" grpId="0" nodeType="withEffect">
-                                  <p:stCondLst>
-                                    <p:cond delay="0"/>
-                                  </p:stCondLst>
-                                  <p:childTnLst>
-                                    <p:set>
-                                      <p:cBhvr>
-                                        <p:cTn id="6" dur="1" fill="hold">
-                                          <p:stCondLst>
-                                            <p:cond delay="0"/>
-                                          </p:stCondLst>
-                                        </p:cTn>
-                                        <p:tgtEl>
-                                          <p:spTgt spid="7"/>
-                                        </p:tgtEl>
-                                        <p:attrNameLst>
-                                          <p:attrName>style.visibility</p:attrName>
-                                        </p:attrNameLst>
-                                      </p:cBhvr>
-                                      <p:to>
-                                        <p:strVal val="visible"/>
-                                      </p:to>
-                                    </p:set>
-                                    <p:animEffect transition="in" filter="fade">
-                                      <p:cBhvr>
-                                        <p:cTn id="7" dur="500"/>
-                                        <p:tgtEl>
-                                          <p:spTgt spid="7"/>
-                                        </p:tgtEl>
-                                      </p:cBhvr>
-                                    </p:animEffect>
-                                  </p:childTnLst>
-                                </p:cTn>
-                              </p:par>
-                            </p:childTnLst>
-                          </p:cTn>
-                        </p:par>
-                      </p:childTnLst>
-                    </p:cTn>
-                  </p:par>
-                </p:childTnLst>
-              </p:cTn>
-              <p:prevCondLst>
-                <p:cond evt="onPrev" delay="0">
-                  <p:tgtEl>
-                    <p:sldTgt/>
-                  </p:tgtEl>
-                </p:cond>
-              </p:prevCondLst>
-              <p:nextCondLst>
-                <p:cond evt="onNext" delay="0">
-                  <p:tgtEl>
-                    <p:sldTgt/>
-                  </p:tgtEl>
-                </p:cond>
-              </p:nextCondLst>
-            </p:seq>
-          </p:childTnLst>
-        </p:cTn>
-      </p:par>
-    </p:tnLst>
-    <p:bldLst>
-      <p:bldP spid="7" grpId="0"/>
-    </p:bldLst>
-  </p:timing>
-</p:sld>
-</file>
-
-<file path=ppt/slides/slide28.xml><?xml version="1.0" encoding="utf-8"?>
-<p:sld xmlns:a="http://schemas.openxmlformats.org/drawingml/2006/main" xmlns:r="http://schemas.openxmlformats.org/officeDocument/2006/relationships" xmlns:p="http://schemas.openxmlformats.org/presentationml/2006/main">
-  <p:cSld>
-    <p:spTree>
-      <p:nvGrpSpPr>
-        <p:cNvPr id="1" name=""/>
-        <p:cNvGrpSpPr/>
-        <p:nvPr/>
-      </p:nvGrpSpPr>
-      <p:grpSpPr>
-        <a:xfrm>
-          <a:off x="0" y="0"/>
-          <a:ext cx="0" cy="0"/>
-          <a:chOff x="0" y="0"/>
-          <a:chExt cx="0" cy="0"/>
-        </a:xfrm>
-      </p:grpSpPr>
-      <p:sp>
-        <p:nvSpPr>
-          <p:cNvPr id="6" name="Title 5">
-            <a:extLst>
-              <a:ext uri="{FF2B5EF4-FFF2-40B4-BE49-F238E27FC236}">
-                <a16:creationId xmlns:a16="http://schemas.microsoft.com/office/drawing/2014/main" id="{C541DF00-769F-4706-A42A-2B07B847ABF9}"/>
-              </a:ext>
-            </a:extLst>
-          </p:cNvPr>
-          <p:cNvSpPr>
-            <a:spLocks noGrp="1"/>
-          </p:cNvSpPr>
-          <p:nvPr>
-            <p:ph type="ctrTitle"/>
-          </p:nvPr>
-        </p:nvSpPr>
-        <p:spPr/>
-        <p:txBody>
-          <a:bodyPr/>
-          <a:lstStyle/>
-          <a:p>
-            <a:r>
-              <a:rPr lang="en-US" dirty="0"/>
-              <a:t>How Can Some Containers Be As Fast As Pure DI?</a:t>
-            </a:r>
-            <a:endParaRPr lang="de-DE" dirty="0"/>
-          </a:p>
-        </p:txBody>
-      </p:sp>
-      <p:sp>
-        <p:nvSpPr>
-          <p:cNvPr id="7" name="Subtitle 6">
-            <a:extLst>
-              <a:ext uri="{FF2B5EF4-FFF2-40B4-BE49-F238E27FC236}">
-                <a16:creationId xmlns:a16="http://schemas.microsoft.com/office/drawing/2014/main" id="{A61E535E-A7C6-4685-B030-7D6BF8E6452C}"/>
-              </a:ext>
-            </a:extLst>
-          </p:cNvPr>
-          <p:cNvSpPr>
-            <a:spLocks noGrp="1"/>
-          </p:cNvSpPr>
-          <p:nvPr>
-            <p:ph type="subTitle" idx="1"/>
-          </p:nvPr>
-        </p:nvSpPr>
-        <p:spPr/>
-        <p:txBody>
-          <a:bodyPr/>
-          <a:lstStyle/>
-          <a:p>
-            <a:r>
-              <a:rPr lang="en-US" sz="3600" dirty="0"/>
-              <a:t>Dynamic Compilation of Resolve Methods</a:t>
-            </a:r>
-            <a:endParaRPr lang="de-DE" sz="3600" dirty="0"/>
-          </a:p>
-        </p:txBody>
-      </p:sp>
-    </p:spTree>
-    <p:extLst>
-      <p:ext uri="{BB962C8B-B14F-4D97-AF65-F5344CB8AC3E}">
-        <p14:creationId xmlns:p14="http://schemas.microsoft.com/office/powerpoint/2010/main" val="2503891119"/>
-      </p:ext>
-    </p:extLst>
-  </p:cSld>
-  <p:clrMapOvr>
-    <a:masterClrMapping/>
-  </p:clrMapOvr>
-  <p:transition spd="med">
-    <p:pull/>
-  </p:transition>
-</p:sld>
-</file>
-
-<file path=ppt/slides/slide29.xml><?xml version="1.0" encoding="utf-8"?>
-<p:sld xmlns:a="http://schemas.openxmlformats.org/drawingml/2006/main" xmlns:r="http://schemas.openxmlformats.org/officeDocument/2006/relationships" xmlns:p="http://schemas.openxmlformats.org/presentationml/2006/main">
-  <p:cSld>
-    <p:spTree>
-      <p:nvGrpSpPr>
-        <p:cNvPr id="1" name=""/>
-        <p:cNvGrpSpPr/>
-        <p:nvPr/>
-      </p:nvGrpSpPr>
-      <p:grpSpPr>
-        <a:xfrm>
-          <a:off x="0" y="0"/>
-          <a:ext cx="0" cy="0"/>
-          <a:chOff x="0" y="0"/>
-          <a:chExt cx="0" cy="0"/>
-        </a:xfrm>
-      </p:grpSpPr>
-      <p:sp>
-        <p:nvSpPr>
-          <p:cNvPr id="6" name="Title 5">
-            <a:extLst>
-              <a:ext uri="{FF2B5EF4-FFF2-40B4-BE49-F238E27FC236}">
-                <a16:creationId xmlns:a16="http://schemas.microsoft.com/office/drawing/2014/main" id="{B8781E9B-0100-4568-86D4-8EDD5ED94D28}"/>
-              </a:ext>
-            </a:extLst>
-          </p:cNvPr>
-          <p:cNvSpPr>
-            <a:spLocks noGrp="1"/>
-          </p:cNvSpPr>
-          <p:nvPr>
-            <p:ph type="title"/>
-          </p:nvPr>
-        </p:nvSpPr>
-        <p:spPr>
-          <a:xfrm>
-            <a:off x="838200" y="735285"/>
-            <a:ext cx="10515600" cy="1325563"/>
-          </a:xfrm>
-        </p:spPr>
-        <p:txBody>
-          <a:bodyPr/>
-          <a:lstStyle/>
-          <a:p>
-            <a:r>
-              <a:rPr lang="en-US" dirty="0"/>
-              <a:t>Sources</a:t>
-            </a:r>
-            <a:endParaRPr lang="de-DE" dirty="0"/>
-          </a:p>
-        </p:txBody>
-      </p:sp>
-      <p:sp>
-        <p:nvSpPr>
-          <p:cNvPr id="7" name="Content Placeholder 6">
-            <a:extLst>
-              <a:ext uri="{FF2B5EF4-FFF2-40B4-BE49-F238E27FC236}">
-                <a16:creationId xmlns:a16="http://schemas.microsoft.com/office/drawing/2014/main" id="{7E98D094-E68E-439B-8A7B-4605B4898DFD}"/>
-              </a:ext>
-            </a:extLst>
-          </p:cNvPr>
-          <p:cNvSpPr>
-            <a:spLocks noGrp="1"/>
-          </p:cNvSpPr>
-          <p:nvPr>
-            <p:ph idx="1"/>
-          </p:nvPr>
-        </p:nvSpPr>
-        <p:spPr/>
-        <p:txBody>
-          <a:bodyPr/>
-          <a:lstStyle/>
-          <a:p>
-            <a:r>
-              <a:rPr lang="en-US" sz="2800" dirty="0"/>
-              <a:t>Mark Seemann: </a:t>
-            </a:r>
-            <a:br>
-              <a:rPr lang="en-US" sz="2800" dirty="0"/>
-            </a:br>
-            <a:r>
-              <a:rPr lang="en-US" sz="2800" dirty="0">
-                <a:hlinkClick r:id="rId2"/>
-              </a:rPr>
-              <a:t>Dependency Injection in .NET</a:t>
-            </a:r>
-            <a:r>
-              <a:rPr lang="en-US" sz="2800" dirty="0"/>
-              <a:t>, Manning, 2011</a:t>
-            </a:r>
-            <a:br>
-              <a:rPr lang="en-US" sz="2800" dirty="0"/>
-            </a:br>
-            <a:r>
-              <a:rPr lang="en-US" sz="2800" dirty="0">
-                <a:hlinkClick r:id="rId3"/>
-              </a:rPr>
-              <a:t>Mark </a:t>
-            </a:r>
-            <a:r>
-              <a:rPr lang="en-US" sz="2800" dirty="0" err="1">
-                <a:hlinkClick r:id="rId3"/>
-              </a:rPr>
-              <a:t>Seemann‘s</a:t>
-            </a:r>
-            <a:r>
-              <a:rPr lang="en-US" sz="2800" dirty="0">
-                <a:hlinkClick r:id="rId3"/>
-              </a:rPr>
-              <a:t> Blog</a:t>
-            </a:r>
-            <a:endParaRPr lang="en-US" sz="2800" dirty="0"/>
-          </a:p>
-          <a:p>
-            <a:r>
-              <a:rPr lang="en-US" sz="2800" dirty="0"/>
-              <a:t>Robert C. Martin (Uncle Bob): </a:t>
-            </a:r>
-            <a:br>
-              <a:rPr lang="en-US" sz="2800" dirty="0"/>
-            </a:br>
-            <a:r>
-              <a:rPr lang="en-US" sz="2800" dirty="0">
-                <a:hlinkClick r:id="rId4"/>
-              </a:rPr>
-              <a:t>The Dependency Inversion Principle</a:t>
-            </a:r>
-            <a:r>
-              <a:rPr lang="en-US" sz="2800" dirty="0"/>
-              <a:t>, in The C++ Report, 1996</a:t>
-            </a:r>
-          </a:p>
-          <a:p>
-            <a:r>
-              <a:rPr lang="en-US" sz="2800" dirty="0"/>
-              <a:t>Daniel Palme: </a:t>
-            </a:r>
-            <a:br>
-              <a:rPr lang="en-US" sz="2800" dirty="0"/>
-            </a:br>
-            <a:r>
-              <a:rPr lang="en-US" sz="2800" dirty="0" err="1">
-                <a:hlinkClick r:id="rId5"/>
-              </a:rPr>
-              <a:t>IoC</a:t>
-            </a:r>
-            <a:r>
-              <a:rPr lang="en-US" sz="2800" dirty="0">
-                <a:hlinkClick r:id="rId5"/>
-              </a:rPr>
-              <a:t> Container Benchmark – Performance Comparison</a:t>
-            </a:r>
-            <a:endParaRPr lang="en-US" sz="2800" dirty="0"/>
-          </a:p>
-          <a:p>
-            <a:endParaRPr lang="de-DE" dirty="0"/>
-          </a:p>
-        </p:txBody>
-      </p:sp>
-    </p:spTree>
-    <p:extLst>
-      <p:ext uri="{BB962C8B-B14F-4D97-AF65-F5344CB8AC3E}">
-        <p14:creationId xmlns:p14="http://schemas.microsoft.com/office/powerpoint/2010/main" val="3934572435"/>
       </p:ext>
     </p:extLst>
   </p:cSld>
@@ -20325,10 +20433,419 @@
       </p:grpSpPr>
       <p:sp>
         <p:nvSpPr>
-          <p:cNvPr id="5" name="Title 4">
+          <p:cNvPr id="4" name="Title 3">
             <a:extLst>
               <a:ext uri="{FF2B5EF4-FFF2-40B4-BE49-F238E27FC236}">
-                <a16:creationId xmlns:a16="http://schemas.microsoft.com/office/drawing/2014/main" id="{5B9B83E1-5259-47E1-9C93-379502F2FA2D}"/>
+                <a16:creationId xmlns:a16="http://schemas.microsoft.com/office/drawing/2014/main" id="{E3811CF3-F0C9-4BE0-97B5-95DEEF0027C1}"/>
+              </a:ext>
+            </a:extLst>
+          </p:cNvPr>
+          <p:cNvSpPr>
+            <a:spLocks noGrp="1"/>
+          </p:cNvSpPr>
+          <p:nvPr>
+            <p:ph type="title"/>
+          </p:nvPr>
+        </p:nvSpPr>
+        <p:spPr/>
+        <p:txBody>
+          <a:bodyPr/>
+          <a:lstStyle/>
+          <a:p>
+            <a:r>
+              <a:rPr lang="en-US" dirty="0"/>
+              <a:t>How Fast Are They?</a:t>
+            </a:r>
+            <a:endParaRPr lang="de-DE" dirty="0"/>
+          </a:p>
+        </p:txBody>
+      </p:sp>
+      <p:graphicFrame>
+        <p:nvGraphicFramePr>
+          <p:cNvPr id="6" name="Content Placeholder 10">
+            <a:extLst>
+              <a:ext uri="{FF2B5EF4-FFF2-40B4-BE49-F238E27FC236}">
+                <a16:creationId xmlns:a16="http://schemas.microsoft.com/office/drawing/2014/main" id="{19CF545E-FB59-4A9D-8F96-5C3271516DA9}"/>
+              </a:ext>
+            </a:extLst>
+          </p:cNvPr>
+          <p:cNvGraphicFramePr>
+            <a:graphicFrameLocks noGrp="1"/>
+          </p:cNvGraphicFramePr>
+          <p:nvPr>
+            <p:ph sz="quarter" idx="10"/>
+            <p:extLst>
+              <p:ext uri="{D42A27DB-BD31-4B8C-83A1-F6EECF244321}">
+                <p14:modId xmlns:p14="http://schemas.microsoft.com/office/powerpoint/2010/main" val="3547506492"/>
+              </p:ext>
+            </p:extLst>
+          </p:nvPr>
+        </p:nvGraphicFramePr>
+        <p:xfrm>
+          <a:off x="838200" y="1557338"/>
+          <a:ext cx="10515600" cy="4824412"/>
+        </p:xfrm>
+        <a:graphic>
+          <a:graphicData uri="http://schemas.openxmlformats.org/drawingml/2006/chart">
+            <c:chart xmlns:c="http://schemas.openxmlformats.org/drawingml/2006/chart" xmlns:r="http://schemas.openxmlformats.org/officeDocument/2006/relationships" r:id="rId2"/>
+          </a:graphicData>
+        </a:graphic>
+      </p:graphicFrame>
+      <p:sp>
+        <p:nvSpPr>
+          <p:cNvPr id="7" name="TextBox 6">
+            <a:extLst>
+              <a:ext uri="{FF2B5EF4-FFF2-40B4-BE49-F238E27FC236}">
+                <a16:creationId xmlns:a16="http://schemas.microsoft.com/office/drawing/2014/main" id="{F2CFFC49-5DAB-465F-B3A6-3A64080FB4D2}"/>
+              </a:ext>
+            </a:extLst>
+          </p:cNvPr>
+          <p:cNvSpPr txBox="1"/>
+          <p:nvPr/>
+        </p:nvSpPr>
+        <p:spPr>
+          <a:xfrm>
+            <a:off x="9449881" y="6023074"/>
+            <a:ext cx="1818703" cy="307777"/>
+          </a:xfrm>
+          <a:prstGeom prst="rect">
+            <a:avLst/>
+          </a:prstGeom>
+          <a:noFill/>
+        </p:spPr>
+        <p:txBody>
+          <a:bodyPr wrap="none" rtlCol="0">
+            <a:spAutoFit/>
+          </a:bodyPr>
+          <a:lstStyle/>
+          <a:p>
+            <a:r>
+              <a:rPr lang="de-DE" sz="1400" dirty="0"/>
+              <a:t>Source: </a:t>
+            </a:r>
+            <a:r>
+              <a:rPr lang="de-DE" sz="1400" dirty="0">
+                <a:hlinkClick r:id="rId3"/>
+              </a:rPr>
+              <a:t>palmmedia.de</a:t>
+            </a:r>
+            <a:endParaRPr lang="de-DE" sz="1400" dirty="0"/>
+          </a:p>
+        </p:txBody>
+      </p:sp>
+    </p:spTree>
+    <p:extLst>
+      <p:ext uri="{BB962C8B-B14F-4D97-AF65-F5344CB8AC3E}">
+        <p14:creationId xmlns:p14="http://schemas.microsoft.com/office/powerpoint/2010/main" val="3005403492"/>
+      </p:ext>
+    </p:extLst>
+  </p:cSld>
+  <p:clrMapOvr>
+    <a:masterClrMapping/>
+  </p:clrMapOvr>
+  <p:transition spd="med">
+    <p:pull/>
+  </p:transition>
+  <p:timing>
+    <p:tnLst>
+      <p:par>
+        <p:cTn id="1" dur="indefinite" restart="never" nodeType="tmRoot">
+          <p:childTnLst>
+            <p:seq concurrent="1" nextAc="seek">
+              <p:cTn id="2" dur="indefinite" nodeType="mainSeq">
+                <p:childTnLst>
+                  <p:par>
+                    <p:cTn id="3" fill="hold">
+                      <p:stCondLst>
+                        <p:cond delay="indefinite"/>
+                        <p:cond evt="onBegin" delay="0">
+                          <p:tn val="2"/>
+                        </p:cond>
+                      </p:stCondLst>
+                      <p:childTnLst>
+                        <p:par>
+                          <p:cTn id="4" fill="hold">
+                            <p:stCondLst>
+                              <p:cond delay="0"/>
+                            </p:stCondLst>
+                            <p:childTnLst>
+                              <p:par>
+                                <p:cTn id="5" presetID="10" presetClass="entr" presetSubtype="0" fill="hold" grpId="0" nodeType="withEffect">
+                                  <p:stCondLst>
+                                    <p:cond delay="0"/>
+                                  </p:stCondLst>
+                                  <p:childTnLst>
+                                    <p:set>
+                                      <p:cBhvr>
+                                        <p:cTn id="6" dur="1" fill="hold">
+                                          <p:stCondLst>
+                                            <p:cond delay="0"/>
+                                          </p:stCondLst>
+                                        </p:cTn>
+                                        <p:tgtEl>
+                                          <p:spTgt spid="7"/>
+                                        </p:tgtEl>
+                                        <p:attrNameLst>
+                                          <p:attrName>style.visibility</p:attrName>
+                                        </p:attrNameLst>
+                                      </p:cBhvr>
+                                      <p:to>
+                                        <p:strVal val="visible"/>
+                                      </p:to>
+                                    </p:set>
+                                    <p:animEffect transition="in" filter="fade">
+                                      <p:cBhvr>
+                                        <p:cTn id="7" dur="500"/>
+                                        <p:tgtEl>
+                                          <p:spTgt spid="7"/>
+                                        </p:tgtEl>
+                                      </p:cBhvr>
+                                    </p:animEffect>
+                                  </p:childTnLst>
+                                </p:cTn>
+                              </p:par>
+                            </p:childTnLst>
+                          </p:cTn>
+                        </p:par>
+                      </p:childTnLst>
+                    </p:cTn>
+                  </p:par>
+                </p:childTnLst>
+              </p:cTn>
+              <p:prevCondLst>
+                <p:cond evt="onPrev" delay="0">
+                  <p:tgtEl>
+                    <p:sldTgt/>
+                  </p:tgtEl>
+                </p:cond>
+              </p:prevCondLst>
+              <p:nextCondLst>
+                <p:cond evt="onNext" delay="0">
+                  <p:tgtEl>
+                    <p:sldTgt/>
+                  </p:tgtEl>
+                </p:cond>
+              </p:nextCondLst>
+            </p:seq>
+          </p:childTnLst>
+        </p:cTn>
+      </p:par>
+    </p:tnLst>
+    <p:bldLst>
+      <p:bldP spid="7" grpId="0"/>
+    </p:bldLst>
+  </p:timing>
+</p:sld>
+</file>
+
+<file path=ppt/slides/slide31.xml><?xml version="1.0" encoding="utf-8"?>
+<p:sld xmlns:a="http://schemas.openxmlformats.org/drawingml/2006/main" xmlns:r="http://schemas.openxmlformats.org/officeDocument/2006/relationships" xmlns:p="http://schemas.openxmlformats.org/presentationml/2006/main">
+  <p:cSld>
+    <p:spTree>
+      <p:nvGrpSpPr>
+        <p:cNvPr id="1" name=""/>
+        <p:cNvGrpSpPr/>
+        <p:nvPr/>
+      </p:nvGrpSpPr>
+      <p:grpSpPr>
+        <a:xfrm>
+          <a:off x="0" y="0"/>
+          <a:ext cx="0" cy="0"/>
+          <a:chOff x="0" y="0"/>
+          <a:chExt cx="0" cy="0"/>
+        </a:xfrm>
+      </p:grpSpPr>
+      <p:sp>
+        <p:nvSpPr>
+          <p:cNvPr id="6" name="Title 5">
+            <a:extLst>
+              <a:ext uri="{FF2B5EF4-FFF2-40B4-BE49-F238E27FC236}">
+                <a16:creationId xmlns:a16="http://schemas.microsoft.com/office/drawing/2014/main" id="{C541DF00-769F-4706-A42A-2B07B847ABF9}"/>
+              </a:ext>
+            </a:extLst>
+          </p:cNvPr>
+          <p:cNvSpPr>
+            <a:spLocks noGrp="1"/>
+          </p:cNvSpPr>
+          <p:nvPr>
+            <p:ph type="ctrTitle"/>
+          </p:nvPr>
+        </p:nvSpPr>
+        <p:spPr/>
+        <p:txBody>
+          <a:bodyPr/>
+          <a:lstStyle/>
+          <a:p>
+            <a:r>
+              <a:rPr lang="en-US" dirty="0"/>
+              <a:t>How Can Some Containers Be As Fast As Pure DI?</a:t>
+            </a:r>
+            <a:endParaRPr lang="de-DE" dirty="0"/>
+          </a:p>
+        </p:txBody>
+      </p:sp>
+      <p:sp>
+        <p:nvSpPr>
+          <p:cNvPr id="7" name="Subtitle 6">
+            <a:extLst>
+              <a:ext uri="{FF2B5EF4-FFF2-40B4-BE49-F238E27FC236}">
+                <a16:creationId xmlns:a16="http://schemas.microsoft.com/office/drawing/2014/main" id="{A61E535E-A7C6-4685-B030-7D6BF8E6452C}"/>
+              </a:ext>
+            </a:extLst>
+          </p:cNvPr>
+          <p:cNvSpPr>
+            <a:spLocks noGrp="1"/>
+          </p:cNvSpPr>
+          <p:nvPr>
+            <p:ph type="subTitle" idx="1"/>
+          </p:nvPr>
+        </p:nvSpPr>
+        <p:spPr/>
+        <p:txBody>
+          <a:bodyPr/>
+          <a:lstStyle/>
+          <a:p>
+            <a:r>
+              <a:rPr lang="en-US" sz="3600" dirty="0"/>
+              <a:t>Dynamic Compilation of Resolve Methods</a:t>
+            </a:r>
+            <a:endParaRPr lang="de-DE" sz="3600" dirty="0"/>
+          </a:p>
+        </p:txBody>
+      </p:sp>
+    </p:spTree>
+    <p:extLst>
+      <p:ext uri="{BB962C8B-B14F-4D97-AF65-F5344CB8AC3E}">
+        <p14:creationId xmlns:p14="http://schemas.microsoft.com/office/powerpoint/2010/main" val="2503891119"/>
+      </p:ext>
+    </p:extLst>
+  </p:cSld>
+  <p:clrMapOvr>
+    <a:masterClrMapping/>
+  </p:clrMapOvr>
+  <p:transition spd="med">
+    <p:pull/>
+  </p:transition>
+  <p:timing>
+    <p:tnLst>
+      <p:par>
+        <p:cTn id="1" dur="indefinite" restart="never" nodeType="tmRoot">
+          <p:childTnLst>
+            <p:seq concurrent="1" nextAc="seek">
+              <p:cTn id="2" dur="indefinite" nodeType="mainSeq">
+                <p:childTnLst>
+                  <p:par>
+                    <p:cTn id="3" fill="hold">
+                      <p:stCondLst>
+                        <p:cond delay="indefinite"/>
+                      </p:stCondLst>
+                      <p:childTnLst>
+                        <p:par>
+                          <p:cTn id="4" fill="hold">
+                            <p:stCondLst>
+                              <p:cond delay="0"/>
+                            </p:stCondLst>
+                            <p:childTnLst>
+                              <p:par>
+                                <p:cTn id="5" presetID="10" presetClass="entr" presetSubtype="0" fill="hold" grpId="0" nodeType="clickEffect">
+                                  <p:stCondLst>
+                                    <p:cond delay="0"/>
+                                  </p:stCondLst>
+                                  <p:childTnLst>
+                                    <p:set>
+                                      <p:cBhvr>
+                                        <p:cTn id="6" dur="1" fill="hold">
+                                          <p:stCondLst>
+                                            <p:cond delay="0"/>
+                                          </p:stCondLst>
+                                        </p:cTn>
+                                        <p:tgtEl>
+                                          <p:spTgt spid="7">
+                                            <p:txEl>
+                                              <p:pRg st="0" end="0"/>
+                                            </p:txEl>
+                                          </p:spTgt>
+                                        </p:tgtEl>
+                                        <p:attrNameLst>
+                                          <p:attrName>style.visibility</p:attrName>
+                                        </p:attrNameLst>
+                                      </p:cBhvr>
+                                      <p:to>
+                                        <p:strVal val="visible"/>
+                                      </p:to>
+                                    </p:set>
+                                    <p:animEffect transition="in" filter="fade">
+                                      <p:cBhvr>
+                                        <p:cTn id="7" dur="500"/>
+                                        <p:tgtEl>
+                                          <p:spTgt spid="7">
+                                            <p:txEl>
+                                              <p:pRg st="0" end="0"/>
+                                            </p:txEl>
+                                          </p:spTgt>
+                                        </p:tgtEl>
+                                      </p:cBhvr>
+                                    </p:animEffect>
+                                  </p:childTnLst>
+                                </p:cTn>
+                              </p:par>
+                            </p:childTnLst>
+                          </p:cTn>
+                        </p:par>
+                      </p:childTnLst>
+                    </p:cTn>
+                  </p:par>
+                </p:childTnLst>
+              </p:cTn>
+              <p:prevCondLst>
+                <p:cond evt="onPrev" delay="0">
+                  <p:tgtEl>
+                    <p:sldTgt/>
+                  </p:tgtEl>
+                </p:cond>
+              </p:prevCondLst>
+              <p:nextCondLst>
+                <p:cond evt="onNext" delay="0">
+                  <p:tgtEl>
+                    <p:sldTgt/>
+                  </p:tgtEl>
+                </p:cond>
+              </p:nextCondLst>
+            </p:seq>
+          </p:childTnLst>
+        </p:cTn>
+      </p:par>
+    </p:tnLst>
+    <p:bldLst>
+      <p:bldP spid="7" grpId="0" build="p"/>
+    </p:bldLst>
+  </p:timing>
+</p:sld>
+</file>
+
+<file path=ppt/slides/slide32.xml><?xml version="1.0" encoding="utf-8"?>
+<p:sld xmlns:a="http://schemas.openxmlformats.org/drawingml/2006/main" xmlns:r="http://schemas.openxmlformats.org/officeDocument/2006/relationships" xmlns:p="http://schemas.openxmlformats.org/presentationml/2006/main">
+  <p:cSld>
+    <p:spTree>
+      <p:nvGrpSpPr>
+        <p:cNvPr id="1" name=""/>
+        <p:cNvGrpSpPr/>
+        <p:nvPr/>
+      </p:nvGrpSpPr>
+      <p:grpSpPr>
+        <a:xfrm>
+          <a:off x="0" y="0"/>
+          <a:ext cx="0" cy="0"/>
+          <a:chOff x="0" y="0"/>
+          <a:chExt cx="0" cy="0"/>
+        </a:xfrm>
+      </p:grpSpPr>
+      <p:sp>
+        <p:nvSpPr>
+          <p:cNvPr id="6" name="Title 5">
+            <a:extLst>
+              <a:ext uri="{FF2B5EF4-FFF2-40B4-BE49-F238E27FC236}">
+                <a16:creationId xmlns:a16="http://schemas.microsoft.com/office/drawing/2014/main" id="{B8781E9B-0100-4568-86D4-8EDD5ED94D28}"/>
               </a:ext>
             </a:extLst>
           </p:cNvPr>
@@ -20351,7 +20868,7 @@
           <a:p>
             <a:r>
               <a:rPr lang="en-US" dirty="0"/>
-              <a:t>Image Contributions</a:t>
+              <a:t>Sources</a:t>
             </a:r>
             <a:endParaRPr lang="de-DE" dirty="0"/>
           </a:p>
@@ -20359,10 +20876,10 @@
       </p:sp>
       <p:sp>
         <p:nvSpPr>
-          <p:cNvPr id="6" name="Content Placeholder 5">
+          <p:cNvPr id="7" name="Content Placeholder 6">
             <a:extLst>
               <a:ext uri="{FF2B5EF4-FFF2-40B4-BE49-F238E27FC236}">
-                <a16:creationId xmlns:a16="http://schemas.microsoft.com/office/drawing/2014/main" id="{8533A17D-A73E-41BD-B23C-CD84AF992947}"/>
+                <a16:creationId xmlns:a16="http://schemas.microsoft.com/office/drawing/2014/main" id="{7E98D094-E68E-439B-8A7B-4605B4898DFD}"/>
               </a:ext>
             </a:extLst>
           </p:cNvPr>
@@ -20379,37 +20896,85 @@
           <a:lstStyle/>
           <a:p>
             <a:r>
-              <a:rPr lang="en-US" dirty="0"/>
-              <a:t>CPUs: </a:t>
-            </a:r>
-            <a:r>
-              <a:rPr lang="en-US" dirty="0">
+              <a:rPr lang="en-US" sz="2800" dirty="0"/>
+              <a:t>Mark Seemann: </a:t>
+            </a:r>
+            <a:br>
+              <a:rPr lang="en-US" sz="2800" dirty="0"/>
+            </a:br>
+            <a:r>
+              <a:rPr lang="en-US" sz="2800" dirty="0">
                 <a:hlinkClick r:id="rId2"/>
               </a:rPr>
-              <a:t>https://namu.wiki/w/CPU</a:t>
-            </a:r>
-            <a:endParaRPr lang="en-US" dirty="0"/>
-          </a:p>
-          <a:p>
-            <a:r>
-              <a:rPr lang="en-US" dirty="0"/>
-              <a:t>Ball of Wool: Tim </a:t>
-            </a:r>
-            <a:r>
-              <a:rPr lang="en-US" dirty="0" err="1"/>
-              <a:t>Reckmann</a:t>
-            </a:r>
-            <a:r>
-              <a:rPr lang="en-US" dirty="0"/>
-              <a:t> </a:t>
-            </a:r>
-            <a:r>
-              <a:rPr lang="en-US" dirty="0">
+              <a:t>Dependency Injection in .NET</a:t>
+            </a:r>
+            <a:r>
+              <a:rPr lang="en-US" sz="2800" dirty="0"/>
+              <a:t>, Manning, 2011</a:t>
+            </a:r>
+            <a:br>
+              <a:rPr lang="en-US" sz="2800" dirty="0"/>
+            </a:br>
+            <a:r>
+              <a:rPr lang="en-US" sz="2800" dirty="0">
                 <a:hlinkClick r:id="rId3"/>
               </a:rPr>
-              <a:t>https://www.flickr.com/photos/foto_db/16252248370</a:t>
-            </a:r>
-            <a:endParaRPr lang="en-US" dirty="0"/>
+              <a:t>Mark </a:t>
+            </a:r>
+            <a:r>
+              <a:rPr lang="en-US" sz="2800" dirty="0" err="1">
+                <a:hlinkClick r:id="rId3"/>
+              </a:rPr>
+              <a:t>Seemann‘s</a:t>
+            </a:r>
+            <a:r>
+              <a:rPr lang="en-US" sz="2800" dirty="0">
+                <a:hlinkClick r:id="rId3"/>
+              </a:rPr>
+              <a:t> Blog</a:t>
+            </a:r>
+            <a:endParaRPr lang="en-US" sz="2800" dirty="0"/>
+          </a:p>
+          <a:p>
+            <a:r>
+              <a:rPr lang="en-US" sz="2800" dirty="0"/>
+              <a:t>Robert C. Martin (Uncle Bob): </a:t>
+            </a:r>
+            <a:br>
+              <a:rPr lang="en-US" sz="2800" dirty="0"/>
+            </a:br>
+            <a:r>
+              <a:rPr lang="en-US" sz="2800" dirty="0">
+                <a:hlinkClick r:id="rId4"/>
+              </a:rPr>
+              <a:t>The Dependency Inversion Principle</a:t>
+            </a:r>
+            <a:r>
+              <a:rPr lang="en-US" sz="2800" dirty="0"/>
+              <a:t>, The C++ Report, 1996</a:t>
+            </a:r>
+          </a:p>
+          <a:p>
+            <a:r>
+              <a:rPr lang="en-US" sz="2800" dirty="0"/>
+              <a:t>Daniel Palme: </a:t>
+            </a:r>
+            <a:br>
+              <a:rPr lang="en-US" sz="2800" dirty="0"/>
+            </a:br>
+            <a:r>
+              <a:rPr lang="en-US" sz="2800" dirty="0" err="1">
+                <a:hlinkClick r:id="rId5"/>
+              </a:rPr>
+              <a:t>IoC</a:t>
+            </a:r>
+            <a:r>
+              <a:rPr lang="en-US" sz="2800" dirty="0">
+                <a:hlinkClick r:id="rId5"/>
+              </a:rPr>
+              <a:t> Container Benchmark – Performance Comparison</a:t>
+            </a:r>
+            <a:endParaRPr lang="en-US" sz="2800" dirty="0"/>
           </a:p>
           <a:p>
             <a:endParaRPr lang="de-DE" dirty="0"/>
@@ -20419,7 +20984,7 @@
     </p:spTree>
     <p:extLst>
       <p:ext uri="{BB962C8B-B14F-4D97-AF65-F5344CB8AC3E}">
-        <p14:creationId xmlns:p14="http://schemas.microsoft.com/office/powerpoint/2010/main" val="3335817011"/>
+        <p14:creationId xmlns:p14="http://schemas.microsoft.com/office/powerpoint/2010/main" val="3934572435"/>
       </p:ext>
     </p:extLst>
   </p:cSld>
@@ -20432,7 +20997,7 @@
 </p:sld>
 </file>
 
-<file path=ppt/slides/slide31.xml><?xml version="1.0" encoding="utf-8"?>
+<file path=ppt/slides/slide33.xml><?xml version="1.0" encoding="utf-8"?>
 <p:sld xmlns:a="http://schemas.openxmlformats.org/drawingml/2006/main" xmlns:r="http://schemas.openxmlformats.org/officeDocument/2006/relationships" xmlns:p="http://schemas.openxmlformats.org/presentationml/2006/main">
   <p:cSld>
     <p:spTree>
@@ -20542,7 +21107,7 @@
 </p:sld>
 </file>
 
-<file path=ppt/slides/slide32.xml><?xml version="1.0" encoding="utf-8"?>
+<file path=ppt/slides/slide34.xml><?xml version="1.0" encoding="utf-8"?>
 <p:sld xmlns:a="http://schemas.openxmlformats.org/drawingml/2006/main" xmlns:r="http://schemas.openxmlformats.org/officeDocument/2006/relationships" xmlns:p="http://schemas.openxmlformats.org/presentationml/2006/main">
   <p:cSld>
     <p:spTree>
@@ -20625,7 +21190,7 @@
 </p:sld>
 </file>
 
-<file path=ppt/slides/slide33.xml><?xml version="1.0" encoding="utf-8"?>
+<file path=ppt/slides/slide35.xml><?xml version="1.0" encoding="utf-8"?>
 <p:sld xmlns:a="http://schemas.openxmlformats.org/drawingml/2006/main" xmlns:r="http://schemas.openxmlformats.org/officeDocument/2006/relationships" xmlns:p="http://schemas.openxmlformats.org/presentationml/2006/main">
   <p:cSld>
     <p:spTree>

</xml_diff>

<commit_message>
fixed CodeSnippets, updaetd presentation with DI at the boundary
</commit_message>
<xml_diff>
--- a/ADC Core 2017 - Designing ASP.NET Core Apps with Dependency Injection in Mind.pptx
+++ b/ADC Core 2017 - Designing ASP.NET Core Apps with Dependency Injection in Mind.pptx
@@ -5,10 +5,10 @@
     <p:sldMasterId id="2147483648" r:id="rId1"/>
   </p:sldMasterIdLst>
   <p:notesMasterIdLst>
-    <p:notesMasterId r:id="rId37"/>
+    <p:notesMasterId r:id="rId43"/>
   </p:notesMasterIdLst>
   <p:handoutMasterIdLst>
-    <p:handoutMasterId r:id="rId38"/>
+    <p:handoutMasterId r:id="rId44"/>
   </p:handoutMasterIdLst>
   <p:sldIdLst>
     <p:sldId id="256" r:id="rId2"/>
@@ -31,21 +31,27 @@
     <p:sldId id="312" r:id="rId19"/>
     <p:sldId id="313" r:id="rId20"/>
     <p:sldId id="314" r:id="rId21"/>
-    <p:sldId id="316" r:id="rId22"/>
-    <p:sldId id="319" r:id="rId23"/>
-    <p:sldId id="318" r:id="rId24"/>
+    <p:sldId id="318" r:id="rId22"/>
+    <p:sldId id="316" r:id="rId23"/>
+    <p:sldId id="319" r:id="rId24"/>
     <p:sldId id="324" r:id="rId25"/>
     <p:sldId id="315" r:id="rId26"/>
     <p:sldId id="325" r:id="rId27"/>
-    <p:sldId id="320" r:id="rId28"/>
-    <p:sldId id="326" r:id="rId29"/>
-    <p:sldId id="321" r:id="rId30"/>
-    <p:sldId id="322" r:id="rId31"/>
-    <p:sldId id="323" r:id="rId32"/>
-    <p:sldId id="298" r:id="rId33"/>
-    <p:sldId id="299" r:id="rId34"/>
-    <p:sldId id="258" r:id="rId35"/>
-    <p:sldId id="261" r:id="rId36"/>
+    <p:sldId id="332" r:id="rId28"/>
+    <p:sldId id="320" r:id="rId29"/>
+    <p:sldId id="326" r:id="rId30"/>
+    <p:sldId id="327" r:id="rId31"/>
+    <p:sldId id="328" r:id="rId32"/>
+    <p:sldId id="329" r:id="rId33"/>
+    <p:sldId id="330" r:id="rId34"/>
+    <p:sldId id="331" r:id="rId35"/>
+    <p:sldId id="321" r:id="rId36"/>
+    <p:sldId id="322" r:id="rId37"/>
+    <p:sldId id="323" r:id="rId38"/>
+    <p:sldId id="298" r:id="rId39"/>
+    <p:sldId id="299" r:id="rId40"/>
+    <p:sldId id="258" r:id="rId41"/>
+    <p:sldId id="261" r:id="rId42"/>
   </p:sldIdLst>
   <p:sldSz cx="12192000" cy="6858000"/>
   <p:notesSz cx="6858000" cy="9144000"/>
@@ -275,7 +281,7 @@
               <a:cs typeface="+mn-cs"/>
             </a:defRPr>
           </a:pPr>
-          <a:endParaRPr lang="de-DE"/>
+          <a:endParaRPr lang="en-US"/>
         </a:p>
       </c:txPr>
     </c:title>
@@ -357,7 +363,7 @@
                     <a:cs typeface="+mn-cs"/>
                   </a:defRPr>
                 </a:pPr>
-                <a:endParaRPr lang="de-DE"/>
+                <a:endParaRPr lang="en-US"/>
               </a:p>
             </c:txPr>
             <c:dLblPos val="outEnd"/>
@@ -511,7 +517,7 @@
                     <a:cs typeface="+mn-cs"/>
                   </a:defRPr>
                 </a:pPr>
-                <a:endParaRPr lang="de-DE"/>
+                <a:endParaRPr lang="en-US"/>
               </a:p>
             </c:txPr>
             <c:dLblPos val="outEnd"/>
@@ -665,7 +671,7 @@
                     <a:cs typeface="+mn-cs"/>
                   </a:defRPr>
                 </a:pPr>
-                <a:endParaRPr lang="de-DE"/>
+                <a:endParaRPr lang="en-US"/>
               </a:p>
             </c:txPr>
             <c:dLblPos val="outEnd"/>
@@ -819,7 +825,7 @@
                     <a:cs typeface="+mn-cs"/>
                   </a:defRPr>
                 </a:pPr>
-                <a:endParaRPr lang="de-DE"/>
+                <a:endParaRPr lang="en-US"/>
               </a:p>
             </c:txPr>
             <c:dLblPos val="outEnd"/>
@@ -973,7 +979,7 @@
                     <a:cs typeface="+mn-cs"/>
                   </a:defRPr>
                 </a:pPr>
-                <a:endParaRPr lang="de-DE"/>
+                <a:endParaRPr lang="en-US"/>
               </a:p>
             </c:txPr>
             <c:dLblPos val="outEnd"/>
@@ -1108,7 +1114,7 @@
                 <a:cs typeface="+mn-cs"/>
               </a:defRPr>
             </a:pPr>
-            <a:endParaRPr lang="de-DE"/>
+            <a:endParaRPr lang="en-US"/>
           </a:p>
         </c:txPr>
         <c:crossAx val="635863608"/>
@@ -1165,7 +1171,7 @@
                 <a:cs typeface="+mn-cs"/>
               </a:defRPr>
             </a:pPr>
-            <a:endParaRPr lang="de-DE"/>
+            <a:endParaRPr lang="en-US"/>
           </a:p>
         </c:txPr>
         <c:crossAx val="635863280"/>
@@ -1204,7 +1210,7 @@
               <a:cs typeface="+mn-cs"/>
             </a:defRPr>
           </a:pPr>
-          <a:endParaRPr lang="de-DE"/>
+          <a:endParaRPr lang="en-US"/>
         </a:p>
       </c:txPr>
     </c:legend>
@@ -1226,7 +1232,7 @@
       <a:pPr>
         <a:defRPr/>
       </a:pPr>
-      <a:endParaRPr lang="de-DE"/>
+      <a:endParaRPr lang="en-US"/>
     </a:p>
   </c:txPr>
   <c:externalData r:id="rId3">
@@ -2929,7 +2935,7 @@
           <a:p>
             <a:fld id="{237CE087-4543-4189-BB65-6B91047A5D23}" type="datetimeFigureOut">
               <a:rPr lang="de-DE" smtClean="0"/>
-              <a:t>17.09.2017</a:t>
+              <a:t>19.09.2017</a:t>
             </a:fld>
             <a:endParaRPr lang="de-DE"/>
           </a:p>
@@ -7836,7 +7842,7 @@
         </p:nvSpPr>
         <p:spPr bwMode="auto">
           <a:xfrm>
-            <a:off x="1991544" y="1124745"/>
+            <a:off x="2207419" y="1124745"/>
             <a:ext cx="7777162" cy="3240360"/>
           </a:xfrm>
           <a:prstGeom prst="rect">
@@ -18077,7 +18083,7 @@
           <a:p>
             <a:r>
               <a:rPr lang="en-US" dirty="0"/>
-              <a:t>Method Injection (Build-Up)</a:t>
+              <a:t>Method Injection</a:t>
             </a:r>
           </a:p>
           <a:p>
@@ -18726,6 +18732,190 @@
           <p:cNvPr id="2" name="Title 1">
             <a:extLst>
               <a:ext uri="{FF2B5EF4-FFF2-40B4-BE49-F238E27FC236}">
+                <a16:creationId xmlns:a16="http://schemas.microsoft.com/office/drawing/2014/main" id="{5B5FFA26-0481-4491-AFBB-2C9DF9636D90}"/>
+              </a:ext>
+            </a:extLst>
+          </p:cNvPr>
+          <p:cNvSpPr>
+            <a:spLocks noGrp="1"/>
+          </p:cNvSpPr>
+          <p:nvPr>
+            <p:ph type="title"/>
+          </p:nvPr>
+        </p:nvSpPr>
+        <p:spPr>
+          <a:xfrm>
+            <a:off x="1919536" y="365125"/>
+            <a:ext cx="9434264" cy="1047651"/>
+          </a:xfrm>
+        </p:spPr>
+        <p:txBody>
+          <a:bodyPr/>
+          <a:lstStyle/>
+          <a:p>
+            <a:r>
+              <a:rPr lang="en-US" dirty="0"/>
+              <a:t>Avoid Injection Via Attributes</a:t>
+            </a:r>
+            <a:endParaRPr lang="de-DE" dirty="0"/>
+          </a:p>
+        </p:txBody>
+      </p:sp>
+      <p:sp>
+        <p:nvSpPr>
+          <p:cNvPr id="3" name="Content Placeholder 2">
+            <a:extLst>
+              <a:ext uri="{FF2B5EF4-FFF2-40B4-BE49-F238E27FC236}">
+                <a16:creationId xmlns:a16="http://schemas.microsoft.com/office/drawing/2014/main" id="{50C85FB4-69BD-44EA-928D-3982F7BCDFCC}"/>
+              </a:ext>
+            </a:extLst>
+          </p:cNvPr>
+          <p:cNvSpPr>
+            <a:spLocks noGrp="1"/>
+          </p:cNvSpPr>
+          <p:nvPr>
+            <p:ph sz="quarter" idx="10"/>
+          </p:nvPr>
+        </p:nvSpPr>
+        <p:spPr/>
+        <p:txBody>
+          <a:bodyPr/>
+          <a:lstStyle/>
+          <a:p>
+            <a:pPr marL="0" indent="0">
+              <a:buNone/>
+            </a:pPr>
+            <a:r>
+              <a:rPr lang="en-US" dirty="0"/>
+              <a:t>Do not use public properties that are marked with an attribute to tell the container that an injection is required.</a:t>
+            </a:r>
+          </a:p>
+          <a:p>
+            <a:pPr marL="0" indent="0">
+              <a:buNone/>
+            </a:pPr>
+            <a:r>
+              <a:rPr lang="en-US" dirty="0"/>
+              <a:t>This is another way to couple your logic to the implementation of a concrete Container.</a:t>
+            </a:r>
+          </a:p>
+          <a:p>
+            <a:pPr marL="0" indent="0">
+              <a:buNone/>
+            </a:pPr>
+            <a:endParaRPr lang="en-US" dirty="0"/>
+          </a:p>
+          <a:p>
+            <a:r>
+              <a:rPr lang="en-US" dirty="0"/>
+              <a:t>Hard to exchange the DI Container</a:t>
+            </a:r>
+          </a:p>
+          <a:p>
+            <a:r>
+              <a:rPr lang="en-US" dirty="0"/>
+              <a:t>These objects are not immutable</a:t>
+            </a:r>
+            <a:endParaRPr lang="de-DE" dirty="0"/>
+          </a:p>
+        </p:txBody>
+      </p:sp>
+      <p:sp>
+        <p:nvSpPr>
+          <p:cNvPr id="4" name="Date Placeholder 3">
+            <a:extLst>
+              <a:ext uri="{FF2B5EF4-FFF2-40B4-BE49-F238E27FC236}">
+                <a16:creationId xmlns:a16="http://schemas.microsoft.com/office/drawing/2014/main" id="{10924E61-F672-4E1F-A541-FD4A877124B9}"/>
+              </a:ext>
+            </a:extLst>
+          </p:cNvPr>
+          <p:cNvSpPr>
+            <a:spLocks noGrp="1"/>
+          </p:cNvSpPr>
+          <p:nvPr>
+            <p:ph type="dt" sz="half" idx="11"/>
+          </p:nvPr>
+        </p:nvSpPr>
+        <p:spPr/>
+        <p:txBody>
+          <a:bodyPr/>
+          <a:lstStyle/>
+          <a:p>
+            <a:r>
+              <a:rPr lang="de-DE"/>
+              <a:t>19.09.2017</a:t>
+            </a:r>
+          </a:p>
+        </p:txBody>
+      </p:sp>
+      <p:sp>
+        <p:nvSpPr>
+          <p:cNvPr id="5" name="Slide Number Placeholder 4">
+            <a:extLst>
+              <a:ext uri="{FF2B5EF4-FFF2-40B4-BE49-F238E27FC236}">
+                <a16:creationId xmlns:a16="http://schemas.microsoft.com/office/drawing/2014/main" id="{EAF55CBA-6823-4A55-AE38-763293CFA2BF}"/>
+              </a:ext>
+            </a:extLst>
+          </p:cNvPr>
+          <p:cNvSpPr>
+            <a:spLocks noGrp="1"/>
+          </p:cNvSpPr>
+          <p:nvPr>
+            <p:ph type="sldNum" sz="quarter" idx="13"/>
+          </p:nvPr>
+        </p:nvSpPr>
+        <p:spPr/>
+        <p:txBody>
+          <a:bodyPr/>
+          <a:lstStyle/>
+          <a:p>
+            <a:fld id="{3AA5FB2A-BCB4-4E64-AAE1-BAC1A8A5655D}" type="slidenum">
+              <a:rPr lang="de-DE" smtClean="0"/>
+              <a:pPr/>
+              <a:t>21</a:t>
+            </a:fld>
+            <a:endParaRPr lang="de-DE"/>
+          </a:p>
+        </p:txBody>
+      </p:sp>
+    </p:spTree>
+    <p:extLst>
+      <p:ext uri="{BB962C8B-B14F-4D97-AF65-F5344CB8AC3E}">
+        <p14:creationId xmlns:p14="http://schemas.microsoft.com/office/powerpoint/2010/main" val="1519721908"/>
+      </p:ext>
+    </p:extLst>
+  </p:cSld>
+  <p:clrMapOvr>
+    <a:masterClrMapping/>
+  </p:clrMapOvr>
+  <p:transition spd="med">
+    <p:pull/>
+  </p:transition>
+</p:sld>
+</file>
+
+<file path=ppt/slides/slide22.xml><?xml version="1.0" encoding="utf-8"?>
+<p:sld xmlns:a="http://schemas.openxmlformats.org/drawingml/2006/main" xmlns:r="http://schemas.openxmlformats.org/officeDocument/2006/relationships" xmlns:p="http://schemas.openxmlformats.org/presentationml/2006/main">
+  <p:cSld>
+    <p:spTree>
+      <p:nvGrpSpPr>
+        <p:cNvPr id="1" name=""/>
+        <p:cNvGrpSpPr/>
+        <p:nvPr/>
+      </p:nvGrpSpPr>
+      <p:grpSpPr>
+        <a:xfrm>
+          <a:off x="0" y="0"/>
+          <a:ext cx="0" cy="0"/>
+          <a:chOff x="0" y="0"/>
+          <a:chExt cx="0" cy="0"/>
+        </a:xfrm>
+      </p:grpSpPr>
+      <p:sp>
+        <p:nvSpPr>
+          <p:cNvPr id="2" name="Title 1">
+            <a:extLst>
+              <a:ext uri="{FF2B5EF4-FFF2-40B4-BE49-F238E27FC236}">
                 <a16:creationId xmlns:a16="http://schemas.microsoft.com/office/drawing/2014/main" id="{AB5073C7-A0CE-40D7-9AD3-F1D958844337}"/>
               </a:ext>
             </a:extLst>
@@ -18860,7 +19050,7 @@
             <a:fld id="{3AA5FB2A-BCB4-4E64-AAE1-BAC1A8A5655D}" type="slidenum">
               <a:rPr lang="de-DE" smtClean="0"/>
               <a:pPr/>
-              <a:t>21</a:t>
+              <a:t>22</a:t>
             </a:fld>
             <a:endParaRPr lang="de-DE"/>
           </a:p>
@@ -18882,7 +19072,7 @@
 </p:sld>
 </file>
 
-<file path=ppt/slides/slide22.xml><?xml version="1.0" encoding="utf-8"?>
+<file path=ppt/slides/slide23.xml><?xml version="1.0" encoding="utf-8"?>
 <p:sld xmlns:a="http://schemas.openxmlformats.org/drawingml/2006/main" xmlns:r="http://schemas.openxmlformats.org/officeDocument/2006/relationships" xmlns:p="http://schemas.openxmlformats.org/presentationml/2006/main">
   <p:cSld>
     <p:spTree>
@@ -19030,7 +19220,7 @@
             <a:fld id="{3AA5FB2A-BCB4-4E64-AAE1-BAC1A8A5655D}" type="slidenum">
               <a:rPr lang="de-DE" smtClean="0"/>
               <a:pPr/>
-              <a:t>22</a:t>
+              <a:t>23</a:t>
             </a:fld>
             <a:endParaRPr lang="de-DE"/>
           </a:p>
@@ -19040,190 +19230,6 @@
     <p:extLst>
       <p:ext uri="{BB962C8B-B14F-4D97-AF65-F5344CB8AC3E}">
         <p14:creationId xmlns:p14="http://schemas.microsoft.com/office/powerpoint/2010/main" val="2037809699"/>
-      </p:ext>
-    </p:extLst>
-  </p:cSld>
-  <p:clrMapOvr>
-    <a:masterClrMapping/>
-  </p:clrMapOvr>
-  <p:transition spd="med">
-    <p:pull/>
-  </p:transition>
-</p:sld>
-</file>
-
-<file path=ppt/slides/slide23.xml><?xml version="1.0" encoding="utf-8"?>
-<p:sld xmlns:a="http://schemas.openxmlformats.org/drawingml/2006/main" xmlns:r="http://schemas.openxmlformats.org/officeDocument/2006/relationships" xmlns:p="http://schemas.openxmlformats.org/presentationml/2006/main">
-  <p:cSld>
-    <p:spTree>
-      <p:nvGrpSpPr>
-        <p:cNvPr id="1" name=""/>
-        <p:cNvGrpSpPr/>
-        <p:nvPr/>
-      </p:nvGrpSpPr>
-      <p:grpSpPr>
-        <a:xfrm>
-          <a:off x="0" y="0"/>
-          <a:ext cx="0" cy="0"/>
-          <a:chOff x="0" y="0"/>
-          <a:chExt cx="0" cy="0"/>
-        </a:xfrm>
-      </p:grpSpPr>
-      <p:sp>
-        <p:nvSpPr>
-          <p:cNvPr id="2" name="Title 1">
-            <a:extLst>
-              <a:ext uri="{FF2B5EF4-FFF2-40B4-BE49-F238E27FC236}">
-                <a16:creationId xmlns:a16="http://schemas.microsoft.com/office/drawing/2014/main" id="{5B5FFA26-0481-4491-AFBB-2C9DF9636D90}"/>
-              </a:ext>
-            </a:extLst>
-          </p:cNvPr>
-          <p:cNvSpPr>
-            <a:spLocks noGrp="1"/>
-          </p:cNvSpPr>
-          <p:nvPr>
-            <p:ph type="title"/>
-          </p:nvPr>
-        </p:nvSpPr>
-        <p:spPr>
-          <a:xfrm>
-            <a:off x="1919536" y="365125"/>
-            <a:ext cx="9434264" cy="1047651"/>
-          </a:xfrm>
-        </p:spPr>
-        <p:txBody>
-          <a:bodyPr/>
-          <a:lstStyle/>
-          <a:p>
-            <a:r>
-              <a:rPr lang="en-US" dirty="0"/>
-              <a:t>Avoid Injection Via Attributes</a:t>
-            </a:r>
-            <a:endParaRPr lang="de-DE" dirty="0"/>
-          </a:p>
-        </p:txBody>
-      </p:sp>
-      <p:sp>
-        <p:nvSpPr>
-          <p:cNvPr id="3" name="Content Placeholder 2">
-            <a:extLst>
-              <a:ext uri="{FF2B5EF4-FFF2-40B4-BE49-F238E27FC236}">
-                <a16:creationId xmlns:a16="http://schemas.microsoft.com/office/drawing/2014/main" id="{50C85FB4-69BD-44EA-928D-3982F7BCDFCC}"/>
-              </a:ext>
-            </a:extLst>
-          </p:cNvPr>
-          <p:cNvSpPr>
-            <a:spLocks noGrp="1"/>
-          </p:cNvSpPr>
-          <p:nvPr>
-            <p:ph sz="quarter" idx="10"/>
-          </p:nvPr>
-        </p:nvSpPr>
-        <p:spPr/>
-        <p:txBody>
-          <a:bodyPr/>
-          <a:lstStyle/>
-          <a:p>
-            <a:pPr marL="0" indent="0">
-              <a:buNone/>
-            </a:pPr>
-            <a:r>
-              <a:rPr lang="en-US" dirty="0"/>
-              <a:t>Do not use public properties that are marked with an attribute to tell the container that an injection is required.</a:t>
-            </a:r>
-          </a:p>
-          <a:p>
-            <a:pPr marL="0" indent="0">
-              <a:buNone/>
-            </a:pPr>
-            <a:r>
-              <a:rPr lang="en-US" dirty="0"/>
-              <a:t>This is another way to couple your logic to the implementation of a concrete Container.</a:t>
-            </a:r>
-          </a:p>
-          <a:p>
-            <a:pPr marL="0" indent="0">
-              <a:buNone/>
-            </a:pPr>
-            <a:endParaRPr lang="en-US" dirty="0"/>
-          </a:p>
-          <a:p>
-            <a:r>
-              <a:rPr lang="en-US" dirty="0"/>
-              <a:t>Hard to exchange the DI Container</a:t>
-            </a:r>
-          </a:p>
-          <a:p>
-            <a:r>
-              <a:rPr lang="en-US" dirty="0"/>
-              <a:t>These objects are not immutable</a:t>
-            </a:r>
-            <a:endParaRPr lang="de-DE" dirty="0"/>
-          </a:p>
-        </p:txBody>
-      </p:sp>
-      <p:sp>
-        <p:nvSpPr>
-          <p:cNvPr id="4" name="Date Placeholder 3">
-            <a:extLst>
-              <a:ext uri="{FF2B5EF4-FFF2-40B4-BE49-F238E27FC236}">
-                <a16:creationId xmlns:a16="http://schemas.microsoft.com/office/drawing/2014/main" id="{10924E61-F672-4E1F-A541-FD4A877124B9}"/>
-              </a:ext>
-            </a:extLst>
-          </p:cNvPr>
-          <p:cNvSpPr>
-            <a:spLocks noGrp="1"/>
-          </p:cNvSpPr>
-          <p:nvPr>
-            <p:ph type="dt" sz="half" idx="11"/>
-          </p:nvPr>
-        </p:nvSpPr>
-        <p:spPr/>
-        <p:txBody>
-          <a:bodyPr/>
-          <a:lstStyle/>
-          <a:p>
-            <a:r>
-              <a:rPr lang="de-DE"/>
-              <a:t>19.09.2017</a:t>
-            </a:r>
-          </a:p>
-        </p:txBody>
-      </p:sp>
-      <p:sp>
-        <p:nvSpPr>
-          <p:cNvPr id="5" name="Slide Number Placeholder 4">
-            <a:extLst>
-              <a:ext uri="{FF2B5EF4-FFF2-40B4-BE49-F238E27FC236}">
-                <a16:creationId xmlns:a16="http://schemas.microsoft.com/office/drawing/2014/main" id="{EAF55CBA-6823-4A55-AE38-763293CFA2BF}"/>
-              </a:ext>
-            </a:extLst>
-          </p:cNvPr>
-          <p:cNvSpPr>
-            <a:spLocks noGrp="1"/>
-          </p:cNvSpPr>
-          <p:nvPr>
-            <p:ph type="sldNum" sz="quarter" idx="13"/>
-          </p:nvPr>
-        </p:nvSpPr>
-        <p:spPr/>
-        <p:txBody>
-          <a:bodyPr/>
-          <a:lstStyle/>
-          <a:p>
-            <a:fld id="{3AA5FB2A-BCB4-4E64-AAE1-BAC1A8A5655D}" type="slidenum">
-              <a:rPr lang="de-DE" smtClean="0"/>
-              <a:pPr/>
-              <a:t>23</a:t>
-            </a:fld>
-            <a:endParaRPr lang="de-DE"/>
-          </a:p>
-        </p:txBody>
-      </p:sp>
-    </p:spTree>
-    <p:extLst>
-      <p:ext uri="{BB962C8B-B14F-4D97-AF65-F5344CB8AC3E}">
-        <p14:creationId xmlns:p14="http://schemas.microsoft.com/office/powerpoint/2010/main" val="1519721908"/>
       </p:ext>
     </p:extLst>
   </p:cSld>
@@ -19802,6 +19808,180 @@
           <p:cNvPr id="2" name="Title 1">
             <a:extLst>
               <a:ext uri="{FF2B5EF4-FFF2-40B4-BE49-F238E27FC236}">
+                <a16:creationId xmlns:a16="http://schemas.microsoft.com/office/drawing/2014/main" id="{EB53C3B6-09E0-4A99-868B-FA9370FA6804}"/>
+              </a:ext>
+            </a:extLst>
+          </p:cNvPr>
+          <p:cNvSpPr>
+            <a:spLocks noGrp="1"/>
+          </p:cNvSpPr>
+          <p:nvPr>
+            <p:ph type="title"/>
+          </p:nvPr>
+        </p:nvSpPr>
+        <p:spPr/>
+        <p:txBody>
+          <a:bodyPr/>
+          <a:lstStyle/>
+          <a:p>
+            <a:r>
+              <a:rPr lang="en-US" dirty="0"/>
+              <a:t>Avoid Over-Injection</a:t>
+            </a:r>
+          </a:p>
+        </p:txBody>
+      </p:sp>
+      <p:sp>
+        <p:nvSpPr>
+          <p:cNvPr id="3" name="Content Placeholder 2">
+            <a:extLst>
+              <a:ext uri="{FF2B5EF4-FFF2-40B4-BE49-F238E27FC236}">
+                <a16:creationId xmlns:a16="http://schemas.microsoft.com/office/drawing/2014/main" id="{BE98C4B2-9DCE-4BAA-BA13-99870D9883CC}"/>
+              </a:ext>
+            </a:extLst>
+          </p:cNvPr>
+          <p:cNvSpPr>
+            <a:spLocks noGrp="1"/>
+          </p:cNvSpPr>
+          <p:nvPr>
+            <p:ph sz="quarter" idx="10"/>
+          </p:nvPr>
+        </p:nvSpPr>
+        <p:spPr/>
+        <p:txBody>
+          <a:bodyPr/>
+          <a:lstStyle/>
+          <a:p>
+            <a:pPr marL="0" indent="0">
+              <a:buNone/>
+            </a:pPr>
+            <a:r>
+              <a:rPr lang="en-US" dirty="0"/>
+              <a:t>A high number of dependencies might indicate that your O-O design could be optimized.</a:t>
+            </a:r>
+          </a:p>
+          <a:p>
+            <a:pPr marL="0" indent="0">
+              <a:buNone/>
+            </a:pPr>
+            <a:endParaRPr lang="en-US" dirty="0"/>
+          </a:p>
+          <a:p>
+            <a:r>
+              <a:rPr lang="en-US" dirty="0"/>
+              <a:t>Can the High-Level Module be simplified (i.e. some logic be extracted)?</a:t>
+            </a:r>
+          </a:p>
+          <a:p>
+            <a:r>
+              <a:rPr lang="en-US" dirty="0"/>
+              <a:t>With more than three dependencies, you should start thinking about refactoring.</a:t>
+            </a:r>
+          </a:p>
+          <a:p>
+            <a:r>
+              <a:rPr lang="en-US" dirty="0"/>
+              <a:t>But: some complex processes require a higher number of dependencies.</a:t>
+            </a:r>
+          </a:p>
+        </p:txBody>
+      </p:sp>
+      <p:sp>
+        <p:nvSpPr>
+          <p:cNvPr id="4" name="Date Placeholder 3">
+            <a:extLst>
+              <a:ext uri="{FF2B5EF4-FFF2-40B4-BE49-F238E27FC236}">
+                <a16:creationId xmlns:a16="http://schemas.microsoft.com/office/drawing/2014/main" id="{9CAAA358-9E0D-4B3D-83F9-381FAC141C34}"/>
+              </a:ext>
+            </a:extLst>
+          </p:cNvPr>
+          <p:cNvSpPr>
+            <a:spLocks noGrp="1"/>
+          </p:cNvSpPr>
+          <p:nvPr>
+            <p:ph type="dt" sz="half" idx="11"/>
+          </p:nvPr>
+        </p:nvSpPr>
+        <p:spPr/>
+        <p:txBody>
+          <a:bodyPr/>
+          <a:lstStyle/>
+          <a:p>
+            <a:r>
+              <a:rPr lang="de-DE"/>
+              <a:t>19.09.2017</a:t>
+            </a:r>
+          </a:p>
+        </p:txBody>
+      </p:sp>
+      <p:sp>
+        <p:nvSpPr>
+          <p:cNvPr id="5" name="Slide Number Placeholder 4">
+            <a:extLst>
+              <a:ext uri="{FF2B5EF4-FFF2-40B4-BE49-F238E27FC236}">
+                <a16:creationId xmlns:a16="http://schemas.microsoft.com/office/drawing/2014/main" id="{9CE36CF7-B7CC-405E-8269-39529ADF0107}"/>
+              </a:ext>
+            </a:extLst>
+          </p:cNvPr>
+          <p:cNvSpPr>
+            <a:spLocks noGrp="1"/>
+          </p:cNvSpPr>
+          <p:nvPr>
+            <p:ph type="sldNum" sz="quarter" idx="13"/>
+          </p:nvPr>
+        </p:nvSpPr>
+        <p:spPr/>
+        <p:txBody>
+          <a:bodyPr/>
+          <a:lstStyle/>
+          <a:p>
+            <a:fld id="{3AA5FB2A-BCB4-4E64-AAE1-BAC1A8A5655D}" type="slidenum">
+              <a:rPr lang="de-DE" smtClean="0"/>
+              <a:pPr/>
+              <a:t>27</a:t>
+            </a:fld>
+            <a:endParaRPr lang="de-DE"/>
+          </a:p>
+        </p:txBody>
+      </p:sp>
+    </p:spTree>
+    <p:extLst>
+      <p:ext uri="{BB962C8B-B14F-4D97-AF65-F5344CB8AC3E}">
+        <p14:creationId xmlns:p14="http://schemas.microsoft.com/office/powerpoint/2010/main" val="358437202"/>
+      </p:ext>
+    </p:extLst>
+  </p:cSld>
+  <p:clrMapOvr>
+    <a:masterClrMapping/>
+  </p:clrMapOvr>
+  <p:transition spd="med">
+    <p:pull/>
+  </p:transition>
+</p:sld>
+</file>
+
+<file path=ppt/slides/slide28.xml><?xml version="1.0" encoding="utf-8"?>
+<p:sld xmlns:a="http://schemas.openxmlformats.org/drawingml/2006/main" xmlns:r="http://schemas.openxmlformats.org/officeDocument/2006/relationships" xmlns:p="http://schemas.openxmlformats.org/presentationml/2006/main">
+  <p:cSld>
+    <p:spTree>
+      <p:nvGrpSpPr>
+        <p:cNvPr id="1" name=""/>
+        <p:cNvGrpSpPr/>
+        <p:nvPr/>
+      </p:nvGrpSpPr>
+      <p:grpSpPr>
+        <a:xfrm>
+          <a:off x="0" y="0"/>
+          <a:ext cx="0" cy="0"/>
+          <a:chOff x="0" y="0"/>
+          <a:chExt cx="0" cy="0"/>
+        </a:xfrm>
+      </p:grpSpPr>
+      <p:sp>
+        <p:nvSpPr>
+          <p:cNvPr id="2" name="Title 1">
+            <a:extLst>
+              <a:ext uri="{FF2B5EF4-FFF2-40B4-BE49-F238E27FC236}">
                 <a16:creationId xmlns:a16="http://schemas.microsoft.com/office/drawing/2014/main" id="{A12885C0-18BC-4FEE-BE68-F5CE792FEE2A}"/>
               </a:ext>
             </a:extLst>
@@ -19883,7 +20063,7 @@
             <a:fld id="{3AA5FB2A-BCB4-4E64-AAE1-BAC1A8A5655D}" type="slidenum">
               <a:rPr lang="de-DE" smtClean="0"/>
               <a:pPr/>
-              <a:t>27</a:t>
+              <a:t>28</a:t>
             </a:fld>
             <a:endParaRPr lang="de-DE"/>
           </a:p>
@@ -19935,7 +20115,7 @@
 </p:sld>
 </file>
 
-<file path=ppt/slides/slide28.xml><?xml version="1.0" encoding="utf-8"?>
+<file path=ppt/slides/slide29.xml><?xml version="1.0" encoding="utf-8"?>
 <p:sld xmlns:a="http://schemas.openxmlformats.org/drawingml/2006/main" xmlns:r="http://schemas.openxmlformats.org/officeDocument/2006/relationships" xmlns:p="http://schemas.openxmlformats.org/presentationml/2006/main">
   <p:cSld>
     <p:spTree>
@@ -20070,7 +20250,7 @@
             <a:fld id="{3AA5FB2A-BCB4-4E64-AAE1-BAC1A8A5655D}" type="slidenum">
               <a:rPr lang="de-DE" smtClean="0"/>
               <a:pPr/>
-              <a:t>28</a:t>
+              <a:t>29</a:t>
             </a:fld>
             <a:endParaRPr lang="de-DE"/>
           </a:p>
@@ -20080,93 +20260,6 @@
     <p:extLst>
       <p:ext uri="{BB962C8B-B14F-4D97-AF65-F5344CB8AC3E}">
         <p14:creationId xmlns:p14="http://schemas.microsoft.com/office/powerpoint/2010/main" val="2994051835"/>
-      </p:ext>
-    </p:extLst>
-  </p:cSld>
-  <p:clrMapOvr>
-    <a:masterClrMapping/>
-  </p:clrMapOvr>
-  <p:transition spd="med">
-    <p:pull/>
-  </p:transition>
-</p:sld>
-</file>
-
-<file path=ppt/slides/slide29.xml><?xml version="1.0" encoding="utf-8"?>
-<p:sld xmlns:a="http://schemas.openxmlformats.org/drawingml/2006/main" xmlns:r="http://schemas.openxmlformats.org/officeDocument/2006/relationships" xmlns:p="http://schemas.openxmlformats.org/presentationml/2006/main">
-  <p:cSld>
-    <p:spTree>
-      <p:nvGrpSpPr>
-        <p:cNvPr id="1" name=""/>
-        <p:cNvGrpSpPr/>
-        <p:nvPr/>
-      </p:nvGrpSpPr>
-      <p:grpSpPr>
-        <a:xfrm>
-          <a:off x="0" y="0"/>
-          <a:ext cx="0" cy="0"/>
-          <a:chOff x="0" y="0"/>
-          <a:chExt cx="0" cy="0"/>
-        </a:xfrm>
-      </p:grpSpPr>
-      <p:sp>
-        <p:nvSpPr>
-          <p:cNvPr id="6" name="Title 5">
-            <a:extLst>
-              <a:ext uri="{FF2B5EF4-FFF2-40B4-BE49-F238E27FC236}">
-                <a16:creationId xmlns:a16="http://schemas.microsoft.com/office/drawing/2014/main" id="{BD4BF4AB-075D-4D0C-9A2D-E73506EB8FDF}"/>
-              </a:ext>
-            </a:extLst>
-          </p:cNvPr>
-          <p:cNvSpPr>
-            <a:spLocks noGrp="1"/>
-          </p:cNvSpPr>
-          <p:nvPr>
-            <p:ph type="ctrTitle"/>
-          </p:nvPr>
-        </p:nvSpPr>
-        <p:spPr/>
-        <p:txBody>
-          <a:bodyPr/>
-          <a:lstStyle/>
-          <a:p>
-            <a:r>
-              <a:rPr lang="en-US" dirty="0"/>
-              <a:t>DI Container Performance</a:t>
-            </a:r>
-            <a:endParaRPr lang="de-DE" dirty="0"/>
-          </a:p>
-        </p:txBody>
-      </p:sp>
-      <p:sp>
-        <p:nvSpPr>
-          <p:cNvPr id="7" name="Subtitle 6">
-            <a:extLst>
-              <a:ext uri="{FF2B5EF4-FFF2-40B4-BE49-F238E27FC236}">
-                <a16:creationId xmlns:a16="http://schemas.microsoft.com/office/drawing/2014/main" id="{758A3E1B-4301-47AB-9C81-6AC1275FF963}"/>
-              </a:ext>
-            </a:extLst>
-          </p:cNvPr>
-          <p:cNvSpPr>
-            <a:spLocks noGrp="1"/>
-          </p:cNvSpPr>
-          <p:nvPr>
-            <p:ph type="subTitle" idx="1"/>
-          </p:nvPr>
-        </p:nvSpPr>
-        <p:spPr/>
-        <p:txBody>
-          <a:bodyPr/>
-          <a:lstStyle/>
-          <a:p>
-            <a:endParaRPr lang="de-DE"/>
-          </a:p>
-        </p:txBody>
-      </p:sp>
-    </p:spTree>
-    <p:extLst>
-      <p:ext uri="{BB962C8B-B14F-4D97-AF65-F5344CB8AC3E}">
-        <p14:creationId xmlns:p14="http://schemas.microsoft.com/office/powerpoint/2010/main" val="288764939"/>
       </p:ext>
     </p:extLst>
   </p:cSld>
@@ -20433,6 +20526,2305 @@
       </p:grpSpPr>
       <p:sp>
         <p:nvSpPr>
+          <p:cNvPr id="2" name="Title 1">
+            <a:extLst>
+              <a:ext uri="{FF2B5EF4-FFF2-40B4-BE49-F238E27FC236}">
+                <a16:creationId xmlns:a16="http://schemas.microsoft.com/office/drawing/2014/main" id="{504BBE5E-C728-4148-8243-8D65CAADD441}"/>
+              </a:ext>
+            </a:extLst>
+          </p:cNvPr>
+          <p:cNvSpPr>
+            <a:spLocks noGrp="1"/>
+          </p:cNvSpPr>
+          <p:nvPr>
+            <p:ph type="ctrTitle"/>
+          </p:nvPr>
+        </p:nvSpPr>
+        <p:spPr/>
+        <p:txBody>
+          <a:bodyPr/>
+          <a:lstStyle/>
+          <a:p>
+            <a:r>
+              <a:rPr lang="en-US" dirty="0"/>
+              <a:t>Where is it hard to use DI?</a:t>
+            </a:r>
+          </a:p>
+        </p:txBody>
+      </p:sp>
+      <p:sp>
+        <p:nvSpPr>
+          <p:cNvPr id="6" name="Subtitle 5">
+            <a:extLst>
+              <a:ext uri="{FF2B5EF4-FFF2-40B4-BE49-F238E27FC236}">
+                <a16:creationId xmlns:a16="http://schemas.microsoft.com/office/drawing/2014/main" id="{F0D9DEFD-D214-4086-9EDD-B9A33B899635}"/>
+              </a:ext>
+            </a:extLst>
+          </p:cNvPr>
+          <p:cNvSpPr>
+            <a:spLocks noGrp="1"/>
+          </p:cNvSpPr>
+          <p:nvPr>
+            <p:ph type="subTitle" idx="1"/>
+          </p:nvPr>
+        </p:nvSpPr>
+        <p:spPr/>
+        <p:txBody>
+          <a:bodyPr/>
+          <a:lstStyle/>
+          <a:p>
+            <a:r>
+              <a:rPr lang="en-US" sz="3600" dirty="0"/>
+              <a:t>At the boundary of the your application (DTOs)</a:t>
+            </a:r>
+          </a:p>
+        </p:txBody>
+      </p:sp>
+      <p:sp>
+        <p:nvSpPr>
+          <p:cNvPr id="4" name="Date Placeholder 3">
+            <a:extLst>
+              <a:ext uri="{FF2B5EF4-FFF2-40B4-BE49-F238E27FC236}">
+                <a16:creationId xmlns:a16="http://schemas.microsoft.com/office/drawing/2014/main" id="{180C7F35-E1A1-44EE-B7BA-DCF17F3CF1D6}"/>
+              </a:ext>
+            </a:extLst>
+          </p:cNvPr>
+          <p:cNvSpPr>
+            <a:spLocks noGrp="1"/>
+          </p:cNvSpPr>
+          <p:nvPr>
+            <p:ph type="dt" sz="half" idx="4294967295"/>
+          </p:nvPr>
+        </p:nvSpPr>
+        <p:spPr>
+          <a:xfrm>
+            <a:off x="0" y="6524625"/>
+            <a:ext cx="2743200" cy="196850"/>
+          </a:xfrm>
+          <a:prstGeom prst="rect">
+            <a:avLst/>
+          </a:prstGeom>
+        </p:spPr>
+        <p:txBody>
+          <a:bodyPr/>
+          <a:lstStyle/>
+          <a:p>
+            <a:r>
+              <a:rPr lang="de-DE"/>
+              <a:t>19.09.2017</a:t>
+            </a:r>
+          </a:p>
+        </p:txBody>
+      </p:sp>
+      <p:sp>
+        <p:nvSpPr>
+          <p:cNvPr id="5" name="Slide Number Placeholder 4">
+            <a:extLst>
+              <a:ext uri="{FF2B5EF4-FFF2-40B4-BE49-F238E27FC236}">
+                <a16:creationId xmlns:a16="http://schemas.microsoft.com/office/drawing/2014/main" id="{5AAFA566-6EB5-471A-8521-A2F72AD066B8}"/>
+              </a:ext>
+            </a:extLst>
+          </p:cNvPr>
+          <p:cNvSpPr>
+            <a:spLocks noGrp="1"/>
+          </p:cNvSpPr>
+          <p:nvPr>
+            <p:ph type="sldNum" sz="quarter" idx="4294967295"/>
+          </p:nvPr>
+        </p:nvSpPr>
+        <p:spPr>
+          <a:xfrm>
+            <a:off x="9448800" y="6524625"/>
+            <a:ext cx="2743200" cy="196850"/>
+          </a:xfrm>
+          <a:prstGeom prst="rect">
+            <a:avLst/>
+          </a:prstGeom>
+        </p:spPr>
+        <p:txBody>
+          <a:bodyPr/>
+          <a:lstStyle/>
+          <a:p>
+            <a:fld id="{3AA5FB2A-BCB4-4E64-AAE1-BAC1A8A5655D}" type="slidenum">
+              <a:rPr lang="de-DE" smtClean="0"/>
+              <a:pPr/>
+              <a:t>30</a:t>
+            </a:fld>
+            <a:endParaRPr lang="de-DE"/>
+          </a:p>
+        </p:txBody>
+      </p:sp>
+    </p:spTree>
+    <p:extLst>
+      <p:ext uri="{BB962C8B-B14F-4D97-AF65-F5344CB8AC3E}">
+        <p14:creationId xmlns:p14="http://schemas.microsoft.com/office/powerpoint/2010/main" val="4126863756"/>
+      </p:ext>
+    </p:extLst>
+  </p:cSld>
+  <p:clrMapOvr>
+    <a:masterClrMapping/>
+  </p:clrMapOvr>
+  <p:transition spd="med">
+    <p:pull/>
+  </p:transition>
+</p:sld>
+</file>
+
+<file path=ppt/slides/slide31.xml><?xml version="1.0" encoding="utf-8"?>
+<p:sld xmlns:a="http://schemas.openxmlformats.org/drawingml/2006/main" xmlns:r="http://schemas.openxmlformats.org/officeDocument/2006/relationships" xmlns:p="http://schemas.openxmlformats.org/presentationml/2006/main">
+  <p:cSld>
+    <p:spTree>
+      <p:nvGrpSpPr>
+        <p:cNvPr id="1" name=""/>
+        <p:cNvGrpSpPr/>
+        <p:nvPr/>
+      </p:nvGrpSpPr>
+      <p:grpSpPr>
+        <a:xfrm>
+          <a:off x="0" y="0"/>
+          <a:ext cx="0" cy="0"/>
+          <a:chOff x="0" y="0"/>
+          <a:chExt cx="0" cy="0"/>
+        </a:xfrm>
+      </p:grpSpPr>
+      <p:sp>
+        <p:nvSpPr>
+          <p:cNvPr id="4" name="Title 3">
+            <a:extLst>
+              <a:ext uri="{FF2B5EF4-FFF2-40B4-BE49-F238E27FC236}">
+                <a16:creationId xmlns:a16="http://schemas.microsoft.com/office/drawing/2014/main" id="{8C8565BB-2531-430C-A59B-4487A69AEA87}"/>
+              </a:ext>
+            </a:extLst>
+          </p:cNvPr>
+          <p:cNvSpPr>
+            <a:spLocks noGrp="1"/>
+          </p:cNvSpPr>
+          <p:nvPr>
+            <p:ph type="title"/>
+          </p:nvPr>
+        </p:nvSpPr>
+        <p:spPr/>
+        <p:txBody>
+          <a:bodyPr/>
+          <a:lstStyle/>
+          <a:p>
+            <a:r>
+              <a:rPr lang="en-US" dirty="0"/>
+              <a:t>Problem Statement</a:t>
+            </a:r>
+          </a:p>
+        </p:txBody>
+      </p:sp>
+      <p:sp>
+        <p:nvSpPr>
+          <p:cNvPr id="5" name="Content Placeholder 4">
+            <a:extLst>
+              <a:ext uri="{FF2B5EF4-FFF2-40B4-BE49-F238E27FC236}">
+                <a16:creationId xmlns:a16="http://schemas.microsoft.com/office/drawing/2014/main" id="{F22C8E20-FEFE-4B6F-A0C8-7DFC221D88AF}"/>
+              </a:ext>
+            </a:extLst>
+          </p:cNvPr>
+          <p:cNvSpPr>
+            <a:spLocks noGrp="1"/>
+          </p:cNvSpPr>
+          <p:nvPr>
+            <p:ph sz="quarter" idx="10"/>
+          </p:nvPr>
+        </p:nvSpPr>
+        <p:spPr>
+          <a:xfrm>
+            <a:off x="838200" y="1484784"/>
+            <a:ext cx="10515600" cy="5184576"/>
+          </a:xfrm>
+        </p:spPr>
+        <p:txBody>
+          <a:bodyPr/>
+          <a:lstStyle/>
+          <a:p>
+            <a:pPr marL="0" indent="0">
+              <a:buNone/>
+            </a:pPr>
+            <a:r>
+              <a:rPr lang="en-US" sz="1800" noProof="1">
+                <a:solidFill>
+                  <a:srgbClr val="0000FF"/>
+                </a:solidFill>
+                <a:latin typeface="Consolas" panose="020B0609020204030204" pitchFamily="49" charset="0"/>
+              </a:rPr>
+              <a:t>public async</a:t>
+            </a:r>
+            <a:r>
+              <a:rPr lang="en-US" sz="1800" noProof="1">
+                <a:latin typeface="Consolas" panose="020B0609020204030204" pitchFamily="49" charset="0"/>
+              </a:rPr>
+              <a:t> </a:t>
+            </a:r>
+            <a:r>
+              <a:rPr lang="en-US" sz="1800" noProof="1">
+                <a:solidFill>
+                  <a:srgbClr val="2D91AF"/>
+                </a:solidFill>
+                <a:latin typeface="Consolas" panose="020B0609020204030204" pitchFamily="49" charset="0"/>
+              </a:rPr>
+              <a:t>Task</a:t>
+            </a:r>
+            <a:r>
+              <a:rPr lang="en-US" sz="1800" noProof="1">
+                <a:latin typeface="Consolas" panose="020B0609020204030204" pitchFamily="49" charset="0"/>
+              </a:rPr>
+              <a:t>&lt;</a:t>
+            </a:r>
+            <a:r>
+              <a:rPr lang="en-US" sz="1800" noProof="1">
+                <a:solidFill>
+                  <a:srgbClr val="2D91AF"/>
+                </a:solidFill>
+                <a:latin typeface="Consolas" panose="020B0609020204030204" pitchFamily="49" charset="0"/>
+              </a:rPr>
+              <a:t>IActionResult</a:t>
+            </a:r>
+            <a:r>
+              <a:rPr lang="en-US" sz="1800" noProof="1">
+                <a:latin typeface="Consolas" panose="020B0609020204030204" pitchFamily="49" charset="0"/>
+              </a:rPr>
+              <a:t>&gt; UpgradeAccount(</a:t>
+            </a:r>
+            <a:r>
+              <a:rPr lang="en-US" sz="1800" noProof="1">
+                <a:solidFill>
+                  <a:srgbClr val="2D91AF"/>
+                </a:solidFill>
+                <a:latin typeface="Consolas" panose="020B0609020204030204" pitchFamily="49" charset="0"/>
+              </a:rPr>
+              <a:t>UpgradeDto</a:t>
+            </a:r>
+            <a:r>
+              <a:rPr lang="en-US" sz="1800" noProof="1">
+                <a:latin typeface="Consolas" panose="020B0609020204030204" pitchFamily="49" charset="0"/>
+              </a:rPr>
+              <a:t> upgradeDto)</a:t>
+            </a:r>
+          </a:p>
+          <a:p>
+            <a:pPr marL="0" indent="0">
+              <a:buNone/>
+            </a:pPr>
+            <a:r>
+              <a:rPr lang="en-US" sz="1800" noProof="1">
+                <a:latin typeface="Consolas" panose="020B0609020204030204" pitchFamily="49" charset="0"/>
+              </a:rPr>
+              <a:t>{</a:t>
+            </a:r>
+          </a:p>
+          <a:p>
+            <a:pPr marL="0" indent="0">
+              <a:buNone/>
+            </a:pPr>
+            <a:r>
+              <a:rPr lang="en-US" sz="1800" noProof="1">
+                <a:latin typeface="Consolas" panose="020B0609020204030204" pitchFamily="49" charset="0"/>
+              </a:rPr>
+              <a:t>    upgradeDto.EnsureValidity();</a:t>
+            </a:r>
+          </a:p>
+          <a:p>
+            <a:pPr marL="0" indent="0">
+              <a:buNone/>
+            </a:pPr>
+            <a:endParaRPr lang="en-US" sz="1800" noProof="1">
+              <a:latin typeface="Consolas" panose="020B0609020204030204" pitchFamily="49" charset="0"/>
+            </a:endParaRPr>
+          </a:p>
+          <a:p>
+            <a:pPr marL="0" indent="0">
+              <a:buNone/>
+            </a:pPr>
+            <a:r>
+              <a:rPr lang="en-US" sz="1800" noProof="1">
+                <a:latin typeface="Consolas" panose="020B0609020204030204" pitchFamily="49" charset="0"/>
+              </a:rPr>
+              <a:t>    </a:t>
+            </a:r>
+            <a:r>
+              <a:rPr lang="en-US" sz="1800" noProof="1">
+                <a:solidFill>
+                  <a:srgbClr val="2D91AF"/>
+                </a:solidFill>
+                <a:latin typeface="Consolas" panose="020B0609020204030204" pitchFamily="49" charset="0"/>
+              </a:rPr>
+              <a:t>IUpgradeAction</a:t>
+            </a:r>
+            <a:r>
+              <a:rPr lang="en-US" sz="1800" noProof="1">
+                <a:latin typeface="Consolas" panose="020B0609020204030204" pitchFamily="49" charset="0"/>
+              </a:rPr>
+              <a:t> upgradeAction;</a:t>
+            </a:r>
+          </a:p>
+          <a:p>
+            <a:pPr marL="0" indent="0">
+              <a:buNone/>
+            </a:pPr>
+            <a:r>
+              <a:rPr lang="en-US" sz="1800" noProof="1">
+                <a:latin typeface="Consolas" panose="020B0609020204030204" pitchFamily="49" charset="0"/>
+              </a:rPr>
+              <a:t>    </a:t>
+            </a:r>
+            <a:r>
+              <a:rPr lang="en-US" sz="1800" noProof="1">
+                <a:solidFill>
+                  <a:srgbClr val="0000FF"/>
+                </a:solidFill>
+                <a:latin typeface="Consolas" panose="020B0609020204030204" pitchFamily="49" charset="0"/>
+              </a:rPr>
+              <a:t>if</a:t>
+            </a:r>
+            <a:r>
+              <a:rPr lang="en-US" sz="1800" noProof="1">
+                <a:latin typeface="Consolas" panose="020B0609020204030204" pitchFamily="49" charset="0"/>
+              </a:rPr>
+              <a:t> (upgradeDto.NewLevel == </a:t>
+            </a:r>
+            <a:r>
+              <a:rPr lang="en-US" sz="1800" noProof="1">
+                <a:solidFill>
+                  <a:srgbClr val="C00000"/>
+                </a:solidFill>
+                <a:latin typeface="Consolas" panose="020B0609020204030204" pitchFamily="49" charset="0"/>
+              </a:rPr>
+              <a:t>“Gold”</a:t>
+            </a:r>
+            <a:r>
+              <a:rPr lang="en-US" sz="1800" noProof="1">
+                <a:latin typeface="Consolas" panose="020B0609020204030204" pitchFamily="49" charset="0"/>
+              </a:rPr>
+              <a:t>)</a:t>
+            </a:r>
+          </a:p>
+          <a:p>
+            <a:pPr marL="0" indent="0">
+              <a:buNone/>
+            </a:pPr>
+            <a:r>
+              <a:rPr lang="en-US" sz="1800" noProof="1">
+                <a:latin typeface="Consolas" panose="020B0609020204030204" pitchFamily="49" charset="0"/>
+              </a:rPr>
+              <a:t>        upgradeAction = </a:t>
+            </a:r>
+            <a:r>
+              <a:rPr lang="en-US" sz="1800" noProof="1">
+                <a:solidFill>
+                  <a:srgbClr val="0000FF"/>
+                </a:solidFill>
+                <a:latin typeface="Consolas" panose="020B0609020204030204" pitchFamily="49" charset="0"/>
+              </a:rPr>
+              <a:t>new</a:t>
+            </a:r>
+            <a:r>
+              <a:rPr lang="en-US" sz="1800" noProof="1">
+                <a:latin typeface="Consolas" panose="020B0609020204030204" pitchFamily="49" charset="0"/>
+              </a:rPr>
+              <a:t> </a:t>
+            </a:r>
+            <a:r>
+              <a:rPr lang="en-US" sz="1800" noProof="1">
+                <a:solidFill>
+                  <a:srgbClr val="2D91AF"/>
+                </a:solidFill>
+                <a:latin typeface="Consolas" panose="020B0609020204030204" pitchFamily="49" charset="0"/>
+              </a:rPr>
+              <a:t>GoldUpgradeAction</a:t>
+            </a:r>
+            <a:r>
+              <a:rPr lang="en-US" sz="1800" noProof="1">
+                <a:latin typeface="Consolas" panose="020B0609020204030204" pitchFamily="49" charset="0"/>
+              </a:rPr>
+              <a:t>();</a:t>
+            </a:r>
+          </a:p>
+          <a:p>
+            <a:pPr marL="0" indent="0">
+              <a:buNone/>
+            </a:pPr>
+            <a:r>
+              <a:rPr lang="en-US" sz="1800" noProof="1">
+                <a:latin typeface="Consolas" panose="020B0609020204030204" pitchFamily="49" charset="0"/>
+              </a:rPr>
+              <a:t>    </a:t>
+            </a:r>
+            <a:r>
+              <a:rPr lang="en-US" sz="1800" noProof="1">
+                <a:solidFill>
+                  <a:srgbClr val="0000FF"/>
+                </a:solidFill>
+                <a:latin typeface="Consolas" panose="020B0609020204030204" pitchFamily="49" charset="0"/>
+              </a:rPr>
+              <a:t>else</a:t>
+            </a:r>
+          </a:p>
+          <a:p>
+            <a:pPr marL="0" indent="0">
+              <a:buNone/>
+            </a:pPr>
+            <a:r>
+              <a:rPr lang="en-US" sz="1800" noProof="1">
+                <a:latin typeface="Consolas" panose="020B0609020204030204" pitchFamily="49" charset="0"/>
+              </a:rPr>
+              <a:t>        upgradeAction = </a:t>
+            </a:r>
+            <a:r>
+              <a:rPr lang="en-US" sz="1800" noProof="1">
+                <a:solidFill>
+                  <a:srgbClr val="0000FF"/>
+                </a:solidFill>
+                <a:latin typeface="Consolas" panose="020B0609020204030204" pitchFamily="49" charset="0"/>
+              </a:rPr>
+              <a:t>new</a:t>
+            </a:r>
+            <a:r>
+              <a:rPr lang="en-US" sz="1800" noProof="1">
+                <a:latin typeface="Consolas" panose="020B0609020204030204" pitchFamily="49" charset="0"/>
+              </a:rPr>
+              <a:t> </a:t>
+            </a:r>
+            <a:r>
+              <a:rPr lang="en-US" sz="1800" noProof="1">
+                <a:solidFill>
+                  <a:srgbClr val="2D91AF"/>
+                </a:solidFill>
+                <a:latin typeface="Consolas" panose="020B0609020204030204" pitchFamily="49" charset="0"/>
+              </a:rPr>
+              <a:t>SilverUpgradeAction</a:t>
+            </a:r>
+            <a:r>
+              <a:rPr lang="en-US" sz="1800" noProof="1">
+                <a:latin typeface="Consolas" panose="020B0609020204030204" pitchFamily="49" charset="0"/>
+              </a:rPr>
+              <a:t>();</a:t>
+            </a:r>
+          </a:p>
+          <a:p>
+            <a:pPr marL="0" indent="0">
+              <a:buNone/>
+            </a:pPr>
+            <a:endParaRPr lang="en-US" sz="1800" noProof="1">
+              <a:latin typeface="Consolas" panose="020B0609020204030204" pitchFamily="49" charset="0"/>
+            </a:endParaRPr>
+          </a:p>
+          <a:p>
+            <a:pPr marL="0" indent="0">
+              <a:buNone/>
+            </a:pPr>
+            <a:r>
+              <a:rPr lang="en-US" sz="1800" noProof="1">
+                <a:latin typeface="Consolas" panose="020B0609020204030204" pitchFamily="49" charset="0"/>
+              </a:rPr>
+              <a:t>    </a:t>
+            </a:r>
+            <a:r>
+              <a:rPr lang="en-US" sz="1800" noProof="1">
+                <a:solidFill>
+                  <a:srgbClr val="0000FF"/>
+                </a:solidFill>
+                <a:latin typeface="Consolas" panose="020B0609020204030204" pitchFamily="49" charset="0"/>
+              </a:rPr>
+              <a:t>var</a:t>
+            </a:r>
+            <a:r>
+              <a:rPr lang="en-US" sz="1800" noProof="1">
+                <a:latin typeface="Consolas" panose="020B0609020204030204" pitchFamily="49" charset="0"/>
+              </a:rPr>
+              <a:t> process = </a:t>
+            </a:r>
+            <a:r>
+              <a:rPr lang="en-US" sz="1800" noProof="1">
+                <a:solidFill>
+                  <a:srgbClr val="0000FF"/>
+                </a:solidFill>
+                <a:latin typeface="Consolas" panose="020B0609020204030204" pitchFamily="49" charset="0"/>
+              </a:rPr>
+              <a:t>new</a:t>
+            </a:r>
+            <a:r>
+              <a:rPr lang="en-US" sz="1800" noProof="1">
+                <a:latin typeface="Consolas" panose="020B0609020204030204" pitchFamily="49" charset="0"/>
+              </a:rPr>
+              <a:t> </a:t>
+            </a:r>
+            <a:r>
+              <a:rPr lang="en-US" sz="1800" noProof="1">
+                <a:solidFill>
+                  <a:srgbClr val="2D91AF"/>
+                </a:solidFill>
+                <a:latin typeface="Consolas" panose="020B0609020204030204" pitchFamily="49" charset="0"/>
+              </a:rPr>
+              <a:t>UpgradeAccountProcess</a:t>
+            </a:r>
+            <a:r>
+              <a:rPr lang="en-US" sz="1800" noProof="1">
+                <a:latin typeface="Consolas" panose="020B0609020204030204" pitchFamily="49" charset="0"/>
+              </a:rPr>
+              <a:t>(upgradeDto.CustomerId,</a:t>
+            </a:r>
+          </a:p>
+          <a:p>
+            <a:pPr marL="0" indent="0">
+              <a:buNone/>
+            </a:pPr>
+            <a:r>
+              <a:rPr lang="en-US" sz="1800" noProof="1">
+                <a:latin typeface="Consolas" panose="020B0609020204030204" pitchFamily="49" charset="0"/>
+              </a:rPr>
+              <a:t>                                            upgradeAction,</a:t>
+            </a:r>
+          </a:p>
+          <a:p>
+            <a:pPr marL="0" indent="0">
+              <a:buNone/>
+            </a:pPr>
+            <a:r>
+              <a:rPr lang="en-US" sz="1800" noProof="1">
+                <a:latin typeface="Consolas" panose="020B0609020204030204" pitchFamily="49" charset="0"/>
+              </a:rPr>
+              <a:t>                                            _accountRepository);</a:t>
+            </a:r>
+          </a:p>
+          <a:p>
+            <a:pPr marL="0" indent="0">
+              <a:buNone/>
+            </a:pPr>
+            <a:r>
+              <a:rPr lang="en-US" sz="1800" noProof="1">
+                <a:latin typeface="Consolas" panose="020B0609020204030204" pitchFamily="49" charset="0"/>
+              </a:rPr>
+              <a:t>    </a:t>
+            </a:r>
+            <a:r>
+              <a:rPr lang="en-US" sz="1800" noProof="1">
+                <a:solidFill>
+                  <a:srgbClr val="0000FF"/>
+                </a:solidFill>
+                <a:latin typeface="Consolas" panose="020B0609020204030204" pitchFamily="49" charset="0"/>
+              </a:rPr>
+              <a:t>var</a:t>
+            </a:r>
+            <a:r>
+              <a:rPr lang="en-US" sz="1800" noProof="1">
+                <a:latin typeface="Consolas" panose="020B0609020204030204" pitchFamily="49" charset="0"/>
+              </a:rPr>
+              <a:t> upgradedAccount = </a:t>
+            </a:r>
+            <a:r>
+              <a:rPr lang="en-US" sz="1800" noProof="1">
+                <a:solidFill>
+                  <a:srgbClr val="0000FF"/>
+                </a:solidFill>
+                <a:latin typeface="Consolas" panose="020B0609020204030204" pitchFamily="49" charset="0"/>
+              </a:rPr>
+              <a:t>await</a:t>
+            </a:r>
+            <a:r>
+              <a:rPr lang="en-US" sz="1800" noProof="1">
+                <a:latin typeface="Consolas" panose="020B0609020204030204" pitchFamily="49" charset="0"/>
+              </a:rPr>
+              <a:t> process.ExecuteAsync();</a:t>
+            </a:r>
+          </a:p>
+          <a:p>
+            <a:pPr marL="0" indent="0">
+              <a:buNone/>
+            </a:pPr>
+            <a:r>
+              <a:rPr lang="en-US" sz="1800" noProof="1">
+                <a:latin typeface="Consolas" panose="020B0609020204030204" pitchFamily="49" charset="0"/>
+              </a:rPr>
+              <a:t>    </a:t>
+            </a:r>
+            <a:r>
+              <a:rPr lang="en-US" sz="1800" noProof="1">
+                <a:solidFill>
+                  <a:srgbClr val="0000FF"/>
+                </a:solidFill>
+                <a:latin typeface="Consolas" panose="020B0609020204030204" pitchFamily="49" charset="0"/>
+              </a:rPr>
+              <a:t>return</a:t>
+            </a:r>
+            <a:r>
+              <a:rPr lang="en-US" sz="1800" noProof="1">
+                <a:latin typeface="Consolas" panose="020B0609020204030204" pitchFamily="49" charset="0"/>
+              </a:rPr>
+              <a:t> Ok(upgradedAccount);                                </a:t>
+            </a:r>
+          </a:p>
+          <a:p>
+            <a:pPr marL="0" indent="0">
+              <a:buNone/>
+            </a:pPr>
+            <a:r>
+              <a:rPr lang="en-US" sz="1800" noProof="1">
+                <a:latin typeface="Consolas" panose="020B0609020204030204" pitchFamily="49" charset="0"/>
+              </a:rPr>
+              <a:t>}</a:t>
+            </a:r>
+          </a:p>
+        </p:txBody>
+      </p:sp>
+    </p:spTree>
+    <p:extLst>
+      <p:ext uri="{BB962C8B-B14F-4D97-AF65-F5344CB8AC3E}">
+        <p14:creationId xmlns:p14="http://schemas.microsoft.com/office/powerpoint/2010/main" val="463440859"/>
+      </p:ext>
+    </p:extLst>
+  </p:cSld>
+  <p:clrMapOvr>
+    <a:masterClrMapping/>
+  </p:clrMapOvr>
+  <p:transition spd="med">
+    <p:pull/>
+  </p:transition>
+</p:sld>
+</file>
+
+<file path=ppt/slides/slide32.xml><?xml version="1.0" encoding="utf-8"?>
+<p:sld xmlns:a="http://schemas.openxmlformats.org/drawingml/2006/main" xmlns:r="http://schemas.openxmlformats.org/officeDocument/2006/relationships" xmlns:p="http://schemas.openxmlformats.org/presentationml/2006/main">
+  <p:cSld>
+    <p:spTree>
+      <p:nvGrpSpPr>
+        <p:cNvPr id="1" name=""/>
+        <p:cNvGrpSpPr/>
+        <p:nvPr/>
+      </p:nvGrpSpPr>
+      <p:grpSpPr>
+        <a:xfrm>
+          <a:off x="0" y="0"/>
+          <a:ext cx="0" cy="0"/>
+          <a:chOff x="0" y="0"/>
+          <a:chExt cx="0" cy="0"/>
+        </a:xfrm>
+      </p:grpSpPr>
+      <p:sp>
+        <p:nvSpPr>
+          <p:cNvPr id="2" name="Title 1">
+            <a:extLst>
+              <a:ext uri="{FF2B5EF4-FFF2-40B4-BE49-F238E27FC236}">
+                <a16:creationId xmlns:a16="http://schemas.microsoft.com/office/drawing/2014/main" id="{FCE471FB-0CF3-4637-87D9-B66F481D2807}"/>
+              </a:ext>
+            </a:extLst>
+          </p:cNvPr>
+          <p:cNvSpPr>
+            <a:spLocks noGrp="1"/>
+          </p:cNvSpPr>
+          <p:nvPr>
+            <p:ph type="title"/>
+          </p:nvPr>
+        </p:nvSpPr>
+        <p:spPr>
+          <a:xfrm>
+            <a:off x="3071664" y="365125"/>
+            <a:ext cx="8282136" cy="1047651"/>
+          </a:xfrm>
+        </p:spPr>
+        <p:txBody>
+          <a:bodyPr/>
+          <a:lstStyle/>
+          <a:p>
+            <a:r>
+              <a:rPr lang="en-US" dirty="0"/>
+              <a:t>Plumbing Code at the Boundaries</a:t>
+            </a:r>
+          </a:p>
+        </p:txBody>
+      </p:sp>
+      <p:sp>
+        <p:nvSpPr>
+          <p:cNvPr id="3" name="Content Placeholder 2">
+            <a:extLst>
+              <a:ext uri="{FF2B5EF4-FFF2-40B4-BE49-F238E27FC236}">
+                <a16:creationId xmlns:a16="http://schemas.microsoft.com/office/drawing/2014/main" id="{33ABC69A-C776-4965-B9FC-C2233AA17EB2}"/>
+              </a:ext>
+            </a:extLst>
+          </p:cNvPr>
+          <p:cNvSpPr>
+            <a:spLocks noGrp="1"/>
+          </p:cNvSpPr>
+          <p:nvPr>
+            <p:ph sz="quarter" idx="10"/>
+          </p:nvPr>
+        </p:nvSpPr>
+        <p:spPr/>
+        <p:txBody>
+          <a:bodyPr/>
+          <a:lstStyle/>
+          <a:p>
+            <a:r>
+              <a:rPr lang="en-US" dirty="0"/>
+              <a:t>In ASP.NET Core POST Controller Actions, we tend to accept DTOs and “parse” them manually to an appropriate object graph. </a:t>
+            </a:r>
+          </a:p>
+          <a:p>
+            <a:r>
+              <a:rPr lang="en-US" dirty="0"/>
+              <a:t>This graph is then used to achieve side effects (e.g. change data in the database).</a:t>
+            </a:r>
+          </a:p>
+          <a:p>
+            <a:r>
+              <a:rPr lang="en-US" dirty="0"/>
+              <a:t>This often applies to loading entities from the database, too (either transforming entities to Domain Objects, or having an </a:t>
+            </a:r>
+            <a:r>
+              <a:rPr lang="en-US" dirty="0">
+                <a:hlinkClick r:id="rId2"/>
+              </a:rPr>
+              <a:t>Anemic Domain Model</a:t>
+            </a:r>
+            <a:r>
+              <a:rPr lang="en-US" dirty="0"/>
+              <a:t>)</a:t>
+            </a:r>
+          </a:p>
+          <a:p>
+            <a:endParaRPr lang="en-US" dirty="0"/>
+          </a:p>
+          <a:p>
+            <a:endParaRPr lang="en-US" dirty="0"/>
+          </a:p>
+          <a:p>
+            <a:endParaRPr lang="en-US" dirty="0"/>
+          </a:p>
+        </p:txBody>
+      </p:sp>
+      <p:sp>
+        <p:nvSpPr>
+          <p:cNvPr id="4" name="Date Placeholder 3">
+            <a:extLst>
+              <a:ext uri="{FF2B5EF4-FFF2-40B4-BE49-F238E27FC236}">
+                <a16:creationId xmlns:a16="http://schemas.microsoft.com/office/drawing/2014/main" id="{3E040FC6-CAD1-405B-99E0-30C9EF0F81AD}"/>
+              </a:ext>
+            </a:extLst>
+          </p:cNvPr>
+          <p:cNvSpPr>
+            <a:spLocks noGrp="1"/>
+          </p:cNvSpPr>
+          <p:nvPr>
+            <p:ph type="dt" sz="half" idx="11"/>
+          </p:nvPr>
+        </p:nvSpPr>
+        <p:spPr/>
+        <p:txBody>
+          <a:bodyPr/>
+          <a:lstStyle/>
+          <a:p>
+            <a:r>
+              <a:rPr lang="de-DE"/>
+              <a:t>19.09.2017</a:t>
+            </a:r>
+          </a:p>
+        </p:txBody>
+      </p:sp>
+      <p:sp>
+        <p:nvSpPr>
+          <p:cNvPr id="5" name="Slide Number Placeholder 4">
+            <a:extLst>
+              <a:ext uri="{FF2B5EF4-FFF2-40B4-BE49-F238E27FC236}">
+                <a16:creationId xmlns:a16="http://schemas.microsoft.com/office/drawing/2014/main" id="{76288594-8187-45CA-B91C-04D174710247}"/>
+              </a:ext>
+            </a:extLst>
+          </p:cNvPr>
+          <p:cNvSpPr>
+            <a:spLocks noGrp="1"/>
+          </p:cNvSpPr>
+          <p:nvPr>
+            <p:ph type="sldNum" sz="quarter" idx="13"/>
+          </p:nvPr>
+        </p:nvSpPr>
+        <p:spPr/>
+        <p:txBody>
+          <a:bodyPr/>
+          <a:lstStyle/>
+          <a:p>
+            <a:fld id="{3AA5FB2A-BCB4-4E64-AAE1-BAC1A8A5655D}" type="slidenum">
+              <a:rPr lang="de-DE" smtClean="0"/>
+              <a:pPr/>
+              <a:t>32</a:t>
+            </a:fld>
+            <a:endParaRPr lang="de-DE"/>
+          </a:p>
+        </p:txBody>
+      </p:sp>
+    </p:spTree>
+    <p:extLst>
+      <p:ext uri="{BB962C8B-B14F-4D97-AF65-F5344CB8AC3E}">
+        <p14:creationId xmlns:p14="http://schemas.microsoft.com/office/powerpoint/2010/main" val="3951442497"/>
+      </p:ext>
+    </p:extLst>
+  </p:cSld>
+  <p:clrMapOvr>
+    <a:masterClrMapping/>
+  </p:clrMapOvr>
+  <p:transition spd="med">
+    <p:pull/>
+  </p:transition>
+</p:sld>
+</file>
+
+<file path=ppt/slides/slide33.xml><?xml version="1.0" encoding="utf-8"?>
+<p:sld xmlns:a="http://schemas.openxmlformats.org/drawingml/2006/main" xmlns:r="http://schemas.openxmlformats.org/officeDocument/2006/relationships" xmlns:p="http://schemas.openxmlformats.org/presentationml/2006/main">
+  <p:cSld>
+    <p:spTree>
+      <p:nvGrpSpPr>
+        <p:cNvPr id="1" name=""/>
+        <p:cNvGrpSpPr/>
+        <p:nvPr/>
+      </p:nvGrpSpPr>
+      <p:grpSpPr>
+        <a:xfrm>
+          <a:off x="0" y="0"/>
+          <a:ext cx="0" cy="0"/>
+          <a:chOff x="0" y="0"/>
+          <a:chExt cx="0" cy="0"/>
+        </a:xfrm>
+      </p:grpSpPr>
+      <p:sp>
+        <p:nvSpPr>
+          <p:cNvPr id="2" name="Title 1">
+            <a:extLst>
+              <a:ext uri="{FF2B5EF4-FFF2-40B4-BE49-F238E27FC236}">
+                <a16:creationId xmlns:a16="http://schemas.microsoft.com/office/drawing/2014/main" id="{64C3776A-2F08-4FBE-BB6D-643BAC6AAC54}"/>
+              </a:ext>
+            </a:extLst>
+          </p:cNvPr>
+          <p:cNvSpPr>
+            <a:spLocks noGrp="1"/>
+          </p:cNvSpPr>
+          <p:nvPr>
+            <p:ph type="title"/>
+          </p:nvPr>
+        </p:nvSpPr>
+        <p:spPr>
+          <a:xfrm>
+            <a:off x="2783632" y="365125"/>
+            <a:ext cx="8570168" cy="1047651"/>
+          </a:xfrm>
+        </p:spPr>
+        <p:txBody>
+          <a:bodyPr/>
+          <a:lstStyle/>
+          <a:p>
+            <a:r>
+              <a:rPr lang="en-US" dirty="0"/>
+              <a:t>My Goal: Rich Deserialization</a:t>
+            </a:r>
+          </a:p>
+        </p:txBody>
+      </p:sp>
+      <p:sp>
+        <p:nvSpPr>
+          <p:cNvPr id="3" name="Content Placeholder 2">
+            <a:extLst>
+              <a:ext uri="{FF2B5EF4-FFF2-40B4-BE49-F238E27FC236}">
+                <a16:creationId xmlns:a16="http://schemas.microsoft.com/office/drawing/2014/main" id="{EA6F4AB8-7143-42E4-A261-3784819DB2B8}"/>
+              </a:ext>
+            </a:extLst>
+          </p:cNvPr>
+          <p:cNvSpPr>
+            <a:spLocks noGrp="1"/>
+          </p:cNvSpPr>
+          <p:nvPr>
+            <p:ph sz="quarter" idx="10"/>
+          </p:nvPr>
+        </p:nvSpPr>
+        <p:spPr/>
+        <p:txBody>
+          <a:bodyPr/>
+          <a:lstStyle/>
+          <a:p>
+            <a:pPr marL="0" indent="0">
+              <a:buNone/>
+            </a:pPr>
+            <a:r>
+              <a:rPr lang="en-US" sz="1800" noProof="1">
+                <a:solidFill>
+                  <a:srgbClr val="0000FF"/>
+                </a:solidFill>
+                <a:latin typeface="Consolas" panose="020B0609020204030204" pitchFamily="49" charset="0"/>
+              </a:rPr>
+              <a:t>public async</a:t>
+            </a:r>
+            <a:r>
+              <a:rPr lang="en-US" sz="1800" noProof="1">
+                <a:latin typeface="Consolas" panose="020B0609020204030204" pitchFamily="49" charset="0"/>
+              </a:rPr>
+              <a:t> </a:t>
+            </a:r>
+            <a:r>
+              <a:rPr lang="en-US" sz="1800" noProof="1">
+                <a:solidFill>
+                  <a:srgbClr val="2D91AF"/>
+                </a:solidFill>
+                <a:latin typeface="Consolas" panose="020B0609020204030204" pitchFamily="49" charset="0"/>
+              </a:rPr>
+              <a:t>Task</a:t>
+            </a:r>
+            <a:r>
+              <a:rPr lang="en-US" sz="1800" noProof="1">
+                <a:latin typeface="Consolas" panose="020B0609020204030204" pitchFamily="49" charset="0"/>
+              </a:rPr>
+              <a:t>&lt;</a:t>
+            </a:r>
+            <a:r>
+              <a:rPr lang="en-US" sz="1800" noProof="1">
+                <a:solidFill>
+                  <a:srgbClr val="2D91AF"/>
+                </a:solidFill>
+                <a:latin typeface="Consolas" panose="020B0609020204030204" pitchFamily="49" charset="0"/>
+              </a:rPr>
+              <a:t>IActionResult</a:t>
+            </a:r>
+            <a:r>
+              <a:rPr lang="en-US" sz="1800" noProof="1">
+                <a:latin typeface="Consolas" panose="020B0609020204030204" pitchFamily="49" charset="0"/>
+              </a:rPr>
+              <a:t>&gt; UpgradeAccount(</a:t>
+            </a:r>
+            <a:r>
+              <a:rPr lang="en-US" sz="1800" noProof="1">
+                <a:solidFill>
+                  <a:srgbClr val="2D91AF"/>
+                </a:solidFill>
+                <a:latin typeface="Consolas" panose="020B0609020204030204" pitchFamily="49" charset="0"/>
+              </a:rPr>
+              <a:t>UpdateAccountProcess</a:t>
+            </a:r>
+            <a:r>
+              <a:rPr lang="en-US" sz="1800" noProof="1">
+                <a:latin typeface="Consolas" panose="020B0609020204030204" pitchFamily="49" charset="0"/>
+              </a:rPr>
+              <a:t> process)</a:t>
+            </a:r>
+          </a:p>
+          <a:p>
+            <a:pPr marL="0" indent="0">
+              <a:buNone/>
+            </a:pPr>
+            <a:r>
+              <a:rPr lang="en-US" sz="1800" noProof="1">
+                <a:latin typeface="Consolas" panose="020B0609020204030204" pitchFamily="49" charset="0"/>
+              </a:rPr>
+              <a:t>{</a:t>
+            </a:r>
+          </a:p>
+          <a:p>
+            <a:pPr marL="0" indent="0">
+              <a:buNone/>
+            </a:pPr>
+            <a:r>
+              <a:rPr lang="en-US" sz="1800" noProof="1">
+                <a:latin typeface="Consolas" panose="020B0609020204030204" pitchFamily="49" charset="0"/>
+              </a:rPr>
+              <a:t>    process.MustNotBeNull();</a:t>
+            </a:r>
+          </a:p>
+          <a:p>
+            <a:pPr marL="0" indent="0">
+              <a:buNone/>
+            </a:pPr>
+            <a:endParaRPr lang="en-US" sz="1800" noProof="1">
+              <a:latin typeface="Consolas" panose="020B0609020204030204" pitchFamily="49" charset="0"/>
+            </a:endParaRPr>
+          </a:p>
+          <a:p>
+            <a:pPr marL="0" indent="0">
+              <a:buNone/>
+            </a:pPr>
+            <a:r>
+              <a:rPr lang="en-US" sz="1800" noProof="1">
+                <a:solidFill>
+                  <a:srgbClr val="0000FF"/>
+                </a:solidFill>
+                <a:latin typeface="Consolas" panose="020B0609020204030204" pitchFamily="49" charset="0"/>
+              </a:rPr>
+              <a:t>    var</a:t>
+            </a:r>
+            <a:r>
+              <a:rPr lang="en-US" sz="1800" noProof="1">
+                <a:latin typeface="Consolas" panose="020B0609020204030204" pitchFamily="49" charset="0"/>
+              </a:rPr>
+              <a:t> upgradedAccount = </a:t>
+            </a:r>
+            <a:r>
+              <a:rPr lang="en-US" sz="1800" noProof="1">
+                <a:solidFill>
+                  <a:srgbClr val="0000FF"/>
+                </a:solidFill>
+                <a:latin typeface="Consolas" panose="020B0609020204030204" pitchFamily="49" charset="0"/>
+              </a:rPr>
+              <a:t>await</a:t>
+            </a:r>
+            <a:r>
+              <a:rPr lang="en-US" sz="1800" noProof="1">
+                <a:latin typeface="Consolas" panose="020B0609020204030204" pitchFamily="49" charset="0"/>
+              </a:rPr>
+              <a:t> process.ExecuteAsync();</a:t>
+            </a:r>
+          </a:p>
+          <a:p>
+            <a:pPr marL="0" indent="0">
+              <a:buNone/>
+            </a:pPr>
+            <a:r>
+              <a:rPr lang="en-US" sz="1800" noProof="1">
+                <a:latin typeface="Consolas" panose="020B0609020204030204" pitchFamily="49" charset="0"/>
+              </a:rPr>
+              <a:t>    </a:t>
+            </a:r>
+            <a:r>
+              <a:rPr lang="en-US" sz="1800" noProof="1">
+                <a:solidFill>
+                  <a:srgbClr val="0000FF"/>
+                </a:solidFill>
+                <a:latin typeface="Consolas" panose="020B0609020204030204" pitchFamily="49" charset="0"/>
+              </a:rPr>
+              <a:t>return</a:t>
+            </a:r>
+            <a:r>
+              <a:rPr lang="en-US" sz="1800" noProof="1">
+                <a:latin typeface="Consolas" panose="020B0609020204030204" pitchFamily="49" charset="0"/>
+              </a:rPr>
+              <a:t> Ok(upgradedAccount);                                </a:t>
+            </a:r>
+          </a:p>
+          <a:p>
+            <a:pPr marL="0" indent="0">
+              <a:buNone/>
+            </a:pPr>
+            <a:r>
+              <a:rPr lang="en-US" sz="1800" noProof="1">
+                <a:latin typeface="Consolas" panose="020B0609020204030204" pitchFamily="49" charset="0"/>
+              </a:rPr>
+              <a:t>}</a:t>
+            </a:r>
+          </a:p>
+          <a:p>
+            <a:pPr marL="0" indent="0">
+              <a:buNone/>
+            </a:pPr>
+            <a:endParaRPr lang="en-US" dirty="0"/>
+          </a:p>
+        </p:txBody>
+      </p:sp>
+      <p:sp>
+        <p:nvSpPr>
+          <p:cNvPr id="4" name="Date Placeholder 3">
+            <a:extLst>
+              <a:ext uri="{FF2B5EF4-FFF2-40B4-BE49-F238E27FC236}">
+                <a16:creationId xmlns:a16="http://schemas.microsoft.com/office/drawing/2014/main" id="{7E506416-8C1D-407F-9DC1-CDC8CFEAAFA9}"/>
+              </a:ext>
+            </a:extLst>
+          </p:cNvPr>
+          <p:cNvSpPr>
+            <a:spLocks noGrp="1"/>
+          </p:cNvSpPr>
+          <p:nvPr>
+            <p:ph type="dt" sz="half" idx="11"/>
+          </p:nvPr>
+        </p:nvSpPr>
+        <p:spPr/>
+        <p:txBody>
+          <a:bodyPr/>
+          <a:lstStyle/>
+          <a:p>
+            <a:r>
+              <a:rPr lang="de-DE"/>
+              <a:t>19.09.2017</a:t>
+            </a:r>
+          </a:p>
+        </p:txBody>
+      </p:sp>
+      <p:sp>
+        <p:nvSpPr>
+          <p:cNvPr id="5" name="Slide Number Placeholder 4">
+            <a:extLst>
+              <a:ext uri="{FF2B5EF4-FFF2-40B4-BE49-F238E27FC236}">
+                <a16:creationId xmlns:a16="http://schemas.microsoft.com/office/drawing/2014/main" id="{E8F22A8B-799B-4EBE-91A9-97A523FD3B13}"/>
+              </a:ext>
+            </a:extLst>
+          </p:cNvPr>
+          <p:cNvSpPr>
+            <a:spLocks noGrp="1"/>
+          </p:cNvSpPr>
+          <p:nvPr>
+            <p:ph type="sldNum" sz="quarter" idx="13"/>
+          </p:nvPr>
+        </p:nvSpPr>
+        <p:spPr/>
+        <p:txBody>
+          <a:bodyPr/>
+          <a:lstStyle/>
+          <a:p>
+            <a:fld id="{3AA5FB2A-BCB4-4E64-AAE1-BAC1A8A5655D}" type="slidenum">
+              <a:rPr lang="de-DE" smtClean="0"/>
+              <a:pPr/>
+              <a:t>33</a:t>
+            </a:fld>
+            <a:endParaRPr lang="de-DE"/>
+          </a:p>
+        </p:txBody>
+      </p:sp>
+    </p:spTree>
+    <p:extLst>
+      <p:ext uri="{BB962C8B-B14F-4D97-AF65-F5344CB8AC3E}">
+        <p14:creationId xmlns:p14="http://schemas.microsoft.com/office/powerpoint/2010/main" val="1122202060"/>
+      </p:ext>
+    </p:extLst>
+  </p:cSld>
+  <p:clrMapOvr>
+    <a:masterClrMapping/>
+  </p:clrMapOvr>
+  <p:transition spd="med">
+    <p:pull/>
+  </p:transition>
+</p:sld>
+</file>
+
+<file path=ppt/slides/slide34.xml><?xml version="1.0" encoding="utf-8"?>
+<p:sld xmlns:a="http://schemas.openxmlformats.org/drawingml/2006/main" xmlns:r="http://schemas.openxmlformats.org/officeDocument/2006/relationships" xmlns:p="http://schemas.openxmlformats.org/presentationml/2006/main">
+  <p:cSld>
+    <p:spTree>
+      <p:nvGrpSpPr>
+        <p:cNvPr id="1" name=""/>
+        <p:cNvGrpSpPr/>
+        <p:nvPr/>
+      </p:nvGrpSpPr>
+      <p:grpSpPr>
+        <a:xfrm>
+          <a:off x="0" y="0"/>
+          <a:ext cx="0" cy="0"/>
+          <a:chOff x="0" y="0"/>
+          <a:chExt cx="0" cy="0"/>
+        </a:xfrm>
+      </p:grpSpPr>
+      <p:sp>
+        <p:nvSpPr>
+          <p:cNvPr id="2" name="Title 1">
+            <a:extLst>
+              <a:ext uri="{FF2B5EF4-FFF2-40B4-BE49-F238E27FC236}">
+                <a16:creationId xmlns:a16="http://schemas.microsoft.com/office/drawing/2014/main" id="{65346789-B989-4F2A-A279-DB09CABB02C0}"/>
+              </a:ext>
+            </a:extLst>
+          </p:cNvPr>
+          <p:cNvSpPr>
+            <a:spLocks noGrp="1"/>
+          </p:cNvSpPr>
+          <p:nvPr>
+            <p:ph type="title"/>
+          </p:nvPr>
+        </p:nvSpPr>
+        <p:spPr>
+          <a:xfrm>
+            <a:off x="2783632" y="365125"/>
+            <a:ext cx="8570168" cy="1047651"/>
+          </a:xfrm>
+        </p:spPr>
+        <p:txBody>
+          <a:bodyPr/>
+          <a:lstStyle/>
+          <a:p>
+            <a:r>
+              <a:rPr lang="en-US" sz="3600" dirty="0"/>
+              <a:t>Integrate </a:t>
+            </a:r>
+            <a:r>
+              <a:rPr lang="en-US" sz="3600" dirty="0" err="1"/>
+              <a:t>Deserializer</a:t>
+            </a:r>
+            <a:r>
+              <a:rPr lang="en-US" sz="3600" dirty="0"/>
+              <a:t> with DI Container</a:t>
+            </a:r>
+          </a:p>
+        </p:txBody>
+      </p:sp>
+      <p:sp>
+        <p:nvSpPr>
+          <p:cNvPr id="4" name="Date Placeholder 3">
+            <a:extLst>
+              <a:ext uri="{FF2B5EF4-FFF2-40B4-BE49-F238E27FC236}">
+                <a16:creationId xmlns:a16="http://schemas.microsoft.com/office/drawing/2014/main" id="{BFA38B58-40C7-4906-A4AA-0681282BD7EF}"/>
+              </a:ext>
+            </a:extLst>
+          </p:cNvPr>
+          <p:cNvSpPr>
+            <a:spLocks noGrp="1"/>
+          </p:cNvSpPr>
+          <p:nvPr>
+            <p:ph type="dt" sz="half" idx="11"/>
+          </p:nvPr>
+        </p:nvSpPr>
+        <p:spPr/>
+        <p:txBody>
+          <a:bodyPr/>
+          <a:lstStyle/>
+          <a:p>
+            <a:r>
+              <a:rPr lang="de-DE"/>
+              <a:t>19.09.2017</a:t>
+            </a:r>
+          </a:p>
+        </p:txBody>
+      </p:sp>
+      <p:sp>
+        <p:nvSpPr>
+          <p:cNvPr id="5" name="Slide Number Placeholder 4">
+            <a:extLst>
+              <a:ext uri="{FF2B5EF4-FFF2-40B4-BE49-F238E27FC236}">
+                <a16:creationId xmlns:a16="http://schemas.microsoft.com/office/drawing/2014/main" id="{6C2D7B70-6FFE-4FBB-8B61-5E6AAF1BAD5B}"/>
+              </a:ext>
+            </a:extLst>
+          </p:cNvPr>
+          <p:cNvSpPr>
+            <a:spLocks noGrp="1"/>
+          </p:cNvSpPr>
+          <p:nvPr>
+            <p:ph type="sldNum" sz="quarter" idx="13"/>
+          </p:nvPr>
+        </p:nvSpPr>
+        <p:spPr/>
+        <p:txBody>
+          <a:bodyPr/>
+          <a:lstStyle/>
+          <a:p>
+            <a:fld id="{3AA5FB2A-BCB4-4E64-AAE1-BAC1A8A5655D}" type="slidenum">
+              <a:rPr lang="de-DE" smtClean="0"/>
+              <a:pPr/>
+              <a:t>34</a:t>
+            </a:fld>
+            <a:endParaRPr lang="de-DE"/>
+          </a:p>
+        </p:txBody>
+      </p:sp>
+      <p:sp>
+        <p:nvSpPr>
+          <p:cNvPr id="6" name="Flowchart: Terminator 5">
+            <a:extLst>
+              <a:ext uri="{FF2B5EF4-FFF2-40B4-BE49-F238E27FC236}">
+                <a16:creationId xmlns:a16="http://schemas.microsoft.com/office/drawing/2014/main" id="{B185FE70-6EC5-4F1D-912C-09144D669F4C}"/>
+              </a:ext>
+            </a:extLst>
+          </p:cNvPr>
+          <p:cNvSpPr/>
+          <p:nvPr/>
+        </p:nvSpPr>
+        <p:spPr>
+          <a:xfrm>
+            <a:off x="597040" y="3332694"/>
+            <a:ext cx="953311" cy="412884"/>
+          </a:xfrm>
+          <a:prstGeom prst="flowChartTerminator">
+            <a:avLst/>
+          </a:prstGeom>
+        </p:spPr>
+        <p:style>
+          <a:lnRef idx="2">
+            <a:schemeClr val="accent1">
+              <a:shade val="50000"/>
+            </a:schemeClr>
+          </a:lnRef>
+          <a:fillRef idx="1">
+            <a:schemeClr val="accent1"/>
+          </a:fillRef>
+          <a:effectRef idx="0">
+            <a:schemeClr val="accent1"/>
+          </a:effectRef>
+          <a:fontRef idx="minor">
+            <a:schemeClr val="lt1"/>
+          </a:fontRef>
+        </p:style>
+        <p:txBody>
+          <a:bodyPr rtlCol="0" anchor="ctr"/>
+          <a:lstStyle/>
+          <a:p>
+            <a:pPr algn="ctr"/>
+            <a:r>
+              <a:rPr lang="de-DE" dirty="0"/>
+              <a:t>Start</a:t>
+            </a:r>
+          </a:p>
+        </p:txBody>
+      </p:sp>
+      <p:sp>
+        <p:nvSpPr>
+          <p:cNvPr id="7" name="Rectangle 6">
+            <a:extLst>
+              <a:ext uri="{FF2B5EF4-FFF2-40B4-BE49-F238E27FC236}">
+                <a16:creationId xmlns:a16="http://schemas.microsoft.com/office/drawing/2014/main" id="{6BED7659-C12E-4244-8F3E-A2FBC4EC855D}"/>
+              </a:ext>
+            </a:extLst>
+          </p:cNvPr>
+          <p:cNvSpPr/>
+          <p:nvPr/>
+        </p:nvSpPr>
+        <p:spPr>
+          <a:xfrm>
+            <a:off x="2654473" y="2724873"/>
+            <a:ext cx="2553428" cy="1642648"/>
+          </a:xfrm>
+          <a:prstGeom prst="rect">
+            <a:avLst/>
+          </a:prstGeom>
+        </p:spPr>
+        <p:style>
+          <a:lnRef idx="2">
+            <a:schemeClr val="accent1">
+              <a:shade val="50000"/>
+            </a:schemeClr>
+          </a:lnRef>
+          <a:fillRef idx="1">
+            <a:schemeClr val="accent1"/>
+          </a:fillRef>
+          <a:effectRef idx="0">
+            <a:schemeClr val="accent1"/>
+          </a:effectRef>
+          <a:fontRef idx="minor">
+            <a:schemeClr val="lt1"/>
+          </a:fontRef>
+        </p:style>
+        <p:txBody>
+          <a:bodyPr rtlCol="0" anchor="ctr"/>
+          <a:lstStyle/>
+          <a:p>
+            <a:pPr algn="ctr"/>
+            <a:r>
+              <a:rPr lang="en-US" sz="1600" dirty="0"/>
+              <a:t>Parse JSON Object</a:t>
+            </a:r>
+          </a:p>
+        </p:txBody>
+      </p:sp>
+      <p:sp>
+        <p:nvSpPr>
+          <p:cNvPr id="8" name="Rectangle: Folded Corner 7">
+            <a:extLst>
+              <a:ext uri="{FF2B5EF4-FFF2-40B4-BE49-F238E27FC236}">
+                <a16:creationId xmlns:a16="http://schemas.microsoft.com/office/drawing/2014/main" id="{DC2A94C8-AA47-4A60-8C07-03D7ECE0535A}"/>
+              </a:ext>
+            </a:extLst>
+          </p:cNvPr>
+          <p:cNvSpPr/>
+          <p:nvPr/>
+        </p:nvSpPr>
+        <p:spPr>
+          <a:xfrm>
+            <a:off x="2654474" y="4719953"/>
+            <a:ext cx="2553427" cy="1301335"/>
+          </a:xfrm>
+          <a:prstGeom prst="foldedCorner">
+            <a:avLst/>
+          </a:prstGeom>
+        </p:spPr>
+        <p:style>
+          <a:lnRef idx="2">
+            <a:schemeClr val="accent3">
+              <a:shade val="50000"/>
+            </a:schemeClr>
+          </a:lnRef>
+          <a:fillRef idx="1">
+            <a:schemeClr val="accent3"/>
+          </a:fillRef>
+          <a:effectRef idx="0">
+            <a:schemeClr val="accent3"/>
+          </a:effectRef>
+          <a:fontRef idx="minor">
+            <a:schemeClr val="lt1"/>
+          </a:fontRef>
+        </p:style>
+        <p:txBody>
+          <a:bodyPr rtlCol="0" anchor="ctr"/>
+          <a:lstStyle/>
+          <a:p>
+            <a:pPr algn="ctr"/>
+            <a:r>
+              <a:rPr lang="en-US" dirty="0"/>
+              <a:t>“kind” indicates type</a:t>
+            </a:r>
+          </a:p>
+          <a:p>
+            <a:pPr algn="ctr"/>
+            <a:r>
+              <a:rPr lang="en-US" dirty="0"/>
+              <a:t>(Domain-Friendly Name)</a:t>
+            </a:r>
+          </a:p>
+        </p:txBody>
+      </p:sp>
+      <p:sp>
+        <p:nvSpPr>
+          <p:cNvPr id="9" name="Rectangle 8">
+            <a:extLst>
+              <a:ext uri="{FF2B5EF4-FFF2-40B4-BE49-F238E27FC236}">
+                <a16:creationId xmlns:a16="http://schemas.microsoft.com/office/drawing/2014/main" id="{D72C29A6-998D-4532-8891-6D05ACFDF927}"/>
+              </a:ext>
+            </a:extLst>
+          </p:cNvPr>
+          <p:cNvSpPr/>
+          <p:nvPr/>
+        </p:nvSpPr>
+        <p:spPr>
+          <a:xfrm>
+            <a:off x="6312024" y="2722456"/>
+            <a:ext cx="3024336" cy="1645065"/>
+          </a:xfrm>
+          <a:prstGeom prst="rect">
+            <a:avLst/>
+          </a:prstGeom>
+        </p:spPr>
+        <p:style>
+          <a:lnRef idx="2">
+            <a:schemeClr val="accent1">
+              <a:shade val="50000"/>
+            </a:schemeClr>
+          </a:lnRef>
+          <a:fillRef idx="1">
+            <a:schemeClr val="accent1"/>
+          </a:fillRef>
+          <a:effectRef idx="0">
+            <a:schemeClr val="accent1"/>
+          </a:effectRef>
+          <a:fontRef idx="minor">
+            <a:schemeClr val="lt1"/>
+          </a:fontRef>
+        </p:style>
+        <p:txBody>
+          <a:bodyPr rtlCol="0" anchor="ctr"/>
+          <a:lstStyle/>
+          <a:p>
+            <a:pPr algn="ctr"/>
+            <a:r>
+              <a:rPr lang="en-US" sz="1600" dirty="0"/>
+              <a:t>Ask the DI Container to instantiate the target type</a:t>
+            </a:r>
+          </a:p>
+        </p:txBody>
+      </p:sp>
+      <p:cxnSp>
+        <p:nvCxnSpPr>
+          <p:cNvPr id="10" name="Straight Arrow Connector 9">
+            <a:extLst>
+              <a:ext uri="{FF2B5EF4-FFF2-40B4-BE49-F238E27FC236}">
+                <a16:creationId xmlns:a16="http://schemas.microsoft.com/office/drawing/2014/main" id="{FC1E4FFE-D016-4650-9D47-558530CCDD6C}"/>
+              </a:ext>
+            </a:extLst>
+          </p:cNvPr>
+          <p:cNvCxnSpPr>
+            <a:cxnSpLocks/>
+            <a:stCxn id="6" idx="3"/>
+            <a:endCxn id="7" idx="1"/>
+          </p:cNvCxnSpPr>
+          <p:nvPr/>
+        </p:nvCxnSpPr>
+        <p:spPr>
+          <a:xfrm>
+            <a:off x="1550351" y="3539136"/>
+            <a:ext cx="1104122" cy="7061"/>
+          </a:xfrm>
+          <a:prstGeom prst="straightConnector1">
+            <a:avLst/>
+          </a:prstGeom>
+          <a:ln w="38100">
+            <a:tailEnd type="triangle"/>
+          </a:ln>
+        </p:spPr>
+        <p:style>
+          <a:lnRef idx="1">
+            <a:schemeClr val="accent1"/>
+          </a:lnRef>
+          <a:fillRef idx="0">
+            <a:schemeClr val="accent1"/>
+          </a:fillRef>
+          <a:effectRef idx="0">
+            <a:schemeClr val="accent1"/>
+          </a:effectRef>
+          <a:fontRef idx="minor">
+            <a:schemeClr val="tx1"/>
+          </a:fontRef>
+        </p:style>
+      </p:cxnSp>
+      <p:cxnSp>
+        <p:nvCxnSpPr>
+          <p:cNvPr id="12" name="Straight Arrow Connector 11">
+            <a:extLst>
+              <a:ext uri="{FF2B5EF4-FFF2-40B4-BE49-F238E27FC236}">
+                <a16:creationId xmlns:a16="http://schemas.microsoft.com/office/drawing/2014/main" id="{64775E7C-F260-4C2F-B5AA-45FF12C2F36F}"/>
+              </a:ext>
+            </a:extLst>
+          </p:cNvPr>
+          <p:cNvCxnSpPr>
+            <a:cxnSpLocks/>
+            <a:stCxn id="7" idx="3"/>
+            <a:endCxn id="9" idx="1"/>
+          </p:cNvCxnSpPr>
+          <p:nvPr/>
+        </p:nvCxnSpPr>
+        <p:spPr>
+          <a:xfrm flipV="1">
+            <a:off x="5207901" y="3544989"/>
+            <a:ext cx="1104123" cy="1208"/>
+          </a:xfrm>
+          <a:prstGeom prst="straightConnector1">
+            <a:avLst/>
+          </a:prstGeom>
+          <a:ln w="38100">
+            <a:tailEnd type="triangle"/>
+          </a:ln>
+        </p:spPr>
+        <p:style>
+          <a:lnRef idx="1">
+            <a:schemeClr val="accent1"/>
+          </a:lnRef>
+          <a:fillRef idx="0">
+            <a:schemeClr val="accent1"/>
+          </a:fillRef>
+          <a:effectRef idx="0">
+            <a:schemeClr val="accent1"/>
+          </a:effectRef>
+          <a:fontRef idx="minor">
+            <a:schemeClr val="tx1"/>
+          </a:fontRef>
+        </p:style>
+      </p:cxnSp>
+      <p:sp>
+        <p:nvSpPr>
+          <p:cNvPr id="16" name="Flowchart: Terminator 15">
+            <a:extLst>
+              <a:ext uri="{FF2B5EF4-FFF2-40B4-BE49-F238E27FC236}">
+                <a16:creationId xmlns:a16="http://schemas.microsoft.com/office/drawing/2014/main" id="{2F88F3C5-C6E4-4148-9F69-5A69B99366C7}"/>
+              </a:ext>
+            </a:extLst>
+          </p:cNvPr>
+          <p:cNvSpPr/>
+          <p:nvPr/>
+        </p:nvSpPr>
+        <p:spPr>
+          <a:xfrm>
+            <a:off x="10446123" y="3332694"/>
+            <a:ext cx="953311" cy="412884"/>
+          </a:xfrm>
+          <a:prstGeom prst="flowChartTerminator">
+            <a:avLst/>
+          </a:prstGeom>
+        </p:spPr>
+        <p:style>
+          <a:lnRef idx="2">
+            <a:schemeClr val="accent1">
+              <a:shade val="50000"/>
+            </a:schemeClr>
+          </a:lnRef>
+          <a:fillRef idx="1">
+            <a:schemeClr val="accent1"/>
+          </a:fillRef>
+          <a:effectRef idx="0">
+            <a:schemeClr val="accent1"/>
+          </a:effectRef>
+          <a:fontRef idx="minor">
+            <a:schemeClr val="lt1"/>
+          </a:fontRef>
+        </p:style>
+        <p:txBody>
+          <a:bodyPr rtlCol="0" anchor="ctr"/>
+          <a:lstStyle/>
+          <a:p>
+            <a:pPr algn="ctr"/>
+            <a:r>
+              <a:rPr lang="de-DE" dirty="0"/>
+              <a:t>End</a:t>
+            </a:r>
+          </a:p>
+        </p:txBody>
+      </p:sp>
+      <p:cxnSp>
+        <p:nvCxnSpPr>
+          <p:cNvPr id="17" name="Straight Arrow Connector 16">
+            <a:extLst>
+              <a:ext uri="{FF2B5EF4-FFF2-40B4-BE49-F238E27FC236}">
+                <a16:creationId xmlns:a16="http://schemas.microsoft.com/office/drawing/2014/main" id="{64C22285-15EA-4C4A-B73E-F471F387691C}"/>
+              </a:ext>
+            </a:extLst>
+          </p:cNvPr>
+          <p:cNvCxnSpPr>
+            <a:cxnSpLocks/>
+            <a:stCxn id="9" idx="3"/>
+            <a:endCxn id="16" idx="1"/>
+          </p:cNvCxnSpPr>
+          <p:nvPr/>
+        </p:nvCxnSpPr>
+        <p:spPr>
+          <a:xfrm flipV="1">
+            <a:off x="9336360" y="3539136"/>
+            <a:ext cx="1109763" cy="5853"/>
+          </a:xfrm>
+          <a:prstGeom prst="straightConnector1">
+            <a:avLst/>
+          </a:prstGeom>
+          <a:ln w="38100">
+            <a:tailEnd type="triangle"/>
+          </a:ln>
+        </p:spPr>
+        <p:style>
+          <a:lnRef idx="1">
+            <a:schemeClr val="accent1"/>
+          </a:lnRef>
+          <a:fillRef idx="0">
+            <a:schemeClr val="accent1"/>
+          </a:fillRef>
+          <a:effectRef idx="0">
+            <a:schemeClr val="accent1"/>
+          </a:effectRef>
+          <a:fontRef idx="minor">
+            <a:schemeClr val="tx1"/>
+          </a:fontRef>
+        </p:style>
+      </p:cxnSp>
+      <p:sp>
+        <p:nvSpPr>
+          <p:cNvPr id="18" name="Rectangle: Folded Corner 17">
+            <a:extLst>
+              <a:ext uri="{FF2B5EF4-FFF2-40B4-BE49-F238E27FC236}">
+                <a16:creationId xmlns:a16="http://schemas.microsoft.com/office/drawing/2014/main" id="{0A6A775A-165C-4129-8ADF-A943A85BA066}"/>
+              </a:ext>
+            </a:extLst>
+          </p:cNvPr>
+          <p:cNvSpPr/>
+          <p:nvPr/>
+        </p:nvSpPr>
+        <p:spPr>
+          <a:xfrm>
+            <a:off x="6312024" y="4719953"/>
+            <a:ext cx="3024336" cy="1301335"/>
+          </a:xfrm>
+          <a:prstGeom prst="foldedCorner">
+            <a:avLst/>
+          </a:prstGeom>
+        </p:spPr>
+        <p:style>
+          <a:lnRef idx="2">
+            <a:schemeClr val="accent3">
+              <a:shade val="50000"/>
+            </a:schemeClr>
+          </a:lnRef>
+          <a:fillRef idx="1">
+            <a:schemeClr val="accent3"/>
+          </a:fillRef>
+          <a:effectRef idx="0">
+            <a:schemeClr val="accent3"/>
+          </a:effectRef>
+          <a:fontRef idx="minor">
+            <a:schemeClr val="lt1"/>
+          </a:fontRef>
+        </p:style>
+        <p:txBody>
+          <a:bodyPr rtlCol="0" anchor="ctr"/>
+          <a:lstStyle/>
+          <a:p>
+            <a:pPr algn="ctr"/>
+            <a:r>
+              <a:rPr lang="en-US" dirty="0"/>
+              <a:t>Use </a:t>
+            </a:r>
+            <a:r>
+              <a:rPr lang="en-US" dirty="0" err="1"/>
+              <a:t>deserialized</a:t>
+            </a:r>
+            <a:r>
+              <a:rPr lang="en-US" dirty="0"/>
+              <a:t> values from the JSON Object, inject other missing dependencies.</a:t>
+            </a:r>
+          </a:p>
+        </p:txBody>
+      </p:sp>
+    </p:spTree>
+    <p:extLst>
+      <p:ext uri="{BB962C8B-B14F-4D97-AF65-F5344CB8AC3E}">
+        <p14:creationId xmlns:p14="http://schemas.microsoft.com/office/powerpoint/2010/main" val="60655286"/>
+      </p:ext>
+    </p:extLst>
+  </p:cSld>
+  <p:clrMapOvr>
+    <a:masterClrMapping/>
+  </p:clrMapOvr>
+  <p:transition spd="med">
+    <p:pull/>
+  </p:transition>
+  <p:timing>
+    <p:tnLst>
+      <p:par>
+        <p:cTn id="1" dur="indefinite" restart="never" nodeType="tmRoot">
+          <p:childTnLst>
+            <p:seq concurrent="1" nextAc="seek">
+              <p:cTn id="2" dur="indefinite" nodeType="mainSeq">
+                <p:childTnLst>
+                  <p:par>
+                    <p:cTn id="3" fill="hold">
+                      <p:stCondLst>
+                        <p:cond delay="indefinite"/>
+                      </p:stCondLst>
+                      <p:childTnLst>
+                        <p:par>
+                          <p:cTn id="4" fill="hold">
+                            <p:stCondLst>
+                              <p:cond delay="0"/>
+                            </p:stCondLst>
+                            <p:childTnLst>
+                              <p:par>
+                                <p:cTn id="5" presetID="10" presetClass="entr" presetSubtype="0" fill="hold" grpId="0" nodeType="clickEffect">
+                                  <p:stCondLst>
+                                    <p:cond delay="0"/>
+                                  </p:stCondLst>
+                                  <p:childTnLst>
+                                    <p:set>
+                                      <p:cBhvr>
+                                        <p:cTn id="6" dur="1" fill="hold">
+                                          <p:stCondLst>
+                                            <p:cond delay="0"/>
+                                          </p:stCondLst>
+                                        </p:cTn>
+                                        <p:tgtEl>
+                                          <p:spTgt spid="6"/>
+                                        </p:tgtEl>
+                                        <p:attrNameLst>
+                                          <p:attrName>style.visibility</p:attrName>
+                                        </p:attrNameLst>
+                                      </p:cBhvr>
+                                      <p:to>
+                                        <p:strVal val="visible"/>
+                                      </p:to>
+                                    </p:set>
+                                    <p:animEffect transition="in" filter="fade">
+                                      <p:cBhvr>
+                                        <p:cTn id="7" dur="500"/>
+                                        <p:tgtEl>
+                                          <p:spTgt spid="6"/>
+                                        </p:tgtEl>
+                                      </p:cBhvr>
+                                    </p:animEffect>
+                                  </p:childTnLst>
+                                </p:cTn>
+                              </p:par>
+                            </p:childTnLst>
+                          </p:cTn>
+                        </p:par>
+                      </p:childTnLst>
+                    </p:cTn>
+                  </p:par>
+                  <p:par>
+                    <p:cTn id="8" fill="hold">
+                      <p:stCondLst>
+                        <p:cond delay="indefinite"/>
+                      </p:stCondLst>
+                      <p:childTnLst>
+                        <p:par>
+                          <p:cTn id="9" fill="hold">
+                            <p:stCondLst>
+                              <p:cond delay="0"/>
+                            </p:stCondLst>
+                            <p:childTnLst>
+                              <p:par>
+                                <p:cTn id="10" presetID="10" presetClass="entr" presetSubtype="0" fill="hold" grpId="0" nodeType="clickEffect">
+                                  <p:stCondLst>
+                                    <p:cond delay="0"/>
+                                  </p:stCondLst>
+                                  <p:childTnLst>
+                                    <p:set>
+                                      <p:cBhvr>
+                                        <p:cTn id="11" dur="1" fill="hold">
+                                          <p:stCondLst>
+                                            <p:cond delay="0"/>
+                                          </p:stCondLst>
+                                        </p:cTn>
+                                        <p:tgtEl>
+                                          <p:spTgt spid="7"/>
+                                        </p:tgtEl>
+                                        <p:attrNameLst>
+                                          <p:attrName>style.visibility</p:attrName>
+                                        </p:attrNameLst>
+                                      </p:cBhvr>
+                                      <p:to>
+                                        <p:strVal val="visible"/>
+                                      </p:to>
+                                    </p:set>
+                                    <p:animEffect transition="in" filter="fade">
+                                      <p:cBhvr>
+                                        <p:cTn id="12" dur="500"/>
+                                        <p:tgtEl>
+                                          <p:spTgt spid="7"/>
+                                        </p:tgtEl>
+                                      </p:cBhvr>
+                                    </p:animEffect>
+                                  </p:childTnLst>
+                                </p:cTn>
+                              </p:par>
+                              <p:par>
+                                <p:cTn id="13" presetID="10" presetClass="entr" presetSubtype="0" fill="hold" nodeType="withEffect">
+                                  <p:stCondLst>
+                                    <p:cond delay="0"/>
+                                  </p:stCondLst>
+                                  <p:childTnLst>
+                                    <p:set>
+                                      <p:cBhvr>
+                                        <p:cTn id="14" dur="1" fill="hold">
+                                          <p:stCondLst>
+                                            <p:cond delay="0"/>
+                                          </p:stCondLst>
+                                        </p:cTn>
+                                        <p:tgtEl>
+                                          <p:spTgt spid="10"/>
+                                        </p:tgtEl>
+                                        <p:attrNameLst>
+                                          <p:attrName>style.visibility</p:attrName>
+                                        </p:attrNameLst>
+                                      </p:cBhvr>
+                                      <p:to>
+                                        <p:strVal val="visible"/>
+                                      </p:to>
+                                    </p:set>
+                                    <p:animEffect transition="in" filter="fade">
+                                      <p:cBhvr>
+                                        <p:cTn id="15" dur="500"/>
+                                        <p:tgtEl>
+                                          <p:spTgt spid="10"/>
+                                        </p:tgtEl>
+                                      </p:cBhvr>
+                                    </p:animEffect>
+                                  </p:childTnLst>
+                                </p:cTn>
+                              </p:par>
+                            </p:childTnLst>
+                          </p:cTn>
+                        </p:par>
+                      </p:childTnLst>
+                    </p:cTn>
+                  </p:par>
+                  <p:par>
+                    <p:cTn id="16" fill="hold">
+                      <p:stCondLst>
+                        <p:cond delay="indefinite"/>
+                      </p:stCondLst>
+                      <p:childTnLst>
+                        <p:par>
+                          <p:cTn id="17" fill="hold">
+                            <p:stCondLst>
+                              <p:cond delay="0"/>
+                            </p:stCondLst>
+                            <p:childTnLst>
+                              <p:par>
+                                <p:cTn id="18" presetID="10" presetClass="entr" presetSubtype="0" fill="hold" grpId="0" nodeType="clickEffect">
+                                  <p:stCondLst>
+                                    <p:cond delay="0"/>
+                                  </p:stCondLst>
+                                  <p:childTnLst>
+                                    <p:set>
+                                      <p:cBhvr>
+                                        <p:cTn id="19" dur="1" fill="hold">
+                                          <p:stCondLst>
+                                            <p:cond delay="0"/>
+                                          </p:stCondLst>
+                                        </p:cTn>
+                                        <p:tgtEl>
+                                          <p:spTgt spid="8"/>
+                                        </p:tgtEl>
+                                        <p:attrNameLst>
+                                          <p:attrName>style.visibility</p:attrName>
+                                        </p:attrNameLst>
+                                      </p:cBhvr>
+                                      <p:to>
+                                        <p:strVal val="visible"/>
+                                      </p:to>
+                                    </p:set>
+                                    <p:animEffect transition="in" filter="fade">
+                                      <p:cBhvr>
+                                        <p:cTn id="20" dur="500"/>
+                                        <p:tgtEl>
+                                          <p:spTgt spid="8"/>
+                                        </p:tgtEl>
+                                      </p:cBhvr>
+                                    </p:animEffect>
+                                  </p:childTnLst>
+                                </p:cTn>
+                              </p:par>
+                            </p:childTnLst>
+                          </p:cTn>
+                        </p:par>
+                      </p:childTnLst>
+                    </p:cTn>
+                  </p:par>
+                  <p:par>
+                    <p:cTn id="21" fill="hold">
+                      <p:stCondLst>
+                        <p:cond delay="indefinite"/>
+                      </p:stCondLst>
+                      <p:childTnLst>
+                        <p:par>
+                          <p:cTn id="22" fill="hold">
+                            <p:stCondLst>
+                              <p:cond delay="0"/>
+                            </p:stCondLst>
+                            <p:childTnLst>
+                              <p:par>
+                                <p:cTn id="23" presetID="10" presetClass="entr" presetSubtype="0" fill="hold" grpId="0" nodeType="clickEffect">
+                                  <p:stCondLst>
+                                    <p:cond delay="0"/>
+                                  </p:stCondLst>
+                                  <p:childTnLst>
+                                    <p:set>
+                                      <p:cBhvr>
+                                        <p:cTn id="24" dur="1" fill="hold">
+                                          <p:stCondLst>
+                                            <p:cond delay="0"/>
+                                          </p:stCondLst>
+                                        </p:cTn>
+                                        <p:tgtEl>
+                                          <p:spTgt spid="9"/>
+                                        </p:tgtEl>
+                                        <p:attrNameLst>
+                                          <p:attrName>style.visibility</p:attrName>
+                                        </p:attrNameLst>
+                                      </p:cBhvr>
+                                      <p:to>
+                                        <p:strVal val="visible"/>
+                                      </p:to>
+                                    </p:set>
+                                    <p:animEffect transition="in" filter="fade">
+                                      <p:cBhvr>
+                                        <p:cTn id="25" dur="500"/>
+                                        <p:tgtEl>
+                                          <p:spTgt spid="9"/>
+                                        </p:tgtEl>
+                                      </p:cBhvr>
+                                    </p:animEffect>
+                                  </p:childTnLst>
+                                </p:cTn>
+                              </p:par>
+                              <p:par>
+                                <p:cTn id="26" presetID="10" presetClass="entr" presetSubtype="0" fill="hold" nodeType="withEffect">
+                                  <p:stCondLst>
+                                    <p:cond delay="0"/>
+                                  </p:stCondLst>
+                                  <p:childTnLst>
+                                    <p:set>
+                                      <p:cBhvr>
+                                        <p:cTn id="27" dur="1" fill="hold">
+                                          <p:stCondLst>
+                                            <p:cond delay="0"/>
+                                          </p:stCondLst>
+                                        </p:cTn>
+                                        <p:tgtEl>
+                                          <p:spTgt spid="12"/>
+                                        </p:tgtEl>
+                                        <p:attrNameLst>
+                                          <p:attrName>style.visibility</p:attrName>
+                                        </p:attrNameLst>
+                                      </p:cBhvr>
+                                      <p:to>
+                                        <p:strVal val="visible"/>
+                                      </p:to>
+                                    </p:set>
+                                    <p:animEffect transition="in" filter="fade">
+                                      <p:cBhvr>
+                                        <p:cTn id="28" dur="500"/>
+                                        <p:tgtEl>
+                                          <p:spTgt spid="12"/>
+                                        </p:tgtEl>
+                                      </p:cBhvr>
+                                    </p:animEffect>
+                                  </p:childTnLst>
+                                </p:cTn>
+                              </p:par>
+                            </p:childTnLst>
+                          </p:cTn>
+                        </p:par>
+                      </p:childTnLst>
+                    </p:cTn>
+                  </p:par>
+                  <p:par>
+                    <p:cTn id="29" fill="hold">
+                      <p:stCondLst>
+                        <p:cond delay="indefinite"/>
+                      </p:stCondLst>
+                      <p:childTnLst>
+                        <p:par>
+                          <p:cTn id="30" fill="hold">
+                            <p:stCondLst>
+                              <p:cond delay="0"/>
+                            </p:stCondLst>
+                            <p:childTnLst>
+                              <p:par>
+                                <p:cTn id="31" presetID="10" presetClass="entr" presetSubtype="0" fill="hold" grpId="0" nodeType="clickEffect">
+                                  <p:stCondLst>
+                                    <p:cond delay="0"/>
+                                  </p:stCondLst>
+                                  <p:childTnLst>
+                                    <p:set>
+                                      <p:cBhvr>
+                                        <p:cTn id="32" dur="1" fill="hold">
+                                          <p:stCondLst>
+                                            <p:cond delay="0"/>
+                                          </p:stCondLst>
+                                        </p:cTn>
+                                        <p:tgtEl>
+                                          <p:spTgt spid="18"/>
+                                        </p:tgtEl>
+                                        <p:attrNameLst>
+                                          <p:attrName>style.visibility</p:attrName>
+                                        </p:attrNameLst>
+                                      </p:cBhvr>
+                                      <p:to>
+                                        <p:strVal val="visible"/>
+                                      </p:to>
+                                    </p:set>
+                                    <p:animEffect transition="in" filter="fade">
+                                      <p:cBhvr>
+                                        <p:cTn id="33" dur="500"/>
+                                        <p:tgtEl>
+                                          <p:spTgt spid="18"/>
+                                        </p:tgtEl>
+                                      </p:cBhvr>
+                                    </p:animEffect>
+                                  </p:childTnLst>
+                                </p:cTn>
+                              </p:par>
+                            </p:childTnLst>
+                          </p:cTn>
+                        </p:par>
+                      </p:childTnLst>
+                    </p:cTn>
+                  </p:par>
+                  <p:par>
+                    <p:cTn id="34" fill="hold">
+                      <p:stCondLst>
+                        <p:cond delay="indefinite"/>
+                      </p:stCondLst>
+                      <p:childTnLst>
+                        <p:par>
+                          <p:cTn id="35" fill="hold">
+                            <p:stCondLst>
+                              <p:cond delay="0"/>
+                            </p:stCondLst>
+                            <p:childTnLst>
+                              <p:par>
+                                <p:cTn id="36" presetID="10" presetClass="entr" presetSubtype="0" fill="hold" grpId="0" nodeType="clickEffect">
+                                  <p:stCondLst>
+                                    <p:cond delay="0"/>
+                                  </p:stCondLst>
+                                  <p:childTnLst>
+                                    <p:set>
+                                      <p:cBhvr>
+                                        <p:cTn id="37" dur="1" fill="hold">
+                                          <p:stCondLst>
+                                            <p:cond delay="0"/>
+                                          </p:stCondLst>
+                                        </p:cTn>
+                                        <p:tgtEl>
+                                          <p:spTgt spid="16"/>
+                                        </p:tgtEl>
+                                        <p:attrNameLst>
+                                          <p:attrName>style.visibility</p:attrName>
+                                        </p:attrNameLst>
+                                      </p:cBhvr>
+                                      <p:to>
+                                        <p:strVal val="visible"/>
+                                      </p:to>
+                                    </p:set>
+                                    <p:animEffect transition="in" filter="fade">
+                                      <p:cBhvr>
+                                        <p:cTn id="38" dur="500"/>
+                                        <p:tgtEl>
+                                          <p:spTgt spid="16"/>
+                                        </p:tgtEl>
+                                      </p:cBhvr>
+                                    </p:animEffect>
+                                  </p:childTnLst>
+                                </p:cTn>
+                              </p:par>
+                              <p:par>
+                                <p:cTn id="39" presetID="10" presetClass="entr" presetSubtype="0" fill="hold" nodeType="withEffect">
+                                  <p:stCondLst>
+                                    <p:cond delay="0"/>
+                                  </p:stCondLst>
+                                  <p:childTnLst>
+                                    <p:set>
+                                      <p:cBhvr>
+                                        <p:cTn id="40" dur="1" fill="hold">
+                                          <p:stCondLst>
+                                            <p:cond delay="0"/>
+                                          </p:stCondLst>
+                                        </p:cTn>
+                                        <p:tgtEl>
+                                          <p:spTgt spid="17"/>
+                                        </p:tgtEl>
+                                        <p:attrNameLst>
+                                          <p:attrName>style.visibility</p:attrName>
+                                        </p:attrNameLst>
+                                      </p:cBhvr>
+                                      <p:to>
+                                        <p:strVal val="visible"/>
+                                      </p:to>
+                                    </p:set>
+                                    <p:animEffect transition="in" filter="fade">
+                                      <p:cBhvr>
+                                        <p:cTn id="41" dur="500"/>
+                                        <p:tgtEl>
+                                          <p:spTgt spid="17"/>
+                                        </p:tgtEl>
+                                      </p:cBhvr>
+                                    </p:animEffect>
+                                  </p:childTnLst>
+                                </p:cTn>
+                              </p:par>
+                            </p:childTnLst>
+                          </p:cTn>
+                        </p:par>
+                      </p:childTnLst>
+                    </p:cTn>
+                  </p:par>
+                </p:childTnLst>
+              </p:cTn>
+              <p:prevCondLst>
+                <p:cond evt="onPrev" delay="0">
+                  <p:tgtEl>
+                    <p:sldTgt/>
+                  </p:tgtEl>
+                </p:cond>
+              </p:prevCondLst>
+              <p:nextCondLst>
+                <p:cond evt="onNext" delay="0">
+                  <p:tgtEl>
+                    <p:sldTgt/>
+                  </p:tgtEl>
+                </p:cond>
+              </p:nextCondLst>
+            </p:seq>
+          </p:childTnLst>
+        </p:cTn>
+      </p:par>
+    </p:tnLst>
+    <p:bldLst>
+      <p:bldP spid="6" grpId="0" animBg="1"/>
+      <p:bldP spid="7" grpId="0" animBg="1"/>
+      <p:bldP spid="8" grpId="0" animBg="1"/>
+      <p:bldP spid="9" grpId="0" animBg="1"/>
+      <p:bldP spid="16" grpId="0" animBg="1"/>
+      <p:bldP spid="18" grpId="0" animBg="1"/>
+    </p:bldLst>
+  </p:timing>
+</p:sld>
+</file>
+
+<file path=ppt/slides/slide35.xml><?xml version="1.0" encoding="utf-8"?>
+<p:sld xmlns:a="http://schemas.openxmlformats.org/drawingml/2006/main" xmlns:r="http://schemas.openxmlformats.org/officeDocument/2006/relationships" xmlns:p="http://schemas.openxmlformats.org/presentationml/2006/main">
+  <p:cSld>
+    <p:spTree>
+      <p:nvGrpSpPr>
+        <p:cNvPr id="1" name=""/>
+        <p:cNvGrpSpPr/>
+        <p:nvPr/>
+      </p:nvGrpSpPr>
+      <p:grpSpPr>
+        <a:xfrm>
+          <a:off x="0" y="0"/>
+          <a:ext cx="0" cy="0"/>
+          <a:chOff x="0" y="0"/>
+          <a:chExt cx="0" cy="0"/>
+        </a:xfrm>
+      </p:grpSpPr>
+      <p:sp>
+        <p:nvSpPr>
+          <p:cNvPr id="6" name="Title 5">
+            <a:extLst>
+              <a:ext uri="{FF2B5EF4-FFF2-40B4-BE49-F238E27FC236}">
+                <a16:creationId xmlns:a16="http://schemas.microsoft.com/office/drawing/2014/main" id="{BD4BF4AB-075D-4D0C-9A2D-E73506EB8FDF}"/>
+              </a:ext>
+            </a:extLst>
+          </p:cNvPr>
+          <p:cNvSpPr>
+            <a:spLocks noGrp="1"/>
+          </p:cNvSpPr>
+          <p:nvPr>
+            <p:ph type="ctrTitle"/>
+          </p:nvPr>
+        </p:nvSpPr>
+        <p:spPr/>
+        <p:txBody>
+          <a:bodyPr/>
+          <a:lstStyle/>
+          <a:p>
+            <a:r>
+              <a:rPr lang="en-US" dirty="0"/>
+              <a:t>DI Container Performance</a:t>
+            </a:r>
+            <a:endParaRPr lang="de-DE" dirty="0"/>
+          </a:p>
+        </p:txBody>
+      </p:sp>
+      <p:sp>
+        <p:nvSpPr>
+          <p:cNvPr id="7" name="Subtitle 6">
+            <a:extLst>
+              <a:ext uri="{FF2B5EF4-FFF2-40B4-BE49-F238E27FC236}">
+                <a16:creationId xmlns:a16="http://schemas.microsoft.com/office/drawing/2014/main" id="{758A3E1B-4301-47AB-9C81-6AC1275FF963}"/>
+              </a:ext>
+            </a:extLst>
+          </p:cNvPr>
+          <p:cNvSpPr>
+            <a:spLocks noGrp="1"/>
+          </p:cNvSpPr>
+          <p:nvPr>
+            <p:ph type="subTitle" idx="1"/>
+          </p:nvPr>
+        </p:nvSpPr>
+        <p:spPr/>
+        <p:txBody>
+          <a:bodyPr/>
+          <a:lstStyle/>
+          <a:p>
+            <a:endParaRPr lang="de-DE"/>
+          </a:p>
+        </p:txBody>
+      </p:sp>
+    </p:spTree>
+    <p:extLst>
+      <p:ext uri="{BB962C8B-B14F-4D97-AF65-F5344CB8AC3E}">
+        <p14:creationId xmlns:p14="http://schemas.microsoft.com/office/powerpoint/2010/main" val="288764939"/>
+      </p:ext>
+    </p:extLst>
+  </p:cSld>
+  <p:clrMapOvr>
+    <a:masterClrMapping/>
+  </p:clrMapOvr>
+  <p:transition spd="med">
+    <p:pull/>
+  </p:transition>
+</p:sld>
+</file>
+
+<file path=ppt/slides/slide36.xml><?xml version="1.0" encoding="utf-8"?>
+<p:sld xmlns:a="http://schemas.openxmlformats.org/drawingml/2006/main" xmlns:r="http://schemas.openxmlformats.org/officeDocument/2006/relationships" xmlns:p="http://schemas.openxmlformats.org/presentationml/2006/main">
+  <p:cSld>
+    <p:spTree>
+      <p:nvGrpSpPr>
+        <p:cNvPr id="1" name=""/>
+        <p:cNvGrpSpPr/>
+        <p:nvPr/>
+      </p:nvGrpSpPr>
+      <p:grpSpPr>
+        <a:xfrm>
+          <a:off x="0" y="0"/>
+          <a:ext cx="0" cy="0"/>
+          <a:chOff x="0" y="0"/>
+          <a:chExt cx="0" cy="0"/>
+        </a:xfrm>
+      </p:grpSpPr>
+      <p:sp>
+        <p:nvSpPr>
           <p:cNvPr id="4" name="Title 3">
             <a:extLst>
               <a:ext uri="{FF2B5EF4-FFF2-40B4-BE49-F238E27FC236}">
@@ -20638,7 +23030,7 @@
 </p:sld>
 </file>
 
-<file path=ppt/slides/slide31.xml><?xml version="1.0" encoding="utf-8"?>
+<file path=ppt/slides/slide37.xml><?xml version="1.0" encoding="utf-8"?>
 <p:sld xmlns:a="http://schemas.openxmlformats.org/drawingml/2006/main" xmlns:r="http://schemas.openxmlformats.org/officeDocument/2006/relationships" xmlns:p="http://schemas.openxmlformats.org/presentationml/2006/main">
   <p:cSld>
     <p:spTree>
@@ -20823,7 +23215,7 @@
 </p:sld>
 </file>
 
-<file path=ppt/slides/slide32.xml><?xml version="1.0" encoding="utf-8"?>
+<file path=ppt/slides/slide38.xml><?xml version="1.0" encoding="utf-8"?>
 <p:sld xmlns:a="http://schemas.openxmlformats.org/drawingml/2006/main" xmlns:r="http://schemas.openxmlformats.org/officeDocument/2006/relationships" xmlns:p="http://schemas.openxmlformats.org/presentationml/2006/main">
   <p:cSld>
     <p:spTree>
@@ -20997,7 +23389,7 @@
 </p:sld>
 </file>
 
-<file path=ppt/slides/slide33.xml><?xml version="1.0" encoding="utf-8"?>
+<file path=ppt/slides/slide39.xml><?xml version="1.0" encoding="utf-8"?>
 <p:sld xmlns:a="http://schemas.openxmlformats.org/drawingml/2006/main" xmlns:r="http://schemas.openxmlformats.org/officeDocument/2006/relationships" xmlns:p="http://schemas.openxmlformats.org/presentationml/2006/main">
   <p:cSld>
     <p:spTree>
@@ -21097,261 +23489,6 @@
         <p14:creationId xmlns:p14="http://schemas.microsoft.com/office/powerpoint/2010/main" val="575733322"/>
       </p:ext>
     </p:extLst>
-  </p:cSld>
-  <p:clrMapOvr>
-    <a:masterClrMapping/>
-  </p:clrMapOvr>
-  <p:transition spd="med">
-    <p:pull/>
-  </p:transition>
-</p:sld>
-</file>
-
-<file path=ppt/slides/slide34.xml><?xml version="1.0" encoding="utf-8"?>
-<p:sld xmlns:a="http://schemas.openxmlformats.org/drawingml/2006/main" xmlns:r="http://schemas.openxmlformats.org/officeDocument/2006/relationships" xmlns:p="http://schemas.openxmlformats.org/presentationml/2006/main">
-  <p:cSld>
-    <p:spTree>
-      <p:nvGrpSpPr>
-        <p:cNvPr id="1" name=""/>
-        <p:cNvGrpSpPr/>
-        <p:nvPr/>
-      </p:nvGrpSpPr>
-      <p:grpSpPr>
-        <a:xfrm>
-          <a:off x="0" y="0"/>
-          <a:ext cx="0" cy="0"/>
-          <a:chOff x="0" y="0"/>
-          <a:chExt cx="0" cy="0"/>
-        </a:xfrm>
-      </p:grpSpPr>
-      <p:sp>
-        <p:nvSpPr>
-          <p:cNvPr id="6146" name="Titel 3"/>
-          <p:cNvSpPr>
-            <a:spLocks noGrp="1"/>
-          </p:cNvSpPr>
-          <p:nvPr>
-            <p:ph type="ctrTitle"/>
-          </p:nvPr>
-        </p:nvSpPr>
-        <p:spPr bwMode="auto">
-          <a:xfrm>
-            <a:off x="2135188" y="2492376"/>
-            <a:ext cx="7777162" cy="1800225"/>
-          </a:xfrm>
-          <a:prstGeom prst="rect">
-            <a:avLst/>
-          </a:prstGeom>
-          <a:noFill/>
-          <a:extLst>
-            <a:ext uri="{909E8E84-426E-40DD-AFC4-6F175D3DCCD1}">
-              <a14:hiddenFill xmlns:a14="http://schemas.microsoft.com/office/drawing/2010/main">
-                <a:solidFill>
-                  <a:srgbClr val="FFFFFF"/>
-                </a:solidFill>
-              </a14:hiddenFill>
-            </a:ext>
-            <a:ext uri="{91240B29-F687-4F45-9708-019B960494DF}">
-              <a14:hiddenLine xmlns:a14="http://schemas.microsoft.com/office/drawing/2010/main" w="9525">
-                <a:solidFill>
-                  <a:srgbClr val="000000"/>
-                </a:solidFill>
-                <a:miter lim="800000"/>
-                <a:headEnd/>
-                <a:tailEnd/>
-              </a14:hiddenLine>
-            </a:ext>
-          </a:extLst>
-        </p:spPr>
-        <p:txBody>
-          <a:bodyPr vert="horz" wrap="square" lIns="91440" tIns="45720" rIns="91440" bIns="45720" numCol="1" anchor="t" anchorCtr="0" compatLnSpc="1">
-            <a:prstTxWarp prst="textNoShape">
-              <a:avLst/>
-            </a:prstTxWarp>
-          </a:bodyPr>
-          <a:lstStyle/>
-          <a:p>
-            <a:pPr algn="ctr" eaLnBrk="1" hangingPunct="1"/>
-            <a:r>
-              <a:rPr lang="de-DE" sz="8800" dirty="0"/>
-              <a:t>Any Questions?</a:t>
-            </a:r>
-          </a:p>
-        </p:txBody>
-      </p:sp>
-    </p:spTree>
-  </p:cSld>
-  <p:clrMapOvr>
-    <a:masterClrMapping/>
-  </p:clrMapOvr>
-  <p:transition spd="med">
-    <p:pull/>
-  </p:transition>
-</p:sld>
-</file>
-
-<file path=ppt/slides/slide35.xml><?xml version="1.0" encoding="utf-8"?>
-<p:sld xmlns:a="http://schemas.openxmlformats.org/drawingml/2006/main" xmlns:r="http://schemas.openxmlformats.org/officeDocument/2006/relationships" xmlns:p="http://schemas.openxmlformats.org/presentationml/2006/main">
-  <p:cSld>
-    <p:spTree>
-      <p:nvGrpSpPr>
-        <p:cNvPr id="1" name=""/>
-        <p:cNvGrpSpPr/>
-        <p:nvPr/>
-      </p:nvGrpSpPr>
-      <p:grpSpPr>
-        <a:xfrm>
-          <a:off x="0" y="0"/>
-          <a:ext cx="0" cy="0"/>
-          <a:chOff x="0" y="0"/>
-          <a:chExt cx="0" cy="0"/>
-        </a:xfrm>
-      </p:grpSpPr>
-      <p:sp>
-        <p:nvSpPr>
-          <p:cNvPr id="8194" name="Titel 3"/>
-          <p:cNvSpPr>
-            <a:spLocks noGrp="1"/>
-          </p:cNvSpPr>
-          <p:nvPr>
-            <p:ph type="ctrTitle"/>
-          </p:nvPr>
-        </p:nvSpPr>
-        <p:spPr bwMode="auto">
-          <a:xfrm>
-            <a:off x="2135561" y="3429001"/>
-            <a:ext cx="7777163" cy="1800225"/>
-          </a:xfrm>
-          <a:prstGeom prst="rect">
-            <a:avLst/>
-          </a:prstGeom>
-          <a:noFill/>
-          <a:extLst>
-            <a:ext uri="{909E8E84-426E-40DD-AFC4-6F175D3DCCD1}">
-              <a14:hiddenFill xmlns:a14="http://schemas.microsoft.com/office/drawing/2010/main">
-                <a:solidFill>
-                  <a:srgbClr val="FFFFFF"/>
-                </a:solidFill>
-              </a14:hiddenFill>
-            </a:ext>
-            <a:ext uri="{91240B29-F687-4F45-9708-019B960494DF}">
-              <a14:hiddenLine xmlns:a14="http://schemas.microsoft.com/office/drawing/2010/main" w="9525">
-                <a:solidFill>
-                  <a:srgbClr val="000000"/>
-                </a:solidFill>
-                <a:miter lim="800000"/>
-                <a:headEnd/>
-                <a:tailEnd/>
-              </a14:hiddenLine>
-            </a:ext>
-          </a:extLst>
-        </p:spPr>
-        <p:txBody>
-          <a:bodyPr vert="horz" wrap="square" lIns="91440" tIns="45720" rIns="91440" bIns="45720" numCol="1" anchor="t" anchorCtr="0" compatLnSpc="1">
-            <a:prstTxWarp prst="textNoShape">
-              <a:avLst/>
-            </a:prstTxWarp>
-          </a:bodyPr>
-          <a:lstStyle/>
-          <a:p>
-            <a:pPr algn="ctr" eaLnBrk="1" hangingPunct="1"/>
-            <a:r>
-              <a:rPr lang="en-US" sz="8000" dirty="0"/>
-              <a:t>Thank you!</a:t>
-            </a:r>
-          </a:p>
-        </p:txBody>
-      </p:sp>
-      <p:sp>
-        <p:nvSpPr>
-          <p:cNvPr id="8195" name="Untertitel 4"/>
-          <p:cNvSpPr>
-            <a:spLocks noGrp="1"/>
-          </p:cNvSpPr>
-          <p:nvPr>
-            <p:ph type="subTitle" idx="4294967295"/>
-          </p:nvPr>
-        </p:nvSpPr>
-        <p:spPr bwMode="auto">
-          <a:xfrm>
-            <a:off x="2823741" y="5013176"/>
-            <a:ext cx="6400800" cy="1080120"/>
-          </a:xfrm>
-          <a:prstGeom prst="rect">
-            <a:avLst/>
-          </a:prstGeom>
-          <a:noFill/>
-          <a:extLst>
-            <a:ext uri="{909E8E84-426E-40DD-AFC4-6F175D3DCCD1}">
-              <a14:hiddenFill xmlns:a14="http://schemas.microsoft.com/office/drawing/2010/main">
-                <a:solidFill>
-                  <a:srgbClr val="FFFFFF"/>
-                </a:solidFill>
-              </a14:hiddenFill>
-            </a:ext>
-            <a:ext uri="{91240B29-F687-4F45-9708-019B960494DF}">
-              <a14:hiddenLine xmlns:a14="http://schemas.microsoft.com/office/drawing/2010/main" w="9525">
-                <a:solidFill>
-                  <a:srgbClr val="000000"/>
-                </a:solidFill>
-                <a:miter lim="800000"/>
-                <a:headEnd/>
-                <a:tailEnd/>
-              </a14:hiddenLine>
-            </a:ext>
-          </a:extLst>
-        </p:spPr>
-        <p:txBody>
-          <a:bodyPr/>
-          <a:lstStyle/>
-          <a:p>
-            <a:pPr marL="0" indent="0" algn="ctr" eaLnBrk="1" hangingPunct="1">
-              <a:buNone/>
-            </a:pPr>
-            <a:r>
-              <a:rPr lang="de-DE" dirty="0">
-                <a:latin typeface="Segoe UI Light" panose="020B0502040204020203" pitchFamily="34" charset="0"/>
-                <a:cs typeface="Segoe UI Light" panose="020B0502040204020203" pitchFamily="34" charset="0"/>
-              </a:rPr>
-              <a:t>Kenny Pflug</a:t>
-            </a:r>
-          </a:p>
-        </p:txBody>
-      </p:sp>
-      <p:sp>
-        <p:nvSpPr>
-          <p:cNvPr id="2" name="Textfeld 1"/>
-          <p:cNvSpPr txBox="1"/>
-          <p:nvPr/>
-        </p:nvSpPr>
-        <p:spPr>
-          <a:xfrm>
-            <a:off x="2135560" y="1340769"/>
-            <a:ext cx="7777163" cy="646331"/>
-          </a:xfrm>
-          <a:prstGeom prst="rect">
-            <a:avLst/>
-          </a:prstGeom>
-          <a:noFill/>
-        </p:spPr>
-        <p:txBody>
-          <a:bodyPr wrap="square" rtlCol="0">
-            <a:spAutoFit/>
-          </a:bodyPr>
-          <a:lstStyle/>
-          <a:p>
-            <a:pPr algn="ctr"/>
-            <a:r>
-              <a:rPr lang="en-US" sz="3600" dirty="0">
-                <a:latin typeface="Segoe UI Light" panose="020B0502040204020203" pitchFamily="34" charset="0"/>
-                <a:cs typeface="Segoe UI Light" panose="020B0502040204020203" pitchFamily="34" charset="0"/>
-              </a:rPr>
-              <a:t>I‘m looking forward to your feedback!</a:t>
-            </a:r>
-          </a:p>
-        </p:txBody>
-      </p:sp>
-    </p:spTree>
   </p:cSld>
   <p:clrMapOvr>
     <a:masterClrMapping/>
@@ -21439,6 +23576,261 @@
         <p14:creationId xmlns:p14="http://schemas.microsoft.com/office/powerpoint/2010/main" val="3356312627"/>
       </p:ext>
     </p:extLst>
+  </p:cSld>
+  <p:clrMapOvr>
+    <a:masterClrMapping/>
+  </p:clrMapOvr>
+  <p:transition spd="med">
+    <p:pull/>
+  </p:transition>
+</p:sld>
+</file>
+
+<file path=ppt/slides/slide40.xml><?xml version="1.0" encoding="utf-8"?>
+<p:sld xmlns:a="http://schemas.openxmlformats.org/drawingml/2006/main" xmlns:r="http://schemas.openxmlformats.org/officeDocument/2006/relationships" xmlns:p="http://schemas.openxmlformats.org/presentationml/2006/main">
+  <p:cSld>
+    <p:spTree>
+      <p:nvGrpSpPr>
+        <p:cNvPr id="1" name=""/>
+        <p:cNvGrpSpPr/>
+        <p:nvPr/>
+      </p:nvGrpSpPr>
+      <p:grpSpPr>
+        <a:xfrm>
+          <a:off x="0" y="0"/>
+          <a:ext cx="0" cy="0"/>
+          <a:chOff x="0" y="0"/>
+          <a:chExt cx="0" cy="0"/>
+        </a:xfrm>
+      </p:grpSpPr>
+      <p:sp>
+        <p:nvSpPr>
+          <p:cNvPr id="6146" name="Titel 3"/>
+          <p:cNvSpPr>
+            <a:spLocks noGrp="1"/>
+          </p:cNvSpPr>
+          <p:nvPr>
+            <p:ph type="ctrTitle"/>
+          </p:nvPr>
+        </p:nvSpPr>
+        <p:spPr bwMode="auto">
+          <a:xfrm>
+            <a:off x="2135188" y="2492376"/>
+            <a:ext cx="7777162" cy="1800225"/>
+          </a:xfrm>
+          <a:prstGeom prst="rect">
+            <a:avLst/>
+          </a:prstGeom>
+          <a:noFill/>
+          <a:extLst>
+            <a:ext uri="{909E8E84-426E-40DD-AFC4-6F175D3DCCD1}">
+              <a14:hiddenFill xmlns:a14="http://schemas.microsoft.com/office/drawing/2010/main">
+                <a:solidFill>
+                  <a:srgbClr val="FFFFFF"/>
+                </a:solidFill>
+              </a14:hiddenFill>
+            </a:ext>
+            <a:ext uri="{91240B29-F687-4F45-9708-019B960494DF}">
+              <a14:hiddenLine xmlns:a14="http://schemas.microsoft.com/office/drawing/2010/main" w="9525">
+                <a:solidFill>
+                  <a:srgbClr val="000000"/>
+                </a:solidFill>
+                <a:miter lim="800000"/>
+                <a:headEnd/>
+                <a:tailEnd/>
+              </a14:hiddenLine>
+            </a:ext>
+          </a:extLst>
+        </p:spPr>
+        <p:txBody>
+          <a:bodyPr vert="horz" wrap="square" lIns="91440" tIns="45720" rIns="91440" bIns="45720" numCol="1" anchor="t" anchorCtr="0" compatLnSpc="1">
+            <a:prstTxWarp prst="textNoShape">
+              <a:avLst/>
+            </a:prstTxWarp>
+          </a:bodyPr>
+          <a:lstStyle/>
+          <a:p>
+            <a:pPr algn="ctr" eaLnBrk="1" hangingPunct="1"/>
+            <a:r>
+              <a:rPr lang="de-DE" sz="8800" dirty="0"/>
+              <a:t>Any Questions?</a:t>
+            </a:r>
+          </a:p>
+        </p:txBody>
+      </p:sp>
+    </p:spTree>
+  </p:cSld>
+  <p:clrMapOvr>
+    <a:masterClrMapping/>
+  </p:clrMapOvr>
+  <p:transition spd="med">
+    <p:pull/>
+  </p:transition>
+</p:sld>
+</file>
+
+<file path=ppt/slides/slide41.xml><?xml version="1.0" encoding="utf-8"?>
+<p:sld xmlns:a="http://schemas.openxmlformats.org/drawingml/2006/main" xmlns:r="http://schemas.openxmlformats.org/officeDocument/2006/relationships" xmlns:p="http://schemas.openxmlformats.org/presentationml/2006/main">
+  <p:cSld>
+    <p:spTree>
+      <p:nvGrpSpPr>
+        <p:cNvPr id="1" name=""/>
+        <p:cNvGrpSpPr/>
+        <p:nvPr/>
+      </p:nvGrpSpPr>
+      <p:grpSpPr>
+        <a:xfrm>
+          <a:off x="0" y="0"/>
+          <a:ext cx="0" cy="0"/>
+          <a:chOff x="0" y="0"/>
+          <a:chExt cx="0" cy="0"/>
+        </a:xfrm>
+      </p:grpSpPr>
+      <p:sp>
+        <p:nvSpPr>
+          <p:cNvPr id="8194" name="Titel 3"/>
+          <p:cNvSpPr>
+            <a:spLocks noGrp="1"/>
+          </p:cNvSpPr>
+          <p:nvPr>
+            <p:ph type="ctrTitle"/>
+          </p:nvPr>
+        </p:nvSpPr>
+        <p:spPr bwMode="auto">
+          <a:xfrm>
+            <a:off x="2135561" y="3429001"/>
+            <a:ext cx="7777163" cy="1800225"/>
+          </a:xfrm>
+          <a:prstGeom prst="rect">
+            <a:avLst/>
+          </a:prstGeom>
+          <a:noFill/>
+          <a:extLst>
+            <a:ext uri="{909E8E84-426E-40DD-AFC4-6F175D3DCCD1}">
+              <a14:hiddenFill xmlns:a14="http://schemas.microsoft.com/office/drawing/2010/main">
+                <a:solidFill>
+                  <a:srgbClr val="FFFFFF"/>
+                </a:solidFill>
+              </a14:hiddenFill>
+            </a:ext>
+            <a:ext uri="{91240B29-F687-4F45-9708-019B960494DF}">
+              <a14:hiddenLine xmlns:a14="http://schemas.microsoft.com/office/drawing/2010/main" w="9525">
+                <a:solidFill>
+                  <a:srgbClr val="000000"/>
+                </a:solidFill>
+                <a:miter lim="800000"/>
+                <a:headEnd/>
+                <a:tailEnd/>
+              </a14:hiddenLine>
+            </a:ext>
+          </a:extLst>
+        </p:spPr>
+        <p:txBody>
+          <a:bodyPr vert="horz" wrap="square" lIns="91440" tIns="45720" rIns="91440" bIns="45720" numCol="1" anchor="t" anchorCtr="0" compatLnSpc="1">
+            <a:prstTxWarp prst="textNoShape">
+              <a:avLst/>
+            </a:prstTxWarp>
+          </a:bodyPr>
+          <a:lstStyle/>
+          <a:p>
+            <a:pPr algn="ctr" eaLnBrk="1" hangingPunct="1"/>
+            <a:r>
+              <a:rPr lang="en-US" sz="8000" dirty="0"/>
+              <a:t>Thank you!</a:t>
+            </a:r>
+          </a:p>
+        </p:txBody>
+      </p:sp>
+      <p:sp>
+        <p:nvSpPr>
+          <p:cNvPr id="8195" name="Untertitel 4"/>
+          <p:cNvSpPr>
+            <a:spLocks noGrp="1"/>
+          </p:cNvSpPr>
+          <p:nvPr>
+            <p:ph type="subTitle" idx="4294967295"/>
+          </p:nvPr>
+        </p:nvSpPr>
+        <p:spPr bwMode="auto">
+          <a:xfrm>
+            <a:off x="2823741" y="5013176"/>
+            <a:ext cx="6400800" cy="1080120"/>
+          </a:xfrm>
+          <a:prstGeom prst="rect">
+            <a:avLst/>
+          </a:prstGeom>
+          <a:noFill/>
+          <a:extLst>
+            <a:ext uri="{909E8E84-426E-40DD-AFC4-6F175D3DCCD1}">
+              <a14:hiddenFill xmlns:a14="http://schemas.microsoft.com/office/drawing/2010/main">
+                <a:solidFill>
+                  <a:srgbClr val="FFFFFF"/>
+                </a:solidFill>
+              </a14:hiddenFill>
+            </a:ext>
+            <a:ext uri="{91240B29-F687-4F45-9708-019B960494DF}">
+              <a14:hiddenLine xmlns:a14="http://schemas.microsoft.com/office/drawing/2010/main" w="9525">
+                <a:solidFill>
+                  <a:srgbClr val="000000"/>
+                </a:solidFill>
+                <a:miter lim="800000"/>
+                <a:headEnd/>
+                <a:tailEnd/>
+              </a14:hiddenLine>
+            </a:ext>
+          </a:extLst>
+        </p:spPr>
+        <p:txBody>
+          <a:bodyPr/>
+          <a:lstStyle/>
+          <a:p>
+            <a:pPr marL="0" indent="0" algn="ctr" eaLnBrk="1" hangingPunct="1">
+              <a:buNone/>
+            </a:pPr>
+            <a:r>
+              <a:rPr lang="de-DE" dirty="0">
+                <a:latin typeface="Segoe UI Light" panose="020B0502040204020203" pitchFamily="34" charset="0"/>
+                <a:cs typeface="Segoe UI Light" panose="020B0502040204020203" pitchFamily="34" charset="0"/>
+              </a:rPr>
+              <a:t>Kenny Pflug</a:t>
+            </a:r>
+          </a:p>
+        </p:txBody>
+      </p:sp>
+      <p:sp>
+        <p:nvSpPr>
+          <p:cNvPr id="2" name="Textfeld 1"/>
+          <p:cNvSpPr txBox="1"/>
+          <p:nvPr/>
+        </p:nvSpPr>
+        <p:spPr>
+          <a:xfrm>
+            <a:off x="2135560" y="1340769"/>
+            <a:ext cx="7777163" cy="646331"/>
+          </a:xfrm>
+          <a:prstGeom prst="rect">
+            <a:avLst/>
+          </a:prstGeom>
+          <a:noFill/>
+        </p:spPr>
+        <p:txBody>
+          <a:bodyPr wrap="square" rtlCol="0">
+            <a:spAutoFit/>
+          </a:bodyPr>
+          <a:lstStyle/>
+          <a:p>
+            <a:pPr algn="ctr"/>
+            <a:r>
+              <a:rPr lang="en-US" sz="3600" dirty="0">
+                <a:latin typeface="Segoe UI Light" panose="020B0502040204020203" pitchFamily="34" charset="0"/>
+                <a:cs typeface="Segoe UI Light" panose="020B0502040204020203" pitchFamily="34" charset="0"/>
+              </a:rPr>
+              <a:t>I‘m looking forward to your feedback!</a:t>
+            </a:r>
+          </a:p>
+        </p:txBody>
+      </p:sp>
+    </p:spTree>
   </p:cSld>
   <p:clrMapOvr>
     <a:masterClrMapping/>

</xml_diff>